<commit_message>
to reorganize, prep for results, and fix typos
</commit_message>
<xml_diff>
--- a/June_Overview.pptx
+++ b/June_Overview.pptx
@@ -6,22 +6,22 @@
   </p:sldMasterIdLst>
   <p:sldIdLst>
     <p:sldId id="257" r:id="rId2"/>
-    <p:sldId id="258" r:id="rId3"/>
-    <p:sldId id="272" r:id="rId4"/>
-    <p:sldId id="261" r:id="rId5"/>
-    <p:sldId id="260" r:id="rId6"/>
-    <p:sldId id="262" r:id="rId7"/>
-    <p:sldId id="265" r:id="rId8"/>
-    <p:sldId id="273" r:id="rId9"/>
-    <p:sldId id="263" r:id="rId10"/>
-    <p:sldId id="264" r:id="rId11"/>
-    <p:sldId id="266" r:id="rId12"/>
-    <p:sldId id="267" r:id="rId13"/>
-    <p:sldId id="270" r:id="rId14"/>
-    <p:sldId id="269" r:id="rId15"/>
-    <p:sldId id="268" r:id="rId16"/>
-    <p:sldId id="271" r:id="rId17"/>
-    <p:sldId id="274" r:id="rId18"/>
+    <p:sldId id="263" r:id="rId3"/>
+    <p:sldId id="264" r:id="rId4"/>
+    <p:sldId id="266" r:id="rId5"/>
+    <p:sldId id="267" r:id="rId6"/>
+    <p:sldId id="270" r:id="rId7"/>
+    <p:sldId id="269" r:id="rId8"/>
+    <p:sldId id="268" r:id="rId9"/>
+    <p:sldId id="271" r:id="rId10"/>
+    <p:sldId id="274" r:id="rId11"/>
+    <p:sldId id="258" r:id="rId12"/>
+    <p:sldId id="272" r:id="rId13"/>
+    <p:sldId id="261" r:id="rId14"/>
+    <p:sldId id="260" r:id="rId15"/>
+    <p:sldId id="262" r:id="rId16"/>
+    <p:sldId id="265" r:id="rId17"/>
+    <p:sldId id="273" r:id="rId18"/>
   </p:sldIdLst>
   <p:sldSz cx="9144000" cy="6858000" type="screen4x3"/>
   <p:notesSz cx="6858000" cy="9144000"/>
@@ -305,7 +305,7 @@
             <a:fld id="{E0507902-0F62-4629-8640-CB0DA259E3CF}" type="datetimeFigureOut">
               <a:rPr lang="en-US" smtClean="0"/>
               <a:pPr/>
-              <a:t>6/22/2011</a:t>
+              <a:t>7/11/2011</a:t>
             </a:fld>
             <a:endParaRPr lang="en-US"/>
           </a:p>
@@ -472,7 +472,7 @@
             <a:fld id="{E0507902-0F62-4629-8640-CB0DA259E3CF}" type="datetimeFigureOut">
               <a:rPr lang="en-US" smtClean="0"/>
               <a:pPr/>
-              <a:t>6/22/2011</a:t>
+              <a:t>7/11/2011</a:t>
             </a:fld>
             <a:endParaRPr lang="en-US"/>
           </a:p>
@@ -649,7 +649,7 @@
             <a:fld id="{E0507902-0F62-4629-8640-CB0DA259E3CF}" type="datetimeFigureOut">
               <a:rPr lang="en-US" smtClean="0"/>
               <a:pPr/>
-              <a:t>6/22/2011</a:t>
+              <a:t>7/11/2011</a:t>
             </a:fld>
             <a:endParaRPr lang="en-US"/>
           </a:p>
@@ -816,7 +816,7 @@
             <a:fld id="{E0507902-0F62-4629-8640-CB0DA259E3CF}" type="datetimeFigureOut">
               <a:rPr lang="en-US" smtClean="0"/>
               <a:pPr/>
-              <a:t>6/22/2011</a:t>
+              <a:t>7/11/2011</a:t>
             </a:fld>
             <a:endParaRPr lang="en-US"/>
           </a:p>
@@ -1059,7 +1059,7 @@
             <a:fld id="{E0507902-0F62-4629-8640-CB0DA259E3CF}" type="datetimeFigureOut">
               <a:rPr lang="en-US" smtClean="0"/>
               <a:pPr/>
-              <a:t>6/22/2011</a:t>
+              <a:t>7/11/2011</a:t>
             </a:fld>
             <a:endParaRPr lang="en-US"/>
           </a:p>
@@ -1344,7 +1344,7 @@
             <a:fld id="{E0507902-0F62-4629-8640-CB0DA259E3CF}" type="datetimeFigureOut">
               <a:rPr lang="en-US" smtClean="0"/>
               <a:pPr/>
-              <a:t>6/22/2011</a:t>
+              <a:t>7/11/2011</a:t>
             </a:fld>
             <a:endParaRPr lang="en-US"/>
           </a:p>
@@ -1763,7 +1763,7 @@
             <a:fld id="{E0507902-0F62-4629-8640-CB0DA259E3CF}" type="datetimeFigureOut">
               <a:rPr lang="en-US" smtClean="0"/>
               <a:pPr/>
-              <a:t>6/22/2011</a:t>
+              <a:t>7/11/2011</a:t>
             </a:fld>
             <a:endParaRPr lang="en-US"/>
           </a:p>
@@ -1878,7 +1878,7 @@
             <a:fld id="{E0507902-0F62-4629-8640-CB0DA259E3CF}" type="datetimeFigureOut">
               <a:rPr lang="en-US" smtClean="0"/>
               <a:pPr/>
-              <a:t>6/22/2011</a:t>
+              <a:t>7/11/2011</a:t>
             </a:fld>
             <a:endParaRPr lang="en-US"/>
           </a:p>
@@ -1970,7 +1970,7 @@
             <a:fld id="{E0507902-0F62-4629-8640-CB0DA259E3CF}" type="datetimeFigureOut">
               <a:rPr lang="en-US" smtClean="0"/>
               <a:pPr/>
-              <a:t>6/22/2011</a:t>
+              <a:t>7/11/2011</a:t>
             </a:fld>
             <a:endParaRPr lang="en-US"/>
           </a:p>
@@ -2244,7 +2244,7 @@
             <a:fld id="{E0507902-0F62-4629-8640-CB0DA259E3CF}" type="datetimeFigureOut">
               <a:rPr lang="en-US" smtClean="0"/>
               <a:pPr/>
-              <a:t>6/22/2011</a:t>
+              <a:t>7/11/2011</a:t>
             </a:fld>
             <a:endParaRPr lang="en-US"/>
           </a:p>
@@ -2494,7 +2494,7 @@
             <a:fld id="{E0507902-0F62-4629-8640-CB0DA259E3CF}" type="datetimeFigureOut">
               <a:rPr lang="en-US" smtClean="0"/>
               <a:pPr/>
-              <a:t>6/22/2011</a:t>
+              <a:t>7/11/2011</a:t>
             </a:fld>
             <a:endParaRPr lang="en-US"/>
           </a:p>
@@ -2704,7 +2704,7 @@
             <a:fld id="{E0507902-0F62-4629-8640-CB0DA259E3CF}" type="datetimeFigureOut">
               <a:rPr lang="en-US" smtClean="0"/>
               <a:pPr/>
-              <a:t>6/22/2011</a:t>
+              <a:t>7/11/2011</a:t>
             </a:fld>
             <a:endParaRPr lang="en-US"/>
           </a:p>
@@ -3114,24 +3114,6 @@
           <a:lstStyle/>
           <a:p>
             <a:r>
-              <a:rPr lang="en-US" dirty="0" smtClean="0"/>
-              <a:t>Code </a:t>
-            </a:r>
-            <a:r>
-              <a:rPr lang="en-US" dirty="0" smtClean="0"/>
-              <a:t>Development</a:t>
-            </a:r>
-          </a:p>
-          <a:p>
-            <a:pPr lvl="1"/>
-            <a:r>
-              <a:rPr lang="en-US" dirty="0" smtClean="0"/>
-              <a:t>Software Engineering</a:t>
-            </a:r>
-            <a:endParaRPr lang="en-US" dirty="0" smtClean="0"/>
-          </a:p>
-          <a:p>
-            <a:r>
               <a:rPr lang="en-US" dirty="0" err="1" smtClean="0"/>
               <a:t>Adjoints</a:t>
             </a:r>
@@ -3148,13 +3130,8 @@
             <a:pPr lvl="1"/>
             <a:r>
               <a:rPr lang="en-US" dirty="0" smtClean="0"/>
-              <a:t>Adjoint error estimation and </a:t>
-            </a:r>
-            <a:r>
-              <a:rPr lang="en-US" dirty="0" smtClean="0"/>
-              <a:t>TE</a:t>
-            </a:r>
-            <a:endParaRPr lang="en-US" dirty="0" smtClean="0"/>
+              <a:t>Adjoint error estimation and TE</a:t>
+            </a:r>
           </a:p>
           <a:p>
             <a:r>
@@ -3165,6 +3142,23 @@
               <a:rPr lang="en-US" dirty="0" err="1" smtClean="0"/>
               <a:t>LaRC</a:t>
             </a:r>
+            <a:endParaRPr lang="en-US" dirty="0" smtClean="0"/>
+          </a:p>
+          <a:p>
+            <a:r>
+              <a:rPr lang="en-US" dirty="0" smtClean="0"/>
+              <a:t>Code Development at VT</a:t>
+            </a:r>
+            <a:endParaRPr lang="en-US" dirty="0" smtClean="0"/>
+          </a:p>
+          <a:p>
+            <a:pPr lvl="1"/>
+            <a:r>
+              <a:rPr lang="en-US" dirty="0" smtClean="0"/>
+              <a:t>Software Engineering</a:t>
+            </a:r>
+          </a:p>
+          <a:p>
             <a:endParaRPr lang="en-US" dirty="0"/>
           </a:p>
         </p:txBody>
@@ -3211,7 +3205,7 @@
           <a:p>
             <a:r>
               <a:rPr lang="en-US" dirty="0" smtClean="0"/>
-              <a:t>Continuous Adjoint</a:t>
+              <a:t>Side Note, Entropy</a:t>
             </a:r>
             <a:endParaRPr lang="en-US" dirty="0"/>
           </a:p>
@@ -3232,35 +3226,6 @@
           <a:bodyPr/>
           <a:lstStyle/>
           <a:p>
-            <a:r>
-              <a:rPr lang="en-US" dirty="0" smtClean="0"/>
-              <a:t>The process of deriving the analytic adjoint was helpful for understanding boundary conditions</a:t>
-            </a:r>
-          </a:p>
-          <a:p>
-            <a:r>
-              <a:rPr lang="en-US" dirty="0" smtClean="0"/>
-              <a:t>This being said, all future work will be done with hand-coded, discrete </a:t>
-            </a:r>
-            <a:r>
-              <a:rPr lang="en-US" dirty="0" err="1" smtClean="0"/>
-              <a:t>adjoints</a:t>
-            </a:r>
-            <a:r>
-              <a:rPr lang="en-US" dirty="0" smtClean="0"/>
-              <a:t> due to how boundary conditions are naturally </a:t>
-            </a:r>
-            <a:r>
-              <a:rPr lang="en-US" dirty="0" smtClean="0"/>
-              <a:t>included</a:t>
-            </a:r>
-          </a:p>
-          <a:p>
-            <a:pPr lvl="1"/>
-            <a:r>
-              <a:rPr lang="en-US" dirty="0" smtClean="0"/>
-              <a:t>Also encourages development of implicit methods</a:t>
-            </a:r>
             <a:endParaRPr lang="en-US" dirty="0"/>
           </a:p>
         </p:txBody>
@@ -3307,7 +3272,7 @@
           <a:p>
             <a:r>
               <a:rPr lang="en-US" dirty="0" smtClean="0"/>
-              <a:t>Error Estimation and TE</a:t>
+              <a:t>Code Development, Background</a:t>
             </a:r>
             <a:endParaRPr lang="en-US" dirty="0"/>
           </a:p>
@@ -3325,72 +3290,41 @@
         </p:nvSpPr>
         <p:spPr/>
         <p:txBody>
-          <a:bodyPr>
-            <a:normAutofit lnSpcReduction="10000"/>
-          </a:bodyPr>
-          <a:lstStyle/>
-          <a:p>
-            <a:r>
-              <a:rPr lang="en-US" dirty="0" smtClean="0"/>
-              <a:t>I left </a:t>
-            </a:r>
-            <a:r>
-              <a:rPr lang="en-US" dirty="0" err="1" smtClean="0"/>
-              <a:t>LaRC</a:t>
-            </a:r>
-            <a:r>
-              <a:rPr lang="en-US" dirty="0" smtClean="0"/>
-              <a:t> last year with a lingering question about how each term in the error correction equation related to the TE and DE</a:t>
+          <a:bodyPr/>
+          <a:lstStyle/>
+          <a:p>
+            <a:r>
+              <a:rPr lang="en-US" dirty="0" smtClean="0"/>
+              <a:t>VT AOE CFD research group only has a few programmers</a:t>
             </a:r>
           </a:p>
           <a:p>
             <a:pPr lvl="1"/>
             <a:r>
               <a:rPr lang="en-US" dirty="0" smtClean="0"/>
-              <a:t>Mainly an exercise in terminology</a:t>
-            </a:r>
-          </a:p>
-          <a:p>
-            <a:r>
-              <a:rPr lang="en-US" dirty="0" smtClean="0"/>
-              <a:t>Definitions</a:t>
-            </a:r>
-            <a:endParaRPr lang="en-US" dirty="0" smtClean="0"/>
-          </a:p>
-          <a:p>
-            <a:pPr lvl="1"/>
-            <a:r>
-              <a:rPr lang="en-US" dirty="0" smtClean="0"/>
-              <a:t>TE is the difference between the continuous and discrete </a:t>
-            </a:r>
-            <a:r>
-              <a:rPr lang="en-US" i="1" dirty="0" smtClean="0"/>
-              <a:t>Equations</a:t>
-            </a:r>
-            <a:r>
-              <a:rPr lang="en-US" dirty="0" smtClean="0"/>
-              <a:t> of Interest (EOI)</a:t>
-            </a:r>
-          </a:p>
-          <a:p>
-            <a:pPr lvl="1"/>
-            <a:r>
-              <a:rPr lang="en-US" dirty="0" smtClean="0"/>
-              <a:t>DE is the difference between the </a:t>
-            </a:r>
-            <a:r>
-              <a:rPr lang="en-US" i="1" dirty="0" smtClean="0"/>
-              <a:t>solutions</a:t>
-            </a:r>
-            <a:r>
-              <a:rPr lang="en-US" dirty="0" smtClean="0"/>
-              <a:t> of the continuous and discrete </a:t>
-            </a:r>
-            <a:r>
-              <a:rPr lang="en-US" dirty="0" smtClean="0"/>
-              <a:t>EOI</a:t>
-            </a:r>
-            <a:endParaRPr lang="en-US" dirty="0" smtClean="0"/>
+              <a:t>None with any formal Fortran training</a:t>
+            </a:r>
+          </a:p>
+          <a:p>
+            <a:r>
+              <a:rPr lang="en-US" dirty="0" smtClean="0"/>
+              <a:t>Code development split between Windows and Linux with Subversion VCS</a:t>
+            </a:r>
+          </a:p>
+          <a:p>
+            <a:r>
+              <a:rPr lang="en-US" dirty="0" smtClean="0"/>
+              <a:t>Normal assortment of simple test codes</a:t>
+            </a:r>
+          </a:p>
+          <a:p>
+            <a:r>
+              <a:rPr lang="en-US" dirty="0" smtClean="0"/>
+              <a:t>In-house code SENSEI</a:t>
+            </a:r>
+          </a:p>
+          <a:p>
+            <a:endParaRPr lang="en-US" dirty="0"/>
           </a:p>
         </p:txBody>
       </p:sp>
@@ -3436,6 +3370,1118 @@
           <a:p>
             <a:r>
               <a:rPr lang="en-US" dirty="0" smtClean="0"/>
+              <a:t>Code Development</a:t>
+            </a:r>
+            <a:endParaRPr lang="en-US" dirty="0"/>
+          </a:p>
+        </p:txBody>
+      </p:sp>
+      <p:sp>
+        <p:nvSpPr>
+          <p:cNvPr id="3" name="Content Placeholder 2"/>
+          <p:cNvSpPr>
+            <a:spLocks noGrp="1"/>
+          </p:cNvSpPr>
+          <p:nvPr>
+            <p:ph idx="1"/>
+          </p:nvPr>
+        </p:nvSpPr>
+        <p:spPr/>
+        <p:txBody>
+          <a:bodyPr>
+            <a:normAutofit lnSpcReduction="10000"/>
+          </a:bodyPr>
+          <a:lstStyle/>
+          <a:p>
+            <a:r>
+              <a:rPr lang="en-US" dirty="0" smtClean="0"/>
+              <a:t>Students with no formal training = obfuscated code</a:t>
+            </a:r>
+          </a:p>
+          <a:p>
+            <a:pPr lvl="1"/>
+            <a:r>
+              <a:rPr lang="en-US" dirty="0" smtClean="0"/>
+              <a:t>Modules were used as common blocks</a:t>
+            </a:r>
+          </a:p>
+          <a:p>
+            <a:pPr lvl="1"/>
+            <a:r>
+              <a:rPr lang="en-US" dirty="0" smtClean="0"/>
+              <a:t>Copy and paste between programs</a:t>
+            </a:r>
+          </a:p>
+          <a:p>
+            <a:pPr lvl="1"/>
+            <a:r>
+              <a:rPr lang="en-US" dirty="0" smtClean="0"/>
+              <a:t>Difficult code to work with simply due to different styles</a:t>
+            </a:r>
+          </a:p>
+          <a:p>
+            <a:r>
+              <a:rPr lang="en-US" dirty="0" smtClean="0"/>
+              <a:t>Rewrote a simple 1D code as an example</a:t>
+            </a:r>
+          </a:p>
+          <a:p>
+            <a:pPr lvl="1"/>
+            <a:r>
+              <a:rPr lang="en-US" dirty="0" smtClean="0"/>
+              <a:t>Design order accurate, but had bugs that hurt performance</a:t>
+            </a:r>
+          </a:p>
+        </p:txBody>
+      </p:sp>
+    </p:spTree>
+  </p:cSld>
+  <p:clrMapOvr>
+    <a:masterClrMapping/>
+  </p:clrMapOvr>
+</p:sld>
+</file>
+
+<file path=ppt/slides/slide13.xml><?xml version="1.0" encoding="utf-8"?>
+<p:sld xmlns:a="http://schemas.openxmlformats.org/drawingml/2006/main" xmlns:r="http://schemas.openxmlformats.org/officeDocument/2006/relationships" xmlns:p="http://schemas.openxmlformats.org/presentationml/2006/main">
+  <p:cSld>
+    <p:spTree>
+      <p:nvGrpSpPr>
+        <p:cNvPr id="1" name=""/>
+        <p:cNvGrpSpPr/>
+        <p:nvPr/>
+      </p:nvGrpSpPr>
+      <p:grpSpPr>
+        <a:xfrm>
+          <a:off x="0" y="0"/>
+          <a:ext cx="0" cy="0"/>
+          <a:chOff x="0" y="0"/>
+          <a:chExt cx="0" cy="0"/>
+        </a:xfrm>
+      </p:grpSpPr>
+      <p:sp>
+        <p:nvSpPr>
+          <p:cNvPr id="2" name="Title 1"/>
+          <p:cNvSpPr>
+            <a:spLocks noGrp="1"/>
+          </p:cNvSpPr>
+          <p:nvPr>
+            <p:ph type="title"/>
+          </p:nvPr>
+        </p:nvSpPr>
+        <p:spPr/>
+        <p:txBody>
+          <a:bodyPr/>
+          <a:lstStyle/>
+          <a:p>
+            <a:r>
+              <a:rPr lang="en-US" dirty="0" smtClean="0"/>
+              <a:t>Code Development</a:t>
+            </a:r>
+            <a:endParaRPr lang="en-US" dirty="0"/>
+          </a:p>
+        </p:txBody>
+      </p:sp>
+      <p:sp>
+        <p:nvSpPr>
+          <p:cNvPr id="3" name="Content Placeholder 2"/>
+          <p:cNvSpPr>
+            <a:spLocks noGrp="1"/>
+          </p:cNvSpPr>
+          <p:nvPr>
+            <p:ph idx="1"/>
+          </p:nvPr>
+        </p:nvSpPr>
+        <p:spPr/>
+        <p:txBody>
+          <a:bodyPr>
+            <a:normAutofit fontScale="92500"/>
+          </a:bodyPr>
+          <a:lstStyle/>
+          <a:p>
+            <a:r>
+              <a:rPr lang="en-US" dirty="0" smtClean="0"/>
+              <a:t>Spurred the use of programming tools</a:t>
+            </a:r>
+          </a:p>
+          <a:p>
+            <a:pPr lvl="1"/>
+            <a:r>
+              <a:rPr lang="en-US" dirty="0" smtClean="0"/>
+              <a:t>Split code up and use </a:t>
+            </a:r>
+            <a:r>
+              <a:rPr lang="en-US" dirty="0" err="1" smtClean="0"/>
+              <a:t>makefiles</a:t>
+            </a:r>
+            <a:endParaRPr lang="en-US" dirty="0"/>
+          </a:p>
+          <a:p>
+            <a:pPr lvl="1"/>
+            <a:r>
+              <a:rPr lang="en-US" dirty="0" smtClean="0"/>
+              <a:t>Unit test code</a:t>
+            </a:r>
+          </a:p>
+          <a:p>
+            <a:pPr lvl="1"/>
+            <a:r>
+              <a:rPr lang="en-US" dirty="0" smtClean="0"/>
+              <a:t>Profile code using </a:t>
+            </a:r>
+            <a:r>
+              <a:rPr lang="en-US" dirty="0" err="1" smtClean="0"/>
+              <a:t>gprof</a:t>
+            </a:r>
+            <a:endParaRPr lang="en-US" dirty="0" smtClean="0"/>
+          </a:p>
+          <a:p>
+            <a:r>
+              <a:rPr lang="en-US" dirty="0" smtClean="0"/>
+              <a:t>Changed programming paradigms</a:t>
+            </a:r>
+          </a:p>
+          <a:p>
+            <a:pPr lvl="1"/>
+            <a:r>
+              <a:rPr lang="en-US" dirty="0" smtClean="0"/>
+              <a:t>Pass data (especially arrays) to routines as arguments</a:t>
+            </a:r>
+          </a:p>
+          <a:p>
+            <a:pPr lvl="1"/>
+            <a:r>
+              <a:rPr lang="en-US" dirty="0" smtClean="0"/>
+              <a:t>Use ‘use module, only:*’ statements instead of COMMON blocks</a:t>
+            </a:r>
+          </a:p>
+          <a:p>
+            <a:pPr lvl="1"/>
+            <a:r>
+              <a:rPr lang="en-US" dirty="0" smtClean="0"/>
+              <a:t>Derived types for logical data structures</a:t>
+            </a:r>
+          </a:p>
+        </p:txBody>
+      </p:sp>
+    </p:spTree>
+  </p:cSld>
+  <p:clrMapOvr>
+    <a:masterClrMapping/>
+  </p:clrMapOvr>
+</p:sld>
+</file>
+
+<file path=ppt/slides/slide14.xml><?xml version="1.0" encoding="utf-8"?>
+<p:sld xmlns:a="http://schemas.openxmlformats.org/drawingml/2006/main" xmlns:r="http://schemas.openxmlformats.org/officeDocument/2006/relationships" xmlns:p="http://schemas.openxmlformats.org/presentationml/2006/main">
+  <p:cSld>
+    <p:spTree>
+      <p:nvGrpSpPr>
+        <p:cNvPr id="1" name=""/>
+        <p:cNvGrpSpPr/>
+        <p:nvPr/>
+      </p:nvGrpSpPr>
+      <p:grpSpPr>
+        <a:xfrm>
+          <a:off x="0" y="0"/>
+          <a:ext cx="0" cy="0"/>
+          <a:chOff x="0" y="0"/>
+          <a:chExt cx="0" cy="0"/>
+        </a:xfrm>
+      </p:grpSpPr>
+      <p:sp>
+        <p:nvSpPr>
+          <p:cNvPr id="2" name="Title 1"/>
+          <p:cNvSpPr>
+            <a:spLocks noGrp="1"/>
+          </p:cNvSpPr>
+          <p:nvPr>
+            <p:ph type="title"/>
+          </p:nvPr>
+        </p:nvSpPr>
+        <p:spPr/>
+        <p:txBody>
+          <a:bodyPr/>
+          <a:lstStyle/>
+          <a:p>
+            <a:r>
+              <a:rPr lang="en-US" dirty="0" smtClean="0"/>
+              <a:t>Code Development</a:t>
+            </a:r>
+            <a:endParaRPr lang="en-US" dirty="0"/>
+          </a:p>
+        </p:txBody>
+      </p:sp>
+      <p:sp>
+        <p:nvSpPr>
+          <p:cNvPr id="3" name="Content Placeholder 2"/>
+          <p:cNvSpPr>
+            <a:spLocks noGrp="1"/>
+          </p:cNvSpPr>
+          <p:nvPr>
+            <p:ph idx="1"/>
+          </p:nvPr>
+        </p:nvSpPr>
+        <p:spPr/>
+        <p:txBody>
+          <a:bodyPr>
+            <a:normAutofit fontScale="77500" lnSpcReduction="20000"/>
+          </a:bodyPr>
+          <a:lstStyle/>
+          <a:p>
+            <a:r>
+              <a:rPr lang="en-US" dirty="0" smtClean="0"/>
+              <a:t>Refactoring the 1D code took longer than expected</a:t>
+            </a:r>
+          </a:p>
+          <a:p>
+            <a:pPr lvl="1"/>
+            <a:r>
+              <a:rPr lang="en-US" dirty="0" smtClean="0"/>
+              <a:t>Difficult to follow logic/data flow because of modules as COMMON</a:t>
+            </a:r>
+          </a:p>
+          <a:p>
+            <a:pPr lvl="1"/>
+            <a:r>
+              <a:rPr lang="en-US" dirty="0" smtClean="0"/>
+              <a:t>Variables such as I and J defined as common (pet </a:t>
+            </a:r>
+            <a:r>
+              <a:rPr lang="en-US" dirty="0" smtClean="0"/>
+              <a:t>peeve</a:t>
+            </a:r>
+            <a:r>
+              <a:rPr lang="en-US" dirty="0" smtClean="0"/>
+              <a:t>)</a:t>
+            </a:r>
+          </a:p>
+          <a:p>
+            <a:r>
+              <a:rPr lang="en-US" dirty="0" smtClean="0"/>
+              <a:t>Separated the code into files based on logical components</a:t>
+            </a:r>
+          </a:p>
+          <a:p>
+            <a:pPr lvl="1"/>
+            <a:r>
+              <a:rPr lang="en-US" dirty="0" smtClean="0"/>
+              <a:t>Asking ‘How do I make this testable?’ really helped</a:t>
+            </a:r>
+          </a:p>
+          <a:p>
+            <a:r>
+              <a:rPr lang="en-US" dirty="0" smtClean="0"/>
+              <a:t>Code review with peers once refactoring was complete</a:t>
+            </a:r>
+          </a:p>
+          <a:p>
+            <a:pPr lvl="1"/>
+            <a:r>
+              <a:rPr lang="en-US" dirty="0" smtClean="0"/>
+              <a:t>The code works and is faster, but what else is possible and what is needed for the future?</a:t>
+            </a:r>
+          </a:p>
+          <a:p>
+            <a:pPr lvl="1"/>
+            <a:r>
+              <a:rPr lang="en-US" dirty="0" smtClean="0"/>
+              <a:t>This discussion led to a decision on how future codes should be developed</a:t>
+            </a:r>
+          </a:p>
+          <a:p>
+            <a:pPr lvl="1"/>
+            <a:r>
+              <a:rPr lang="en-US" dirty="0" smtClean="0"/>
+              <a:t>End result was a modular code with a well defined purpose that is paired with other codes (adjoint, adaptation, etc) so each student can accomplish his work from the same code base</a:t>
+            </a:r>
+            <a:endParaRPr lang="en-US" dirty="0"/>
+          </a:p>
+        </p:txBody>
+      </p:sp>
+    </p:spTree>
+  </p:cSld>
+  <p:clrMapOvr>
+    <a:masterClrMapping/>
+  </p:clrMapOvr>
+</p:sld>
+</file>
+
+<file path=ppt/slides/slide15.xml><?xml version="1.0" encoding="utf-8"?>
+<p:sld xmlns:a="http://schemas.openxmlformats.org/drawingml/2006/main" xmlns:r="http://schemas.openxmlformats.org/officeDocument/2006/relationships" xmlns:p="http://schemas.openxmlformats.org/presentationml/2006/main">
+  <p:cSld>
+    <p:spTree>
+      <p:nvGrpSpPr>
+        <p:cNvPr id="1" name=""/>
+        <p:cNvGrpSpPr/>
+        <p:nvPr/>
+      </p:nvGrpSpPr>
+      <p:grpSpPr>
+        <a:xfrm>
+          <a:off x="0" y="0"/>
+          <a:ext cx="0" cy="0"/>
+          <a:chOff x="0" y="0"/>
+          <a:chExt cx="0" cy="0"/>
+        </a:xfrm>
+      </p:grpSpPr>
+      <p:sp>
+        <p:nvSpPr>
+          <p:cNvPr id="2" name="Title 1"/>
+          <p:cNvSpPr>
+            <a:spLocks noGrp="1"/>
+          </p:cNvSpPr>
+          <p:nvPr>
+            <p:ph type="title"/>
+          </p:nvPr>
+        </p:nvSpPr>
+        <p:spPr/>
+        <p:txBody>
+          <a:bodyPr/>
+          <a:lstStyle/>
+          <a:p>
+            <a:r>
+              <a:rPr lang="en-US" dirty="0" smtClean="0"/>
+              <a:t>Code Development</a:t>
+            </a:r>
+            <a:endParaRPr lang="en-US" dirty="0"/>
+          </a:p>
+        </p:txBody>
+      </p:sp>
+      <p:sp>
+        <p:nvSpPr>
+          <p:cNvPr id="3" name="Content Placeholder 2"/>
+          <p:cNvSpPr>
+            <a:spLocks noGrp="1"/>
+          </p:cNvSpPr>
+          <p:nvPr>
+            <p:ph idx="1"/>
+          </p:nvPr>
+        </p:nvSpPr>
+        <p:spPr/>
+        <p:txBody>
+          <a:bodyPr>
+            <a:normAutofit fontScale="77500" lnSpcReduction="20000"/>
+          </a:bodyPr>
+          <a:lstStyle/>
+          <a:p>
+            <a:r>
+              <a:rPr lang="en-US" dirty="0" smtClean="0"/>
+              <a:t>Unit Testing</a:t>
+            </a:r>
+          </a:p>
+          <a:p>
+            <a:pPr lvl="1"/>
+            <a:r>
+              <a:rPr lang="en-US" dirty="0" smtClean="0"/>
+              <a:t>Taught a </a:t>
+            </a:r>
+            <a:r>
+              <a:rPr lang="en-US" dirty="0" smtClean="0"/>
+              <a:t>class </a:t>
+            </a:r>
+            <a:r>
+              <a:rPr lang="en-US" dirty="0" smtClean="0"/>
+              <a:t>for a CFD course on unit testing and how it affects code development</a:t>
+            </a:r>
+          </a:p>
+          <a:p>
+            <a:pPr lvl="1"/>
+            <a:r>
+              <a:rPr lang="en-US" dirty="0" smtClean="0"/>
+              <a:t>By the end of the semester, the students I talked to wished that they had done more unit testing</a:t>
+            </a:r>
+          </a:p>
+          <a:p>
+            <a:r>
+              <a:rPr lang="en-US" dirty="0" smtClean="0"/>
+              <a:t>Code Profiling</a:t>
+            </a:r>
+          </a:p>
+          <a:p>
+            <a:pPr lvl="1"/>
+            <a:r>
+              <a:rPr lang="en-US" dirty="0" smtClean="0"/>
+              <a:t>Using </a:t>
+            </a:r>
+            <a:r>
+              <a:rPr lang="en-US" dirty="0" err="1" smtClean="0"/>
+              <a:t>gprof</a:t>
+            </a:r>
+            <a:r>
+              <a:rPr lang="en-US" dirty="0" smtClean="0"/>
+              <a:t> I demonstrated </a:t>
+            </a:r>
+            <a:r>
+              <a:rPr lang="en-US" dirty="0" smtClean="0"/>
+              <a:t>how to find bugs in a code, such as a ‘:’ where ‘</a:t>
+            </a:r>
+            <a:r>
+              <a:rPr lang="en-US" dirty="0" err="1" smtClean="0"/>
+              <a:t>i</a:t>
+            </a:r>
+            <a:r>
+              <a:rPr lang="en-US" dirty="0" smtClean="0"/>
+              <a:t>’ was intended</a:t>
+            </a:r>
+          </a:p>
+          <a:p>
+            <a:pPr lvl="1"/>
+            <a:r>
+              <a:rPr lang="en-US" dirty="0" smtClean="0"/>
+              <a:t>Overall result, the 1D code I rewrote runs in milliseconds compared to tens of seconds</a:t>
+            </a:r>
+          </a:p>
+          <a:p>
+            <a:r>
+              <a:rPr lang="en-US" dirty="0" smtClean="0"/>
+              <a:t>Both of these are simple ideas/concepts/tools that weren’t being used and had a huge impact on productivity</a:t>
+            </a:r>
+          </a:p>
+          <a:p>
+            <a:pPr lvl="1"/>
+            <a:endParaRPr lang="en-US" dirty="0"/>
+          </a:p>
+        </p:txBody>
+      </p:sp>
+    </p:spTree>
+  </p:cSld>
+  <p:clrMapOvr>
+    <a:masterClrMapping/>
+  </p:clrMapOvr>
+</p:sld>
+</file>
+
+<file path=ppt/slides/slide16.xml><?xml version="1.0" encoding="utf-8"?>
+<p:sld xmlns:a="http://schemas.openxmlformats.org/drawingml/2006/main" xmlns:r="http://schemas.openxmlformats.org/officeDocument/2006/relationships" xmlns:p="http://schemas.openxmlformats.org/presentationml/2006/main">
+  <p:cSld>
+    <p:spTree>
+      <p:nvGrpSpPr>
+        <p:cNvPr id="1" name=""/>
+        <p:cNvGrpSpPr/>
+        <p:nvPr/>
+      </p:nvGrpSpPr>
+      <p:grpSpPr>
+        <a:xfrm>
+          <a:off x="0" y="0"/>
+          <a:ext cx="0" cy="0"/>
+          <a:chOff x="0" y="0"/>
+          <a:chExt cx="0" cy="0"/>
+        </a:xfrm>
+      </p:grpSpPr>
+      <p:sp>
+        <p:nvSpPr>
+          <p:cNvPr id="2" name="Title 1"/>
+          <p:cNvSpPr>
+            <a:spLocks noGrp="1"/>
+          </p:cNvSpPr>
+          <p:nvPr>
+            <p:ph type="title"/>
+          </p:nvPr>
+        </p:nvSpPr>
+        <p:spPr/>
+        <p:txBody>
+          <a:bodyPr/>
+          <a:lstStyle/>
+          <a:p>
+            <a:r>
+              <a:rPr lang="en-US" dirty="0" smtClean="0"/>
+              <a:t>Code Development</a:t>
+            </a:r>
+            <a:endParaRPr lang="en-US" dirty="0"/>
+          </a:p>
+        </p:txBody>
+      </p:sp>
+      <p:sp>
+        <p:nvSpPr>
+          <p:cNvPr id="3" name="Content Placeholder 2"/>
+          <p:cNvSpPr>
+            <a:spLocks noGrp="1"/>
+          </p:cNvSpPr>
+          <p:nvPr>
+            <p:ph idx="1"/>
+          </p:nvPr>
+        </p:nvSpPr>
+        <p:spPr/>
+        <p:txBody>
+          <a:bodyPr>
+            <a:normAutofit fontScale="77500" lnSpcReduction="20000"/>
+          </a:bodyPr>
+          <a:lstStyle/>
+          <a:p>
+            <a:r>
+              <a:rPr lang="en-US" dirty="0" smtClean="0"/>
+              <a:t>While a lot of time was spent on a simple 1D code, it brought about the branching of SENSEI</a:t>
+            </a:r>
+          </a:p>
+          <a:p>
+            <a:pPr lvl="1"/>
+            <a:r>
+              <a:rPr lang="en-US" dirty="0" smtClean="0"/>
+              <a:t>SENSEI is a Structured, Euler/NS, Explicit/Implicit flow solver in development at VT</a:t>
+            </a:r>
+          </a:p>
+          <a:p>
+            <a:r>
+              <a:rPr lang="en-US" dirty="0" smtClean="0"/>
+              <a:t>SENSEI’s predecessor was almost as bad/worse than the 1D code</a:t>
+            </a:r>
+          </a:p>
+          <a:p>
+            <a:pPr lvl="1"/>
+            <a:r>
+              <a:rPr lang="en-US" dirty="0" smtClean="0"/>
+              <a:t>Single file code, common blocks, no explicit argument passing</a:t>
+            </a:r>
+          </a:p>
+          <a:p>
+            <a:pPr lvl="1"/>
+            <a:r>
+              <a:rPr lang="en-US" dirty="0" smtClean="0"/>
+              <a:t>Its code base was frozen, branched, and rewritten to form SENSEI by Tyrone Phillips</a:t>
+            </a:r>
+          </a:p>
+          <a:p>
+            <a:pPr lvl="1"/>
+            <a:r>
+              <a:rPr lang="en-US" dirty="0" smtClean="0"/>
+              <a:t>Despite the upheaval caused by completely changing coding paradigms and styles, SENSEI was quickly brought into operation</a:t>
+            </a:r>
+          </a:p>
+          <a:p>
+            <a:r>
+              <a:rPr lang="en-US" dirty="0" smtClean="0"/>
+              <a:t>The code base is still not very stable, (we’re still learning new things), but there are far fewer ‘unintended consequences’</a:t>
+            </a:r>
+          </a:p>
+        </p:txBody>
+      </p:sp>
+    </p:spTree>
+  </p:cSld>
+  <p:clrMapOvr>
+    <a:masterClrMapping/>
+  </p:clrMapOvr>
+</p:sld>
+</file>
+
+<file path=ppt/slides/slide17.xml><?xml version="1.0" encoding="utf-8"?>
+<p:sld xmlns:a="http://schemas.openxmlformats.org/drawingml/2006/main" xmlns:r="http://schemas.openxmlformats.org/officeDocument/2006/relationships" xmlns:p="http://schemas.openxmlformats.org/presentationml/2006/main">
+  <p:cSld>
+    <p:spTree>
+      <p:nvGrpSpPr>
+        <p:cNvPr id="1" name=""/>
+        <p:cNvGrpSpPr/>
+        <p:nvPr/>
+      </p:nvGrpSpPr>
+      <p:grpSpPr>
+        <a:xfrm>
+          <a:off x="0" y="0"/>
+          <a:ext cx="0" cy="0"/>
+          <a:chOff x="0" y="0"/>
+          <a:chExt cx="0" cy="0"/>
+        </a:xfrm>
+      </p:grpSpPr>
+      <p:sp>
+        <p:nvSpPr>
+          <p:cNvPr id="2" name="Title 1"/>
+          <p:cNvSpPr>
+            <a:spLocks noGrp="1"/>
+          </p:cNvSpPr>
+          <p:nvPr>
+            <p:ph type="title"/>
+          </p:nvPr>
+        </p:nvSpPr>
+        <p:spPr/>
+        <p:txBody>
+          <a:bodyPr/>
+          <a:lstStyle/>
+          <a:p>
+            <a:r>
+              <a:rPr lang="en-US" dirty="0" smtClean="0"/>
+              <a:t>Code Development Summary</a:t>
+            </a:r>
+            <a:endParaRPr lang="en-US" dirty="0"/>
+          </a:p>
+        </p:txBody>
+      </p:sp>
+      <p:sp>
+        <p:nvSpPr>
+          <p:cNvPr id="3" name="Content Placeholder 2"/>
+          <p:cNvSpPr>
+            <a:spLocks noGrp="1"/>
+          </p:cNvSpPr>
+          <p:nvPr>
+            <p:ph idx="1"/>
+          </p:nvPr>
+        </p:nvSpPr>
+        <p:spPr/>
+        <p:txBody>
+          <a:bodyPr>
+            <a:normAutofit fontScale="92500"/>
+          </a:bodyPr>
+          <a:lstStyle/>
+          <a:p>
+            <a:r>
+              <a:rPr lang="en-US" dirty="0" smtClean="0"/>
+              <a:t>I was able to take a lot of the software engineering lessons I learned at </a:t>
+            </a:r>
+            <a:r>
+              <a:rPr lang="en-US" dirty="0" err="1" smtClean="0"/>
+              <a:t>LaRC</a:t>
+            </a:r>
+            <a:r>
+              <a:rPr lang="en-US" dirty="0" smtClean="0"/>
+              <a:t> and bring them back to VT</a:t>
+            </a:r>
+          </a:p>
+          <a:p>
+            <a:r>
+              <a:rPr lang="en-US" dirty="0" smtClean="0"/>
+              <a:t>Trying to write code that will be maintainable and useful to future students in the research group</a:t>
+            </a:r>
+          </a:p>
+          <a:p>
+            <a:r>
+              <a:rPr lang="en-US" dirty="0" smtClean="0"/>
+              <a:t>Spending the time to do the simple codes right will make it easier to work on SENSEI later</a:t>
+            </a:r>
+          </a:p>
+          <a:p>
+            <a:pPr lvl="1"/>
+            <a:r>
+              <a:rPr lang="en-US" dirty="0" smtClean="0"/>
+              <a:t>Practice make perfect</a:t>
+            </a:r>
+          </a:p>
+        </p:txBody>
+      </p:sp>
+    </p:spTree>
+  </p:cSld>
+  <p:clrMapOvr>
+    <a:masterClrMapping/>
+  </p:clrMapOvr>
+</p:sld>
+</file>
+
+<file path=ppt/slides/slide2.xml><?xml version="1.0" encoding="utf-8"?>
+<p:sld xmlns:a="http://schemas.openxmlformats.org/drawingml/2006/main" xmlns:r="http://schemas.openxmlformats.org/officeDocument/2006/relationships" xmlns:p="http://schemas.openxmlformats.org/presentationml/2006/main">
+  <p:cSld>
+    <p:spTree>
+      <p:nvGrpSpPr>
+        <p:cNvPr id="1" name=""/>
+        <p:cNvGrpSpPr/>
+        <p:nvPr/>
+      </p:nvGrpSpPr>
+      <p:grpSpPr>
+        <a:xfrm>
+          <a:off x="0" y="0"/>
+          <a:ext cx="0" cy="0"/>
+          <a:chOff x="0" y="0"/>
+          <a:chExt cx="0" cy="0"/>
+        </a:xfrm>
+      </p:grpSpPr>
+      <p:sp>
+        <p:nvSpPr>
+          <p:cNvPr id="2" name="Title 1"/>
+          <p:cNvSpPr>
+            <a:spLocks noGrp="1"/>
+          </p:cNvSpPr>
+          <p:nvPr>
+            <p:ph type="title"/>
+          </p:nvPr>
+        </p:nvSpPr>
+        <p:spPr/>
+        <p:txBody>
+          <a:bodyPr/>
+          <a:lstStyle/>
+          <a:p>
+            <a:r>
+              <a:rPr lang="en-US" dirty="0" smtClean="0"/>
+              <a:t>Continuous Adjoint</a:t>
+            </a:r>
+            <a:endParaRPr lang="en-US" dirty="0"/>
+          </a:p>
+        </p:txBody>
+      </p:sp>
+      <p:sp>
+        <p:nvSpPr>
+          <p:cNvPr id="3" name="Content Placeholder 2"/>
+          <p:cNvSpPr>
+            <a:spLocks noGrp="1"/>
+          </p:cNvSpPr>
+          <p:nvPr>
+            <p:ph idx="1"/>
+          </p:nvPr>
+        </p:nvSpPr>
+        <p:spPr/>
+        <p:txBody>
+          <a:bodyPr>
+            <a:normAutofit fontScale="92500" lnSpcReduction="20000"/>
+          </a:bodyPr>
+          <a:lstStyle/>
+          <a:p>
+            <a:r>
+              <a:rPr lang="en-US" dirty="0" smtClean="0"/>
+              <a:t>The VT AOE CFD research group has a strong focus on V&amp;V practices, hence systems with exact solutions are often studied as testing ground problems</a:t>
+            </a:r>
+          </a:p>
+          <a:p>
+            <a:r>
+              <a:rPr lang="en-US" dirty="0" smtClean="0"/>
+              <a:t>As such, my initial work with </a:t>
+            </a:r>
+            <a:r>
+              <a:rPr lang="en-US" dirty="0" err="1" smtClean="0"/>
+              <a:t>adjoints</a:t>
+            </a:r>
+            <a:r>
+              <a:rPr lang="en-US" dirty="0" smtClean="0"/>
+              <a:t> at VT consisted of (re)deriving the analytic adjoint equations for several </a:t>
+            </a:r>
+            <a:r>
+              <a:rPr lang="en-US" dirty="0" smtClean="0"/>
+              <a:t>systems, including general boundary conditions</a:t>
+            </a:r>
+            <a:endParaRPr lang="en-US" dirty="0" smtClean="0"/>
+          </a:p>
+          <a:p>
+            <a:pPr lvl="1"/>
+            <a:r>
+              <a:rPr lang="en-US" dirty="0" smtClean="0"/>
+              <a:t>Linear </a:t>
+            </a:r>
+            <a:r>
+              <a:rPr lang="en-US" dirty="0" smtClean="0"/>
+              <a:t>Advection</a:t>
+            </a:r>
+            <a:endParaRPr lang="en-US" dirty="0" smtClean="0"/>
+          </a:p>
+          <a:p>
+            <a:pPr lvl="1"/>
+            <a:r>
+              <a:rPr lang="en-US" dirty="0" smtClean="0"/>
+              <a:t>Burgers’ Equation</a:t>
+            </a:r>
+          </a:p>
+          <a:p>
+            <a:pPr lvl="1"/>
+            <a:r>
+              <a:rPr lang="en-US" dirty="0" smtClean="0"/>
+              <a:t>‘N’-D </a:t>
+            </a:r>
+            <a:r>
+              <a:rPr lang="en-US" dirty="0" smtClean="0"/>
+              <a:t>Euler Equations</a:t>
+            </a:r>
+          </a:p>
+        </p:txBody>
+      </p:sp>
+    </p:spTree>
+  </p:cSld>
+  <p:clrMapOvr>
+    <a:masterClrMapping/>
+  </p:clrMapOvr>
+</p:sld>
+</file>
+
+<file path=ppt/slides/slide3.xml><?xml version="1.0" encoding="utf-8"?>
+<p:sld xmlns:a="http://schemas.openxmlformats.org/drawingml/2006/main" xmlns:r="http://schemas.openxmlformats.org/officeDocument/2006/relationships" xmlns:p="http://schemas.openxmlformats.org/presentationml/2006/main">
+  <p:cSld>
+    <p:spTree>
+      <p:nvGrpSpPr>
+        <p:cNvPr id="1" name=""/>
+        <p:cNvGrpSpPr/>
+        <p:nvPr/>
+      </p:nvGrpSpPr>
+      <p:grpSpPr>
+        <a:xfrm>
+          <a:off x="0" y="0"/>
+          <a:ext cx="0" cy="0"/>
+          <a:chOff x="0" y="0"/>
+          <a:chExt cx="0" cy="0"/>
+        </a:xfrm>
+      </p:grpSpPr>
+      <p:sp>
+        <p:nvSpPr>
+          <p:cNvPr id="2" name="Title 1"/>
+          <p:cNvSpPr>
+            <a:spLocks noGrp="1"/>
+          </p:cNvSpPr>
+          <p:nvPr>
+            <p:ph type="title"/>
+          </p:nvPr>
+        </p:nvSpPr>
+        <p:spPr/>
+        <p:txBody>
+          <a:bodyPr/>
+          <a:lstStyle/>
+          <a:p>
+            <a:r>
+              <a:rPr lang="en-US" dirty="0" smtClean="0"/>
+              <a:t>Continuous Adjoint</a:t>
+            </a:r>
+            <a:endParaRPr lang="en-US" dirty="0"/>
+          </a:p>
+        </p:txBody>
+      </p:sp>
+      <p:sp>
+        <p:nvSpPr>
+          <p:cNvPr id="3" name="Content Placeholder 2"/>
+          <p:cNvSpPr>
+            <a:spLocks noGrp="1"/>
+          </p:cNvSpPr>
+          <p:nvPr>
+            <p:ph idx="1"/>
+          </p:nvPr>
+        </p:nvSpPr>
+        <p:spPr/>
+        <p:txBody>
+          <a:bodyPr/>
+          <a:lstStyle/>
+          <a:p>
+            <a:r>
+              <a:rPr lang="en-US" dirty="0" smtClean="0"/>
+              <a:t>The process of deriving the analytic adjoint was helpful for understanding </a:t>
+            </a:r>
+            <a:r>
+              <a:rPr lang="en-US" dirty="0" smtClean="0"/>
+              <a:t>what drives the adjoint solution and boundary </a:t>
+            </a:r>
+            <a:r>
+              <a:rPr lang="en-US" dirty="0" smtClean="0"/>
+              <a:t>conditions</a:t>
+            </a:r>
+          </a:p>
+          <a:p>
+            <a:r>
+              <a:rPr lang="en-US" dirty="0" smtClean="0"/>
+              <a:t>This being said, all future work will </a:t>
+            </a:r>
+            <a:r>
+              <a:rPr lang="en-US" dirty="0" smtClean="0"/>
+              <a:t>focus on </a:t>
+            </a:r>
+            <a:r>
+              <a:rPr lang="en-US" dirty="0" smtClean="0"/>
+              <a:t>discrete </a:t>
+            </a:r>
+            <a:r>
+              <a:rPr lang="en-US" dirty="0" err="1" smtClean="0"/>
+              <a:t>adjoints</a:t>
+            </a:r>
+            <a:endParaRPr lang="en-US" dirty="0" smtClean="0"/>
+          </a:p>
+          <a:p>
+            <a:pPr lvl="1"/>
+            <a:r>
+              <a:rPr lang="en-US" dirty="0" smtClean="0"/>
+              <a:t>E</a:t>
+            </a:r>
+            <a:r>
+              <a:rPr lang="en-US" dirty="0" smtClean="0"/>
+              <a:t>ncourages </a:t>
+            </a:r>
+            <a:r>
+              <a:rPr lang="en-US" dirty="0" smtClean="0"/>
+              <a:t>development of implicit </a:t>
+            </a:r>
+            <a:r>
+              <a:rPr lang="en-US" dirty="0" smtClean="0"/>
+              <a:t>methods</a:t>
+            </a:r>
+          </a:p>
+          <a:p>
+            <a:pPr lvl="1"/>
+            <a:r>
+              <a:rPr lang="en-US" dirty="0" smtClean="0"/>
+              <a:t>Easier to deal with boundary conditions</a:t>
+            </a:r>
+            <a:endParaRPr lang="en-US" dirty="0"/>
+          </a:p>
+        </p:txBody>
+      </p:sp>
+    </p:spTree>
+  </p:cSld>
+  <p:clrMapOvr>
+    <a:masterClrMapping/>
+  </p:clrMapOvr>
+</p:sld>
+</file>
+
+<file path=ppt/slides/slide4.xml><?xml version="1.0" encoding="utf-8"?>
+<p:sld xmlns:a="http://schemas.openxmlformats.org/drawingml/2006/main" xmlns:r="http://schemas.openxmlformats.org/officeDocument/2006/relationships" xmlns:p="http://schemas.openxmlformats.org/presentationml/2006/main">
+  <p:cSld>
+    <p:spTree>
+      <p:nvGrpSpPr>
+        <p:cNvPr id="1" name=""/>
+        <p:cNvGrpSpPr/>
+        <p:nvPr/>
+      </p:nvGrpSpPr>
+      <p:grpSpPr>
+        <a:xfrm>
+          <a:off x="0" y="0"/>
+          <a:ext cx="0" cy="0"/>
+          <a:chOff x="0" y="0"/>
+          <a:chExt cx="0" cy="0"/>
+        </a:xfrm>
+      </p:grpSpPr>
+      <p:sp>
+        <p:nvSpPr>
+          <p:cNvPr id="2" name="Title 1"/>
+          <p:cNvSpPr>
+            <a:spLocks noGrp="1"/>
+          </p:cNvSpPr>
+          <p:nvPr>
+            <p:ph type="title"/>
+          </p:nvPr>
+        </p:nvSpPr>
+        <p:spPr/>
+        <p:txBody>
+          <a:bodyPr/>
+          <a:lstStyle/>
+          <a:p>
+            <a:r>
+              <a:rPr lang="en-US" dirty="0" smtClean="0"/>
+              <a:t>Error Estimation and TE</a:t>
+            </a:r>
+            <a:endParaRPr lang="en-US" dirty="0"/>
+          </a:p>
+        </p:txBody>
+      </p:sp>
+      <p:sp>
+        <p:nvSpPr>
+          <p:cNvPr id="3" name="Content Placeholder 2"/>
+          <p:cNvSpPr>
+            <a:spLocks noGrp="1"/>
+          </p:cNvSpPr>
+          <p:nvPr>
+            <p:ph idx="1"/>
+          </p:nvPr>
+        </p:nvSpPr>
+        <p:spPr/>
+        <p:txBody>
+          <a:bodyPr>
+            <a:normAutofit/>
+          </a:bodyPr>
+          <a:lstStyle/>
+          <a:p>
+            <a:r>
+              <a:rPr lang="en-US" dirty="0" smtClean="0"/>
+              <a:t>I left </a:t>
+            </a:r>
+            <a:r>
+              <a:rPr lang="en-US" dirty="0" err="1" smtClean="0"/>
+              <a:t>LaRC</a:t>
+            </a:r>
+            <a:r>
+              <a:rPr lang="en-US" dirty="0" smtClean="0"/>
+              <a:t> last year with a lingering question about how each term in the </a:t>
+            </a:r>
+            <a:r>
+              <a:rPr lang="en-US" dirty="0" smtClean="0"/>
+              <a:t>adjoint </a:t>
+            </a:r>
+            <a:r>
+              <a:rPr lang="en-US" dirty="0" err="1" smtClean="0"/>
+              <a:t>Lagrangian</a:t>
+            </a:r>
+            <a:r>
+              <a:rPr lang="en-US" dirty="0" smtClean="0"/>
+              <a:t> </a:t>
+            </a:r>
+            <a:r>
+              <a:rPr lang="en-US" dirty="0" smtClean="0"/>
+              <a:t>equation </a:t>
+            </a:r>
+            <a:r>
+              <a:rPr lang="en-US" dirty="0" smtClean="0"/>
+              <a:t>related to the TE and </a:t>
+            </a:r>
+            <a:r>
+              <a:rPr lang="en-US" dirty="0" smtClean="0"/>
+              <a:t>DE</a:t>
+            </a:r>
+            <a:endParaRPr lang="en-US" dirty="0" smtClean="0"/>
+          </a:p>
+          <a:p>
+            <a:r>
+              <a:rPr lang="en-US" dirty="0" smtClean="0"/>
+              <a:t>Definitions</a:t>
+            </a:r>
+          </a:p>
+          <a:p>
+            <a:pPr lvl="1"/>
+            <a:r>
+              <a:rPr lang="en-US" dirty="0" smtClean="0"/>
+              <a:t>TE is the difference between the continuous and discrete </a:t>
+            </a:r>
+            <a:r>
+              <a:rPr lang="en-US" i="1" dirty="0" smtClean="0"/>
+              <a:t>Equations</a:t>
+            </a:r>
+            <a:r>
+              <a:rPr lang="en-US" dirty="0" smtClean="0"/>
+              <a:t> of Interest (EOI)</a:t>
+            </a:r>
+          </a:p>
+          <a:p>
+            <a:pPr lvl="1"/>
+            <a:r>
+              <a:rPr lang="en-US" dirty="0" smtClean="0"/>
+              <a:t>DE is the difference between the </a:t>
+            </a:r>
+            <a:r>
+              <a:rPr lang="en-US" i="1" dirty="0" smtClean="0"/>
+              <a:t>solutions</a:t>
+            </a:r>
+            <a:r>
+              <a:rPr lang="en-US" dirty="0" smtClean="0"/>
+              <a:t> of the continuous and discrete EOI</a:t>
+            </a:r>
+          </a:p>
+        </p:txBody>
+      </p:sp>
+    </p:spTree>
+  </p:cSld>
+  <p:clrMapOvr>
+    <a:masterClrMapping/>
+  </p:clrMapOvr>
+</p:sld>
+</file>
+
+<file path=ppt/slides/slide5.xml><?xml version="1.0" encoding="utf-8"?>
+<p:sld xmlns:a="http://schemas.openxmlformats.org/drawingml/2006/main" xmlns:r="http://schemas.openxmlformats.org/officeDocument/2006/relationships" xmlns:p="http://schemas.openxmlformats.org/presentationml/2006/main">
+  <p:cSld>
+    <p:spTree>
+      <p:nvGrpSpPr>
+        <p:cNvPr id="1" name=""/>
+        <p:cNvGrpSpPr/>
+        <p:nvPr/>
+      </p:nvGrpSpPr>
+      <p:grpSpPr>
+        <a:xfrm>
+          <a:off x="0" y="0"/>
+          <a:ext cx="0" cy="0"/>
+          <a:chOff x="0" y="0"/>
+          <a:chExt cx="0" cy="0"/>
+        </a:xfrm>
+      </p:grpSpPr>
+      <p:sp>
+        <p:nvSpPr>
+          <p:cNvPr id="2" name="Title 1"/>
+          <p:cNvSpPr>
+            <a:spLocks noGrp="1"/>
+          </p:cNvSpPr>
+          <p:nvPr>
+            <p:ph type="title"/>
+          </p:nvPr>
+        </p:nvSpPr>
+        <p:spPr/>
+        <p:txBody>
+          <a:bodyPr/>
+          <a:lstStyle/>
+          <a:p>
+            <a:r>
+              <a:rPr lang="en-US" dirty="0" smtClean="0"/>
               <a:t>Error Estimation and TE</a:t>
             </a:r>
             <a:endParaRPr lang="en-US" dirty="0"/>
@@ -3466,11 +4512,11 @@
           <a:p>
             <a:r>
               <a:rPr lang="en-US" dirty="0" smtClean="0"/>
-              <a:t>Working in continuous space, perform TSE’s about the governing equations and </a:t>
-            </a:r>
-            <a:r>
-              <a:rPr lang="en-US" dirty="0" smtClean="0"/>
-              <a:t>functional of interest</a:t>
+              <a:t>Working in continuous space, perform TSE’s about the governing equations and functional of </a:t>
+            </a:r>
+            <a:r>
+              <a:rPr lang="en-US" dirty="0" smtClean="0"/>
+              <a:t>interest:</a:t>
             </a:r>
             <a:endParaRPr lang="en-US" dirty="0" smtClean="0"/>
           </a:p>
@@ -3506,17 +4552,8 @@
             </a:pPr>
             <a:r>
               <a:rPr lang="en-US" dirty="0" smtClean="0"/>
-              <a:t>            *Note</a:t>
-            </a:r>
-            <a:r>
-              <a:rPr lang="en-US" dirty="0" smtClean="0"/>
-              <a:t>:</a:t>
-            </a:r>
-            <a:r>
-              <a:rPr lang="en-US" dirty="0" smtClean="0"/>
-              <a:t> inner products are implied*</a:t>
-            </a:r>
-            <a:endParaRPr lang="en-US" dirty="0" smtClean="0"/>
+              <a:t>            *Note: inner products are implied*</a:t>
+            </a:r>
           </a:p>
           <a:p>
             <a:endParaRPr lang="en-US" dirty="0"/>
@@ -3948,7 +4985,7 @@
 </p:sld>
 </file>
 
-<file path=ppt/slides/slide13.xml><?xml version="1.0" encoding="utf-8"?>
+<file path=ppt/slides/slide6.xml><?xml version="1.0" encoding="utf-8"?>
 <p:sld xmlns:a="http://schemas.openxmlformats.org/drawingml/2006/main" xmlns:r="http://schemas.openxmlformats.org/officeDocument/2006/relationships" xmlns:p="http://schemas.openxmlformats.org/presentationml/2006/main">
   <p:cSld>
     <p:spTree>
@@ -4013,7 +5050,15 @@
             </a:r>
             <a:r>
               <a:rPr lang="en-US" dirty="0" smtClean="0"/>
-              <a:t> is the a prolongation of the exact solution to a set of </a:t>
+              <a:t> </a:t>
+            </a:r>
+            <a:r>
+              <a:rPr lang="en-US" dirty="0" smtClean="0"/>
+              <a:t>is </a:t>
+            </a:r>
+            <a:r>
+              <a:rPr lang="en-US" dirty="0" smtClean="0"/>
+              <a:t>a prolongation of the exact solution to a set of </a:t>
             </a:r>
             <a:r>
               <a:rPr lang="en-US" dirty="0" err="1" smtClean="0"/>
@@ -4465,7 +5510,7 @@
 </p:sld>
 </file>
 
-<file path=ppt/slides/slide14.xml><?xml version="1.0" encoding="utf-8"?>
+<file path=ppt/slides/slide7.xml><?xml version="1.0" encoding="utf-8"?>
 <p:sld xmlns:a="http://schemas.openxmlformats.org/drawingml/2006/main" xmlns:r="http://schemas.openxmlformats.org/officeDocument/2006/relationships" xmlns:p="http://schemas.openxmlformats.org/presentationml/2006/main">
   <p:cSld>
     <p:spTree>
@@ -4534,7 +5579,6 @@
               <a:rPr lang="en-US" dirty="0" smtClean="0"/>
               <a:t>From this, the ‘correction term’ attempts to correct for TE and the adjoint solution removes DE from the functional estimate</a:t>
             </a:r>
-            <a:endParaRPr lang="en-US" dirty="0" smtClean="0"/>
           </a:p>
           <a:p>
             <a:r>
@@ -4548,17 +5592,12 @@
               <a:rPr lang="en-US" dirty="0" smtClean="0"/>
               <a:t>Error due to discrete vs. continuous functional</a:t>
             </a:r>
-            <a:endParaRPr lang="en-US" dirty="0" smtClean="0"/>
           </a:p>
           <a:p>
             <a:pPr lvl="1"/>
             <a:r>
               <a:rPr lang="en-US" dirty="0" smtClean="0"/>
-              <a:t>The </a:t>
-            </a:r>
-            <a:r>
-              <a:rPr lang="en-US" dirty="0" smtClean="0"/>
-              <a:t>above does not include error introduced by solving the adjoint equation discretely</a:t>
+              <a:t>The above does not include error introduced by solving the adjoint equation discretely</a:t>
             </a:r>
           </a:p>
           <a:p>
@@ -4614,1141 +5653,6 @@
 </p:sld>
 </file>
 
-<file path=ppt/slides/slide15.xml><?xml version="1.0" encoding="utf-8"?>
-<p:sld xmlns:a="http://schemas.openxmlformats.org/drawingml/2006/main" xmlns:r="http://schemas.openxmlformats.org/officeDocument/2006/relationships" xmlns:p="http://schemas.openxmlformats.org/presentationml/2006/main">
-  <p:cSld>
-    <p:spTree>
-      <p:nvGrpSpPr>
-        <p:cNvPr id="1" name=""/>
-        <p:cNvGrpSpPr/>
-        <p:nvPr/>
-      </p:nvGrpSpPr>
-      <p:grpSpPr>
-        <a:xfrm>
-          <a:off x="0" y="0"/>
-          <a:ext cx="0" cy="0"/>
-          <a:chOff x="0" y="0"/>
-          <a:chExt cx="0" cy="0"/>
-        </a:xfrm>
-      </p:grpSpPr>
-      <p:sp>
-        <p:nvSpPr>
-          <p:cNvPr id="2" name="Title 1"/>
-          <p:cNvSpPr>
-            <a:spLocks noGrp="1"/>
-          </p:cNvSpPr>
-          <p:nvPr>
-            <p:ph type="title"/>
-          </p:nvPr>
-        </p:nvSpPr>
-        <p:spPr/>
-        <p:txBody>
-          <a:bodyPr/>
-          <a:lstStyle/>
-          <a:p>
-            <a:r>
-              <a:rPr lang="en-US" dirty="0" smtClean="0"/>
-              <a:t>Adaptation and TE</a:t>
-            </a:r>
-            <a:endParaRPr lang="en-US" dirty="0"/>
-          </a:p>
-        </p:txBody>
-      </p:sp>
-      <p:sp>
-        <p:nvSpPr>
-          <p:cNvPr id="3" name="Content Placeholder 2"/>
-          <p:cNvSpPr>
-            <a:spLocks noGrp="1"/>
-          </p:cNvSpPr>
-          <p:nvPr>
-            <p:ph idx="1"/>
-          </p:nvPr>
-        </p:nvSpPr>
-        <p:spPr/>
-        <p:txBody>
-          <a:bodyPr/>
-          <a:lstStyle/>
-          <a:p>
-            <a:r>
-              <a:rPr lang="en-US" dirty="0" smtClean="0"/>
-              <a:t>As has been discusse</a:t>
-            </a:r>
-            <a:r>
-              <a:rPr lang="en-US" dirty="0" smtClean="0"/>
-              <a:t>d before, TE is the source of DE</a:t>
-            </a:r>
-          </a:p>
-          <a:p>
-            <a:r>
-              <a:rPr lang="en-US" dirty="0" smtClean="0"/>
-              <a:t>The </a:t>
-            </a:r>
-            <a:r>
-              <a:rPr lang="en-US" dirty="0" err="1" smtClean="0"/>
-              <a:t>Venditti</a:t>
-            </a:r>
-            <a:r>
-              <a:rPr lang="en-US" dirty="0" smtClean="0"/>
-              <a:t> adaptation approach targets a mixed inner product of DE and TE between the primal and dual problems</a:t>
-            </a:r>
-          </a:p>
-          <a:p>
-            <a:r>
-              <a:rPr lang="en-US" dirty="0" smtClean="0"/>
-              <a:t>This works well in a purely discreet world, but to close the gap between discreet and continuous the TE has to be reduced</a:t>
-            </a:r>
-            <a:endParaRPr lang="en-US" dirty="0"/>
-          </a:p>
-        </p:txBody>
-      </p:sp>
-    </p:spTree>
-  </p:cSld>
-  <p:clrMapOvr>
-    <a:masterClrMapping/>
-  </p:clrMapOvr>
-</p:sld>
-</file>
-
-<file path=ppt/slides/slide16.xml><?xml version="1.0" encoding="utf-8"?>
-<p:sld xmlns:a="http://schemas.openxmlformats.org/drawingml/2006/main" xmlns:r="http://schemas.openxmlformats.org/officeDocument/2006/relationships" xmlns:p="http://schemas.openxmlformats.org/presentationml/2006/main">
-  <p:cSld>
-    <p:spTree>
-      <p:nvGrpSpPr>
-        <p:cNvPr id="1" name=""/>
-        <p:cNvGrpSpPr/>
-        <p:nvPr/>
-      </p:nvGrpSpPr>
-      <p:grpSpPr>
-        <a:xfrm>
-          <a:off x="0" y="0"/>
-          <a:ext cx="0" cy="0"/>
-          <a:chOff x="0" y="0"/>
-          <a:chExt cx="0" cy="0"/>
-        </a:xfrm>
-      </p:grpSpPr>
-      <p:sp>
-        <p:nvSpPr>
-          <p:cNvPr id="2" name="Title 1"/>
-          <p:cNvSpPr>
-            <a:spLocks noGrp="1"/>
-          </p:cNvSpPr>
-          <p:nvPr>
-            <p:ph type="title"/>
-          </p:nvPr>
-        </p:nvSpPr>
-        <p:spPr/>
-        <p:txBody>
-          <a:bodyPr/>
-          <a:lstStyle/>
-          <a:p>
-            <a:r>
-              <a:rPr lang="en-US" dirty="0" smtClean="0"/>
-              <a:t>Work at </a:t>
-            </a:r>
-            <a:r>
-              <a:rPr lang="en-US" dirty="0" err="1" smtClean="0"/>
-              <a:t>LaRC</a:t>
-            </a:r>
-            <a:endParaRPr lang="en-US" dirty="0"/>
-          </a:p>
-        </p:txBody>
-      </p:sp>
-      <p:sp>
-        <p:nvSpPr>
-          <p:cNvPr id="3" name="Content Placeholder 2"/>
-          <p:cNvSpPr>
-            <a:spLocks noGrp="1"/>
-          </p:cNvSpPr>
-          <p:nvPr>
-            <p:ph idx="1"/>
-          </p:nvPr>
-        </p:nvSpPr>
-        <p:spPr/>
-        <p:txBody>
-          <a:bodyPr>
-            <a:normAutofit lnSpcReduction="10000"/>
-          </a:bodyPr>
-          <a:lstStyle/>
-          <a:p>
-            <a:r>
-              <a:rPr lang="en-US" dirty="0" smtClean="0"/>
-              <a:t>Continue work on relationship between adjoint methods and other error estimation/adaptation techniques</a:t>
-            </a:r>
-          </a:p>
-          <a:p>
-            <a:r>
-              <a:rPr lang="en-US" dirty="0" smtClean="0"/>
-              <a:t>Finalize 1D Burgers’, Quasi-1D nozzle and 2D Burgers’ codes with implicit formulations</a:t>
-            </a:r>
-          </a:p>
-          <a:p>
-            <a:pPr lvl="1"/>
-            <a:r>
-              <a:rPr lang="en-US" dirty="0" smtClean="0"/>
-              <a:t>Testing ground for SENSEI</a:t>
-            </a:r>
-          </a:p>
-          <a:p>
-            <a:r>
-              <a:rPr lang="en-US" dirty="0" smtClean="0"/>
-              <a:t>Investigate TE as a functional where the approximate form is known</a:t>
-            </a:r>
-          </a:p>
-          <a:p>
-            <a:pPr lvl="1"/>
-            <a:r>
-              <a:rPr lang="en-US" dirty="0" smtClean="0"/>
-              <a:t>Proof of concept work</a:t>
-            </a:r>
-          </a:p>
-          <a:p>
-            <a:endParaRPr lang="en-US" dirty="0" smtClean="0"/>
-          </a:p>
-        </p:txBody>
-      </p:sp>
-    </p:spTree>
-  </p:cSld>
-  <p:clrMapOvr>
-    <a:masterClrMapping/>
-  </p:clrMapOvr>
-</p:sld>
-</file>
-
-<file path=ppt/slides/slide17.xml><?xml version="1.0" encoding="utf-8"?>
-<p:sld xmlns:a="http://schemas.openxmlformats.org/drawingml/2006/main" xmlns:r="http://schemas.openxmlformats.org/officeDocument/2006/relationships" xmlns:p="http://schemas.openxmlformats.org/presentationml/2006/main">
-  <p:cSld>
-    <p:spTree>
-      <p:nvGrpSpPr>
-        <p:cNvPr id="1" name=""/>
-        <p:cNvGrpSpPr/>
-        <p:nvPr/>
-      </p:nvGrpSpPr>
-      <p:grpSpPr>
-        <a:xfrm>
-          <a:off x="0" y="0"/>
-          <a:ext cx="0" cy="0"/>
-          <a:chOff x="0" y="0"/>
-          <a:chExt cx="0" cy="0"/>
-        </a:xfrm>
-      </p:grpSpPr>
-      <p:sp>
-        <p:nvSpPr>
-          <p:cNvPr id="2" name="Title 1"/>
-          <p:cNvSpPr>
-            <a:spLocks noGrp="1"/>
-          </p:cNvSpPr>
-          <p:nvPr>
-            <p:ph type="title"/>
-          </p:nvPr>
-        </p:nvSpPr>
-        <p:spPr/>
-        <p:txBody>
-          <a:bodyPr/>
-          <a:lstStyle/>
-          <a:p>
-            <a:r>
-              <a:rPr lang="en-US" dirty="0" smtClean="0"/>
-              <a:t>Work at </a:t>
-            </a:r>
-            <a:r>
-              <a:rPr lang="en-US" dirty="0" err="1" smtClean="0"/>
-              <a:t>LaRC</a:t>
-            </a:r>
-            <a:endParaRPr lang="en-US" dirty="0"/>
-          </a:p>
-        </p:txBody>
-      </p:sp>
-      <p:sp>
-        <p:nvSpPr>
-          <p:cNvPr id="3" name="Content Placeholder 2"/>
-          <p:cNvSpPr>
-            <a:spLocks noGrp="1"/>
-          </p:cNvSpPr>
-          <p:nvPr>
-            <p:ph idx="1"/>
-          </p:nvPr>
-        </p:nvSpPr>
-        <p:spPr/>
-        <p:txBody>
-          <a:bodyPr/>
-          <a:lstStyle/>
-          <a:p>
-            <a:r>
-              <a:rPr lang="en-US" dirty="0" smtClean="0"/>
-              <a:t>Complete Hessian write-up</a:t>
-            </a:r>
-          </a:p>
-          <a:p>
-            <a:pPr lvl="1"/>
-            <a:r>
-              <a:rPr lang="en-US" dirty="0" smtClean="0"/>
-              <a:t>Possible link to Hessians in adjoint formulation?</a:t>
-            </a:r>
-          </a:p>
-          <a:p>
-            <a:r>
-              <a:rPr lang="en-US" dirty="0" smtClean="0"/>
-              <a:t>Continue work with entropy adjoint</a:t>
-            </a:r>
-            <a:endParaRPr lang="en-US" dirty="0"/>
-          </a:p>
-        </p:txBody>
-      </p:sp>
-    </p:spTree>
-  </p:cSld>
-  <p:clrMapOvr>
-    <a:masterClrMapping/>
-  </p:clrMapOvr>
-</p:sld>
-</file>
-
-<file path=ppt/slides/slide2.xml><?xml version="1.0" encoding="utf-8"?>
-<p:sld xmlns:a="http://schemas.openxmlformats.org/drawingml/2006/main" xmlns:r="http://schemas.openxmlformats.org/officeDocument/2006/relationships" xmlns:p="http://schemas.openxmlformats.org/presentationml/2006/main">
-  <p:cSld>
-    <p:spTree>
-      <p:nvGrpSpPr>
-        <p:cNvPr id="1" name=""/>
-        <p:cNvGrpSpPr/>
-        <p:nvPr/>
-      </p:nvGrpSpPr>
-      <p:grpSpPr>
-        <a:xfrm>
-          <a:off x="0" y="0"/>
-          <a:ext cx="0" cy="0"/>
-          <a:chOff x="0" y="0"/>
-          <a:chExt cx="0" cy="0"/>
-        </a:xfrm>
-      </p:grpSpPr>
-      <p:sp>
-        <p:nvSpPr>
-          <p:cNvPr id="2" name="Title 1"/>
-          <p:cNvSpPr>
-            <a:spLocks noGrp="1"/>
-          </p:cNvSpPr>
-          <p:nvPr>
-            <p:ph type="title"/>
-          </p:nvPr>
-        </p:nvSpPr>
-        <p:spPr/>
-        <p:txBody>
-          <a:bodyPr/>
-          <a:lstStyle/>
-          <a:p>
-            <a:r>
-              <a:rPr lang="en-US" dirty="0" smtClean="0"/>
-              <a:t>Background</a:t>
-            </a:r>
-            <a:endParaRPr lang="en-US" dirty="0"/>
-          </a:p>
-        </p:txBody>
-      </p:sp>
-      <p:sp>
-        <p:nvSpPr>
-          <p:cNvPr id="3" name="Content Placeholder 2"/>
-          <p:cNvSpPr>
-            <a:spLocks noGrp="1"/>
-          </p:cNvSpPr>
-          <p:nvPr>
-            <p:ph idx="1"/>
-          </p:nvPr>
-        </p:nvSpPr>
-        <p:spPr/>
-        <p:txBody>
-          <a:bodyPr/>
-          <a:lstStyle/>
-          <a:p>
-            <a:r>
-              <a:rPr lang="en-US" dirty="0" smtClean="0"/>
-              <a:t>VT AOE CFD research group only has a few programmers</a:t>
-            </a:r>
-          </a:p>
-          <a:p>
-            <a:pPr lvl="1"/>
-            <a:r>
-              <a:rPr lang="en-US" dirty="0" smtClean="0"/>
-              <a:t>None with any formal Fortran training</a:t>
-            </a:r>
-          </a:p>
-          <a:p>
-            <a:r>
-              <a:rPr lang="en-US" dirty="0" smtClean="0"/>
-              <a:t>Code development split between Windows and Linux with Subversion VCS</a:t>
-            </a:r>
-          </a:p>
-          <a:p>
-            <a:r>
-              <a:rPr lang="en-US" dirty="0" smtClean="0"/>
-              <a:t>Normal assortment of </a:t>
-            </a:r>
-            <a:r>
-              <a:rPr lang="en-US" dirty="0" smtClean="0"/>
-              <a:t>simple test </a:t>
-            </a:r>
-            <a:r>
-              <a:rPr lang="en-US" dirty="0" smtClean="0"/>
-              <a:t>codes</a:t>
-            </a:r>
-          </a:p>
-          <a:p>
-            <a:r>
-              <a:rPr lang="en-US" dirty="0" smtClean="0"/>
-              <a:t>In-house code SENSEI</a:t>
-            </a:r>
-          </a:p>
-          <a:p>
-            <a:endParaRPr lang="en-US" dirty="0"/>
-          </a:p>
-        </p:txBody>
-      </p:sp>
-    </p:spTree>
-  </p:cSld>
-  <p:clrMapOvr>
-    <a:masterClrMapping/>
-  </p:clrMapOvr>
-</p:sld>
-</file>
-
-<file path=ppt/slides/slide3.xml><?xml version="1.0" encoding="utf-8"?>
-<p:sld xmlns:a="http://schemas.openxmlformats.org/drawingml/2006/main" xmlns:r="http://schemas.openxmlformats.org/officeDocument/2006/relationships" xmlns:p="http://schemas.openxmlformats.org/presentationml/2006/main">
-  <p:cSld>
-    <p:spTree>
-      <p:nvGrpSpPr>
-        <p:cNvPr id="1" name=""/>
-        <p:cNvGrpSpPr/>
-        <p:nvPr/>
-      </p:nvGrpSpPr>
-      <p:grpSpPr>
-        <a:xfrm>
-          <a:off x="0" y="0"/>
-          <a:ext cx="0" cy="0"/>
-          <a:chOff x="0" y="0"/>
-          <a:chExt cx="0" cy="0"/>
-        </a:xfrm>
-      </p:grpSpPr>
-      <p:sp>
-        <p:nvSpPr>
-          <p:cNvPr id="2" name="Title 1"/>
-          <p:cNvSpPr>
-            <a:spLocks noGrp="1"/>
-          </p:cNvSpPr>
-          <p:nvPr>
-            <p:ph type="title"/>
-          </p:nvPr>
-        </p:nvSpPr>
-        <p:spPr/>
-        <p:txBody>
-          <a:bodyPr/>
-          <a:lstStyle/>
-          <a:p>
-            <a:r>
-              <a:rPr lang="en-US" dirty="0" smtClean="0"/>
-              <a:t>Code Development</a:t>
-            </a:r>
-            <a:endParaRPr lang="en-US" dirty="0"/>
-          </a:p>
-        </p:txBody>
-      </p:sp>
-      <p:sp>
-        <p:nvSpPr>
-          <p:cNvPr id="3" name="Content Placeholder 2"/>
-          <p:cNvSpPr>
-            <a:spLocks noGrp="1"/>
-          </p:cNvSpPr>
-          <p:nvPr>
-            <p:ph idx="1"/>
-          </p:nvPr>
-        </p:nvSpPr>
-        <p:spPr/>
-        <p:txBody>
-          <a:bodyPr>
-            <a:normAutofit lnSpcReduction="10000"/>
-          </a:bodyPr>
-          <a:lstStyle/>
-          <a:p>
-            <a:r>
-              <a:rPr lang="en-US" dirty="0" smtClean="0"/>
-              <a:t>Students with </a:t>
-            </a:r>
-            <a:r>
-              <a:rPr lang="en-US" dirty="0" smtClean="0"/>
-              <a:t>no formal </a:t>
-            </a:r>
-            <a:r>
-              <a:rPr lang="en-US" dirty="0" smtClean="0"/>
-              <a:t>training = obfuscated code</a:t>
-            </a:r>
-            <a:endParaRPr lang="en-US" dirty="0" smtClean="0"/>
-          </a:p>
-          <a:p>
-            <a:pPr lvl="1"/>
-            <a:r>
-              <a:rPr lang="en-US" dirty="0" smtClean="0"/>
-              <a:t>Modules were used as common blocks</a:t>
-            </a:r>
-          </a:p>
-          <a:p>
-            <a:pPr lvl="1"/>
-            <a:r>
-              <a:rPr lang="en-US" dirty="0" smtClean="0"/>
-              <a:t>Copy and paste between programs</a:t>
-            </a:r>
-          </a:p>
-          <a:p>
-            <a:pPr lvl="1"/>
-            <a:r>
-              <a:rPr lang="en-US" dirty="0" smtClean="0"/>
-              <a:t>Difficult code to work with </a:t>
-            </a:r>
-            <a:r>
-              <a:rPr lang="en-US" dirty="0" smtClean="0"/>
-              <a:t>simply due to different styles</a:t>
-            </a:r>
-            <a:endParaRPr lang="en-US" dirty="0" smtClean="0"/>
-          </a:p>
-          <a:p>
-            <a:r>
-              <a:rPr lang="en-US" dirty="0" smtClean="0"/>
-              <a:t>Rewrote a simple 1D code as an example</a:t>
-            </a:r>
-          </a:p>
-          <a:p>
-            <a:pPr lvl="1"/>
-            <a:r>
-              <a:rPr lang="en-US" dirty="0" smtClean="0"/>
-              <a:t>Design order accurate, but had bugs that hurt </a:t>
-            </a:r>
-            <a:r>
-              <a:rPr lang="en-US" dirty="0" smtClean="0"/>
-              <a:t>performance</a:t>
-            </a:r>
-            <a:endParaRPr lang="en-US" dirty="0" smtClean="0"/>
-          </a:p>
-        </p:txBody>
-      </p:sp>
-    </p:spTree>
-  </p:cSld>
-  <p:clrMapOvr>
-    <a:masterClrMapping/>
-  </p:clrMapOvr>
-</p:sld>
-</file>
-
-<file path=ppt/slides/slide4.xml><?xml version="1.0" encoding="utf-8"?>
-<p:sld xmlns:a="http://schemas.openxmlformats.org/drawingml/2006/main" xmlns:r="http://schemas.openxmlformats.org/officeDocument/2006/relationships" xmlns:p="http://schemas.openxmlformats.org/presentationml/2006/main">
-  <p:cSld>
-    <p:spTree>
-      <p:nvGrpSpPr>
-        <p:cNvPr id="1" name=""/>
-        <p:cNvGrpSpPr/>
-        <p:nvPr/>
-      </p:nvGrpSpPr>
-      <p:grpSpPr>
-        <a:xfrm>
-          <a:off x="0" y="0"/>
-          <a:ext cx="0" cy="0"/>
-          <a:chOff x="0" y="0"/>
-          <a:chExt cx="0" cy="0"/>
-        </a:xfrm>
-      </p:grpSpPr>
-      <p:sp>
-        <p:nvSpPr>
-          <p:cNvPr id="2" name="Title 1"/>
-          <p:cNvSpPr>
-            <a:spLocks noGrp="1"/>
-          </p:cNvSpPr>
-          <p:nvPr>
-            <p:ph type="title"/>
-          </p:nvPr>
-        </p:nvSpPr>
-        <p:spPr/>
-        <p:txBody>
-          <a:bodyPr/>
-          <a:lstStyle/>
-          <a:p>
-            <a:r>
-              <a:rPr lang="en-US" dirty="0" smtClean="0"/>
-              <a:t>Code Development</a:t>
-            </a:r>
-            <a:endParaRPr lang="en-US" dirty="0"/>
-          </a:p>
-        </p:txBody>
-      </p:sp>
-      <p:sp>
-        <p:nvSpPr>
-          <p:cNvPr id="3" name="Content Placeholder 2"/>
-          <p:cNvSpPr>
-            <a:spLocks noGrp="1"/>
-          </p:cNvSpPr>
-          <p:nvPr>
-            <p:ph idx="1"/>
-          </p:nvPr>
-        </p:nvSpPr>
-        <p:spPr/>
-        <p:txBody>
-          <a:bodyPr>
-            <a:normAutofit fontScale="92500"/>
-          </a:bodyPr>
-          <a:lstStyle/>
-          <a:p>
-            <a:r>
-              <a:rPr lang="en-US" dirty="0" smtClean="0"/>
-              <a:t>S</a:t>
-            </a:r>
-            <a:r>
-              <a:rPr lang="en-US" dirty="0" smtClean="0"/>
-              <a:t>purred </a:t>
-            </a:r>
-            <a:r>
-              <a:rPr lang="en-US" dirty="0" smtClean="0"/>
-              <a:t>the use of programming tools</a:t>
-            </a:r>
-          </a:p>
-          <a:p>
-            <a:pPr lvl="1"/>
-            <a:r>
-              <a:rPr lang="en-US" dirty="0" smtClean="0"/>
-              <a:t>Split code up and use </a:t>
-            </a:r>
-            <a:r>
-              <a:rPr lang="en-US" dirty="0" err="1" smtClean="0"/>
-              <a:t>makefiles</a:t>
-            </a:r>
-            <a:endParaRPr lang="en-US" dirty="0"/>
-          </a:p>
-          <a:p>
-            <a:pPr lvl="1"/>
-            <a:r>
-              <a:rPr lang="en-US" dirty="0" smtClean="0"/>
-              <a:t>Unit test code</a:t>
-            </a:r>
-          </a:p>
-          <a:p>
-            <a:pPr lvl="1"/>
-            <a:r>
-              <a:rPr lang="en-US" dirty="0" smtClean="0"/>
-              <a:t>Profile code using </a:t>
-            </a:r>
-            <a:r>
-              <a:rPr lang="en-US" dirty="0" err="1" smtClean="0"/>
-              <a:t>gprof</a:t>
-            </a:r>
-            <a:endParaRPr lang="en-US" dirty="0" smtClean="0"/>
-          </a:p>
-          <a:p>
-            <a:r>
-              <a:rPr lang="en-US" dirty="0" smtClean="0"/>
-              <a:t>Changed programming paradigms</a:t>
-            </a:r>
-          </a:p>
-          <a:p>
-            <a:pPr lvl="1"/>
-            <a:r>
-              <a:rPr lang="en-US" dirty="0" smtClean="0"/>
-              <a:t>Pass data </a:t>
-            </a:r>
-            <a:r>
-              <a:rPr lang="en-US" dirty="0" smtClean="0"/>
-              <a:t>(especially arrays) to </a:t>
-            </a:r>
-            <a:r>
-              <a:rPr lang="en-US" dirty="0" smtClean="0"/>
-              <a:t>routines as arguments</a:t>
-            </a:r>
-          </a:p>
-          <a:p>
-            <a:pPr lvl="1"/>
-            <a:r>
-              <a:rPr lang="en-US" dirty="0" smtClean="0"/>
-              <a:t>Use</a:t>
-            </a:r>
-            <a:r>
-              <a:rPr lang="en-US" dirty="0" smtClean="0"/>
-              <a:t> </a:t>
-            </a:r>
-            <a:r>
-              <a:rPr lang="en-US" dirty="0" smtClean="0"/>
-              <a:t>‘use </a:t>
-            </a:r>
-            <a:r>
-              <a:rPr lang="en-US" dirty="0" smtClean="0"/>
-              <a:t>module, only:*’ statements instead of COMMON blocks</a:t>
-            </a:r>
-            <a:endParaRPr lang="en-US" dirty="0" smtClean="0"/>
-          </a:p>
-          <a:p>
-            <a:pPr lvl="1"/>
-            <a:r>
-              <a:rPr lang="en-US" dirty="0" smtClean="0"/>
-              <a:t>Derived types for logical data </a:t>
-            </a:r>
-            <a:r>
-              <a:rPr lang="en-US" dirty="0" smtClean="0"/>
-              <a:t>structures</a:t>
-            </a:r>
-            <a:endParaRPr lang="en-US" dirty="0" smtClean="0"/>
-          </a:p>
-        </p:txBody>
-      </p:sp>
-    </p:spTree>
-  </p:cSld>
-  <p:clrMapOvr>
-    <a:masterClrMapping/>
-  </p:clrMapOvr>
-</p:sld>
-</file>
-
-<file path=ppt/slides/slide5.xml><?xml version="1.0" encoding="utf-8"?>
-<p:sld xmlns:a="http://schemas.openxmlformats.org/drawingml/2006/main" xmlns:r="http://schemas.openxmlformats.org/officeDocument/2006/relationships" xmlns:p="http://schemas.openxmlformats.org/presentationml/2006/main">
-  <p:cSld>
-    <p:spTree>
-      <p:nvGrpSpPr>
-        <p:cNvPr id="1" name=""/>
-        <p:cNvGrpSpPr/>
-        <p:nvPr/>
-      </p:nvGrpSpPr>
-      <p:grpSpPr>
-        <a:xfrm>
-          <a:off x="0" y="0"/>
-          <a:ext cx="0" cy="0"/>
-          <a:chOff x="0" y="0"/>
-          <a:chExt cx="0" cy="0"/>
-        </a:xfrm>
-      </p:grpSpPr>
-      <p:sp>
-        <p:nvSpPr>
-          <p:cNvPr id="2" name="Title 1"/>
-          <p:cNvSpPr>
-            <a:spLocks noGrp="1"/>
-          </p:cNvSpPr>
-          <p:nvPr>
-            <p:ph type="title"/>
-          </p:nvPr>
-        </p:nvSpPr>
-        <p:spPr/>
-        <p:txBody>
-          <a:bodyPr/>
-          <a:lstStyle/>
-          <a:p>
-            <a:r>
-              <a:rPr lang="en-US" dirty="0" smtClean="0"/>
-              <a:t>Code Development</a:t>
-            </a:r>
-            <a:endParaRPr lang="en-US" dirty="0"/>
-          </a:p>
-        </p:txBody>
-      </p:sp>
-      <p:sp>
-        <p:nvSpPr>
-          <p:cNvPr id="3" name="Content Placeholder 2"/>
-          <p:cNvSpPr>
-            <a:spLocks noGrp="1"/>
-          </p:cNvSpPr>
-          <p:nvPr>
-            <p:ph idx="1"/>
-          </p:nvPr>
-        </p:nvSpPr>
-        <p:spPr/>
-        <p:txBody>
-          <a:bodyPr>
-            <a:normAutofit fontScale="77500" lnSpcReduction="20000"/>
-          </a:bodyPr>
-          <a:lstStyle/>
-          <a:p>
-            <a:r>
-              <a:rPr lang="en-US" dirty="0" smtClean="0"/>
-              <a:t>Refactoring </a:t>
-            </a:r>
-            <a:r>
-              <a:rPr lang="en-US" dirty="0" smtClean="0"/>
-              <a:t>the </a:t>
-            </a:r>
-            <a:r>
-              <a:rPr lang="en-US" dirty="0" smtClean="0"/>
-              <a:t>1D code took longer than expected</a:t>
-            </a:r>
-          </a:p>
-          <a:p>
-            <a:pPr lvl="1"/>
-            <a:r>
-              <a:rPr lang="en-US" dirty="0" smtClean="0"/>
-              <a:t>Difficult to follow logic/data </a:t>
-            </a:r>
-            <a:r>
-              <a:rPr lang="en-US" dirty="0" smtClean="0"/>
-              <a:t>flow because of modules as COMMON</a:t>
-            </a:r>
-            <a:endParaRPr lang="en-US" dirty="0" smtClean="0"/>
-          </a:p>
-          <a:p>
-            <a:pPr lvl="1"/>
-            <a:r>
-              <a:rPr lang="en-US" dirty="0" smtClean="0"/>
-              <a:t>Variables such as I and J defined as </a:t>
-            </a:r>
-            <a:r>
-              <a:rPr lang="en-US" dirty="0" smtClean="0"/>
-              <a:t>common (pet </a:t>
-            </a:r>
-            <a:r>
-              <a:rPr lang="en-US" dirty="0" err="1" smtClean="0"/>
-              <a:t>peave</a:t>
-            </a:r>
-            <a:r>
-              <a:rPr lang="en-US" dirty="0" smtClean="0"/>
-              <a:t>)</a:t>
-            </a:r>
-            <a:endParaRPr lang="en-US" dirty="0" smtClean="0"/>
-          </a:p>
-          <a:p>
-            <a:r>
-              <a:rPr lang="en-US" dirty="0" smtClean="0"/>
-              <a:t>Separated the code into </a:t>
-            </a:r>
-            <a:r>
-              <a:rPr lang="en-US" dirty="0" smtClean="0"/>
-              <a:t>files based on logical </a:t>
-            </a:r>
-            <a:r>
-              <a:rPr lang="en-US" dirty="0" smtClean="0"/>
-              <a:t>components</a:t>
-            </a:r>
-          </a:p>
-          <a:p>
-            <a:pPr lvl="1"/>
-            <a:r>
-              <a:rPr lang="en-US" dirty="0" smtClean="0"/>
-              <a:t>Asking ‘How do I make this testable?’ really helped</a:t>
-            </a:r>
-          </a:p>
-          <a:p>
-            <a:r>
-              <a:rPr lang="en-US" dirty="0" smtClean="0"/>
-              <a:t>Code review with peers once refactoring was complete</a:t>
-            </a:r>
-          </a:p>
-          <a:p>
-            <a:pPr lvl="1"/>
-            <a:r>
-              <a:rPr lang="en-US" dirty="0" smtClean="0"/>
-              <a:t>The code </a:t>
-            </a:r>
-            <a:r>
-              <a:rPr lang="en-US" dirty="0" smtClean="0"/>
-              <a:t>works and is faster, </a:t>
-            </a:r>
-            <a:r>
-              <a:rPr lang="en-US" dirty="0" smtClean="0"/>
-              <a:t>but what else is </a:t>
-            </a:r>
-            <a:r>
-              <a:rPr lang="en-US" dirty="0" smtClean="0"/>
-              <a:t>possible and what is needed for the future?</a:t>
-            </a:r>
-            <a:endParaRPr lang="en-US" dirty="0" smtClean="0"/>
-          </a:p>
-          <a:p>
-            <a:pPr lvl="1"/>
-            <a:r>
-              <a:rPr lang="en-US" dirty="0" smtClean="0"/>
-              <a:t>This discussion led to a decision on how future codes should be developed</a:t>
-            </a:r>
-          </a:p>
-          <a:p>
-            <a:pPr lvl="1"/>
-            <a:r>
-              <a:rPr lang="en-US" dirty="0" smtClean="0"/>
-              <a:t>End result was a modular code with a well defined purpose that </a:t>
-            </a:r>
-            <a:r>
-              <a:rPr lang="en-US" dirty="0" smtClean="0"/>
-              <a:t>is paired</a:t>
-            </a:r>
-            <a:r>
-              <a:rPr lang="en-US" dirty="0" smtClean="0"/>
-              <a:t> </a:t>
-            </a:r>
-            <a:r>
-              <a:rPr lang="en-US" dirty="0" smtClean="0"/>
-              <a:t>with other codes (adjoint, adaptation, etc) </a:t>
-            </a:r>
-            <a:r>
-              <a:rPr lang="en-US" dirty="0" smtClean="0"/>
-              <a:t>so each student can accomplish his work from the same code base</a:t>
-            </a:r>
-            <a:endParaRPr lang="en-US" dirty="0"/>
-          </a:p>
-        </p:txBody>
-      </p:sp>
-    </p:spTree>
-  </p:cSld>
-  <p:clrMapOvr>
-    <a:masterClrMapping/>
-  </p:clrMapOvr>
-</p:sld>
-</file>
-
-<file path=ppt/slides/slide6.xml><?xml version="1.0" encoding="utf-8"?>
-<p:sld xmlns:a="http://schemas.openxmlformats.org/drawingml/2006/main" xmlns:r="http://schemas.openxmlformats.org/officeDocument/2006/relationships" xmlns:p="http://schemas.openxmlformats.org/presentationml/2006/main">
-  <p:cSld>
-    <p:spTree>
-      <p:nvGrpSpPr>
-        <p:cNvPr id="1" name=""/>
-        <p:cNvGrpSpPr/>
-        <p:nvPr/>
-      </p:nvGrpSpPr>
-      <p:grpSpPr>
-        <a:xfrm>
-          <a:off x="0" y="0"/>
-          <a:ext cx="0" cy="0"/>
-          <a:chOff x="0" y="0"/>
-          <a:chExt cx="0" cy="0"/>
-        </a:xfrm>
-      </p:grpSpPr>
-      <p:sp>
-        <p:nvSpPr>
-          <p:cNvPr id="2" name="Title 1"/>
-          <p:cNvSpPr>
-            <a:spLocks noGrp="1"/>
-          </p:cNvSpPr>
-          <p:nvPr>
-            <p:ph type="title"/>
-          </p:nvPr>
-        </p:nvSpPr>
-        <p:spPr/>
-        <p:txBody>
-          <a:bodyPr/>
-          <a:lstStyle/>
-          <a:p>
-            <a:r>
-              <a:rPr lang="en-US" dirty="0" smtClean="0"/>
-              <a:t>Code Development</a:t>
-            </a:r>
-            <a:endParaRPr lang="en-US" dirty="0"/>
-          </a:p>
-        </p:txBody>
-      </p:sp>
-      <p:sp>
-        <p:nvSpPr>
-          <p:cNvPr id="3" name="Content Placeholder 2"/>
-          <p:cNvSpPr>
-            <a:spLocks noGrp="1"/>
-          </p:cNvSpPr>
-          <p:nvPr>
-            <p:ph idx="1"/>
-          </p:nvPr>
-        </p:nvSpPr>
-        <p:spPr/>
-        <p:txBody>
-          <a:bodyPr>
-            <a:normAutofit fontScale="77500" lnSpcReduction="20000"/>
-          </a:bodyPr>
-          <a:lstStyle/>
-          <a:p>
-            <a:r>
-              <a:rPr lang="en-US" dirty="0" smtClean="0"/>
-              <a:t>Unit Testing</a:t>
-            </a:r>
-          </a:p>
-          <a:p>
-            <a:pPr lvl="1"/>
-            <a:r>
-              <a:rPr lang="en-US" dirty="0" smtClean="0"/>
-              <a:t>Taught a class period for a CFD course on unit testing and how it affects code development</a:t>
-            </a:r>
-          </a:p>
-          <a:p>
-            <a:pPr lvl="1"/>
-            <a:r>
-              <a:rPr lang="en-US" dirty="0" smtClean="0"/>
-              <a:t>By the end of the semester, the students I talked to wished that they had done more unit testing</a:t>
-            </a:r>
-          </a:p>
-          <a:p>
-            <a:r>
-              <a:rPr lang="en-US" dirty="0" smtClean="0"/>
-              <a:t>Code Profiling</a:t>
-            </a:r>
-          </a:p>
-          <a:p>
-            <a:pPr lvl="1"/>
-            <a:r>
-              <a:rPr lang="en-US" dirty="0" smtClean="0"/>
-              <a:t>Using </a:t>
-            </a:r>
-            <a:r>
-              <a:rPr lang="en-US" dirty="0" err="1" smtClean="0"/>
-              <a:t>gprof</a:t>
-            </a:r>
-            <a:r>
-              <a:rPr lang="en-US" dirty="0" smtClean="0"/>
-              <a:t> I was able to demonstrate how to find bugs in a code, such as a ‘:’ where ‘</a:t>
-            </a:r>
-            <a:r>
-              <a:rPr lang="en-US" dirty="0" err="1" smtClean="0"/>
-              <a:t>i</a:t>
-            </a:r>
-            <a:r>
-              <a:rPr lang="en-US" dirty="0" smtClean="0"/>
-              <a:t>’ was intended</a:t>
-            </a:r>
-          </a:p>
-          <a:p>
-            <a:pPr lvl="1"/>
-            <a:r>
-              <a:rPr lang="en-US" dirty="0" smtClean="0"/>
-              <a:t>Overall result, the 1D code I rewrote runs in milliseconds compared to tens of seconds</a:t>
-            </a:r>
-          </a:p>
-          <a:p>
-            <a:r>
-              <a:rPr lang="en-US" dirty="0" smtClean="0"/>
-              <a:t>Both of these are simple ideas/concepts/tools that weren’t being used and had a huge impact on productivity</a:t>
-            </a:r>
-          </a:p>
-          <a:p>
-            <a:pPr lvl="1"/>
-            <a:endParaRPr lang="en-US" dirty="0"/>
-          </a:p>
-        </p:txBody>
-      </p:sp>
-    </p:spTree>
-  </p:cSld>
-  <p:clrMapOvr>
-    <a:masterClrMapping/>
-  </p:clrMapOvr>
-</p:sld>
-</file>
-
-<file path=ppt/slides/slide7.xml><?xml version="1.0" encoding="utf-8"?>
-<p:sld xmlns:a="http://schemas.openxmlformats.org/drawingml/2006/main" xmlns:r="http://schemas.openxmlformats.org/officeDocument/2006/relationships" xmlns:p="http://schemas.openxmlformats.org/presentationml/2006/main">
-  <p:cSld>
-    <p:spTree>
-      <p:nvGrpSpPr>
-        <p:cNvPr id="1" name=""/>
-        <p:cNvGrpSpPr/>
-        <p:nvPr/>
-      </p:nvGrpSpPr>
-      <p:grpSpPr>
-        <a:xfrm>
-          <a:off x="0" y="0"/>
-          <a:ext cx="0" cy="0"/>
-          <a:chOff x="0" y="0"/>
-          <a:chExt cx="0" cy="0"/>
-        </a:xfrm>
-      </p:grpSpPr>
-      <p:sp>
-        <p:nvSpPr>
-          <p:cNvPr id="2" name="Title 1"/>
-          <p:cNvSpPr>
-            <a:spLocks noGrp="1"/>
-          </p:cNvSpPr>
-          <p:nvPr>
-            <p:ph type="title"/>
-          </p:nvPr>
-        </p:nvSpPr>
-        <p:spPr/>
-        <p:txBody>
-          <a:bodyPr/>
-          <a:lstStyle/>
-          <a:p>
-            <a:r>
-              <a:rPr lang="en-US" dirty="0" smtClean="0"/>
-              <a:t>Code Development</a:t>
-            </a:r>
-            <a:endParaRPr lang="en-US" dirty="0"/>
-          </a:p>
-        </p:txBody>
-      </p:sp>
-      <p:sp>
-        <p:nvSpPr>
-          <p:cNvPr id="3" name="Content Placeholder 2"/>
-          <p:cNvSpPr>
-            <a:spLocks noGrp="1"/>
-          </p:cNvSpPr>
-          <p:nvPr>
-            <p:ph idx="1"/>
-          </p:nvPr>
-        </p:nvSpPr>
-        <p:spPr/>
-        <p:txBody>
-          <a:bodyPr>
-            <a:normAutofit fontScale="77500" lnSpcReduction="20000"/>
-          </a:bodyPr>
-          <a:lstStyle/>
-          <a:p>
-            <a:r>
-              <a:rPr lang="en-US" dirty="0" smtClean="0"/>
-              <a:t>While a lot of time was spent on a simple 1D code, it brought about </a:t>
-            </a:r>
-            <a:r>
-              <a:rPr lang="en-US" dirty="0" smtClean="0"/>
-              <a:t>the branching of SENSEI</a:t>
-            </a:r>
-            <a:endParaRPr lang="en-US" dirty="0" smtClean="0"/>
-          </a:p>
-          <a:p>
-            <a:pPr lvl="1"/>
-            <a:r>
-              <a:rPr lang="en-US" dirty="0" smtClean="0"/>
-              <a:t>SENSEI is a Structured, Euler/NS, Explicit/Implicit flow solver in development at VT</a:t>
-            </a:r>
-          </a:p>
-          <a:p>
-            <a:r>
-              <a:rPr lang="en-US" dirty="0" smtClean="0"/>
-              <a:t>SENSEI’s predecessor was almost as bad/worse than the 1D </a:t>
-            </a:r>
-            <a:r>
-              <a:rPr lang="en-US" dirty="0" smtClean="0"/>
-              <a:t>code</a:t>
-            </a:r>
-          </a:p>
-          <a:p>
-            <a:pPr lvl="1"/>
-            <a:r>
-              <a:rPr lang="en-US" dirty="0" smtClean="0"/>
-              <a:t>Single file code, common blocks, no explicit argument passing</a:t>
-            </a:r>
-            <a:endParaRPr lang="en-US" dirty="0" smtClean="0"/>
-          </a:p>
-          <a:p>
-            <a:pPr lvl="1"/>
-            <a:r>
-              <a:rPr lang="en-US" dirty="0" smtClean="0"/>
-              <a:t>Its code base was frozen, branched, and rewritten to form SENSEI by Tyrone Phillips</a:t>
-            </a:r>
-          </a:p>
-          <a:p>
-            <a:pPr lvl="1"/>
-            <a:r>
-              <a:rPr lang="en-US" dirty="0" smtClean="0"/>
-              <a:t>Despite the upheaval caused by completely changing coding paradigms and styles, SENSEI was quickly brought into operation</a:t>
-            </a:r>
-          </a:p>
-          <a:p>
-            <a:r>
-              <a:rPr lang="en-US" dirty="0" smtClean="0"/>
-              <a:t>The code base is still not very </a:t>
-            </a:r>
-            <a:r>
-              <a:rPr lang="en-US" dirty="0" smtClean="0"/>
-              <a:t>stable, (we’re still learning new things), but </a:t>
-            </a:r>
-            <a:r>
-              <a:rPr lang="en-US" dirty="0" smtClean="0"/>
-              <a:t>there are far fewer ‘unintended consequences’</a:t>
-            </a:r>
-          </a:p>
-        </p:txBody>
-      </p:sp>
-    </p:spTree>
-  </p:cSld>
-  <p:clrMapOvr>
-    <a:masterClrMapping/>
-  </p:clrMapOvr>
-</p:sld>
-</file>
-
 <file path=ppt/slides/slide8.xml><?xml version="1.0" encoding="utf-8"?>
 <p:sld xmlns:a="http://schemas.openxmlformats.org/drawingml/2006/main" xmlns:r="http://schemas.openxmlformats.org/officeDocument/2006/relationships" xmlns:p="http://schemas.openxmlformats.org/presentationml/2006/main">
   <p:cSld>
@@ -5783,7 +5687,7 @@
           <a:p>
             <a:r>
               <a:rPr lang="en-US" dirty="0" smtClean="0"/>
-              <a:t>Code Development Summary</a:t>
+              <a:t>Adaptation and TE</a:t>
             </a:r>
             <a:endParaRPr lang="en-US" dirty="0"/>
           </a:p>
@@ -5801,43 +5705,50 @@
         </p:nvSpPr>
         <p:spPr/>
         <p:txBody>
-          <a:bodyPr>
-            <a:normAutofit fontScale="92500"/>
-          </a:bodyPr>
-          <a:lstStyle/>
-          <a:p>
-            <a:r>
-              <a:rPr lang="en-US" dirty="0" smtClean="0"/>
-              <a:t>I was able to take a lot of the software engineering lessons I learned at </a:t>
+          <a:bodyPr/>
+          <a:lstStyle/>
+          <a:p>
+            <a:r>
+              <a:rPr lang="en-US" dirty="0" smtClean="0"/>
+              <a:t>As has been discussed before, TE is the source of DE</a:t>
+            </a:r>
+          </a:p>
+          <a:p>
+            <a:r>
+              <a:rPr lang="en-US" dirty="0" smtClean="0"/>
+              <a:t>The </a:t>
             </a:r>
             <a:r>
               <a:rPr lang="en-US" dirty="0" err="1" smtClean="0"/>
-              <a:t>LaRC</a:t>
-            </a:r>
-            <a:r>
-              <a:rPr lang="en-US" dirty="0" smtClean="0"/>
-              <a:t> and bring them back to VT</a:t>
-            </a:r>
-            <a:endParaRPr lang="en-US" dirty="0" smtClean="0"/>
-          </a:p>
-          <a:p>
-            <a:r>
-              <a:rPr lang="en-US" dirty="0" smtClean="0"/>
-              <a:t>Trying to write code that will be maintainable and useful to future students in the research group</a:t>
-            </a:r>
-          </a:p>
-          <a:p>
-            <a:r>
-              <a:rPr lang="en-US" dirty="0" smtClean="0"/>
-              <a:t>Spending the time to do the simple codes right will make it easier to work on SENSEI later</a:t>
-            </a:r>
-          </a:p>
-          <a:p>
-            <a:pPr lvl="1"/>
-            <a:r>
-              <a:rPr lang="en-US" dirty="0" smtClean="0"/>
-              <a:t>Practice make perfect</a:t>
-            </a:r>
+              <a:t>Venditti</a:t>
+            </a:r>
+            <a:r>
+              <a:rPr lang="en-US" dirty="0" smtClean="0"/>
+              <a:t> adaptation approach targets a mixed inner product of DE and TE between the primal and dual problems</a:t>
+            </a:r>
+          </a:p>
+          <a:p>
+            <a:r>
+              <a:rPr lang="en-US" dirty="0" smtClean="0"/>
+              <a:t>This works well in a purely </a:t>
+            </a:r>
+            <a:r>
+              <a:rPr lang="en-US" dirty="0" smtClean="0"/>
+              <a:t>discrete </a:t>
+            </a:r>
+            <a:r>
+              <a:rPr lang="en-US" dirty="0" smtClean="0"/>
+              <a:t>world, but to close the gap between </a:t>
+            </a:r>
+            <a:r>
+              <a:rPr lang="en-US" dirty="0" smtClean="0"/>
+              <a:t>discrete </a:t>
+            </a:r>
+            <a:r>
+              <a:rPr lang="en-US" dirty="0" smtClean="0"/>
+              <a:t>and continuous the TE has to be reduced</a:t>
+            </a:r>
+            <a:endParaRPr lang="en-US" dirty="0"/>
           </a:p>
         </p:txBody>
       </p:sp>
@@ -5883,7 +5794,11 @@
           <a:p>
             <a:r>
               <a:rPr lang="en-US" dirty="0" smtClean="0"/>
-              <a:t>Continuous Adjoint</a:t>
+              <a:t>Work at </a:t>
+            </a:r>
+            <a:r>
+              <a:rPr lang="en-US" dirty="0" err="1" smtClean="0"/>
+              <a:t>LaRC</a:t>
             </a:r>
             <a:endParaRPr lang="en-US" dirty="0"/>
           </a:p>
@@ -5902,56 +5817,43 @@
         <p:spPr/>
         <p:txBody>
           <a:bodyPr>
-            <a:normAutofit fontScale="92500" lnSpcReduction="20000"/>
+            <a:normAutofit/>
           </a:bodyPr>
           <a:lstStyle/>
           <a:p>
             <a:r>
               <a:rPr lang="en-US" dirty="0" smtClean="0"/>
-              <a:t>The VT AOE CFD research group has a strong focus on V&amp;V practices, hence systems with exact solutions are often studied as testing ground problems</a:t>
-            </a:r>
-          </a:p>
-          <a:p>
-            <a:r>
-              <a:rPr lang="en-US" dirty="0" smtClean="0"/>
-              <a:t>As such, my initial work with </a:t>
-            </a:r>
-            <a:r>
-              <a:rPr lang="en-US" dirty="0" err="1" smtClean="0"/>
-              <a:t>adjoints</a:t>
-            </a:r>
-            <a:r>
-              <a:rPr lang="en-US" dirty="0" smtClean="0"/>
-              <a:t> at VT consisted of (re)deriving the analytic adjoint equations for several systems</a:t>
+              <a:t>Continue work on relationship between adjoint methods and other error estimation/adaptation techniques</a:t>
+            </a:r>
+          </a:p>
+          <a:p>
+            <a:r>
+              <a:rPr lang="en-US" dirty="0" smtClean="0"/>
+              <a:t>Finalize 1D Burgers’, Quasi-1D nozzle and 2D Burgers’ codes with implicit </a:t>
+            </a:r>
+            <a:r>
+              <a:rPr lang="en-US" dirty="0" smtClean="0"/>
+              <a:t>formulations</a:t>
+            </a:r>
+            <a:endParaRPr lang="en-US" dirty="0" smtClean="0"/>
+          </a:p>
+          <a:p>
+            <a:r>
+              <a:rPr lang="en-US" dirty="0" smtClean="0"/>
+              <a:t>Investigate TE as a functional where the approximate form is known</a:t>
             </a:r>
           </a:p>
           <a:p>
             <a:pPr lvl="1"/>
             <a:r>
               <a:rPr lang="en-US" dirty="0" smtClean="0"/>
-              <a:t>Linear advection</a:t>
-            </a:r>
-          </a:p>
-          <a:p>
-            <a:pPr lvl="1"/>
-            <a:r>
-              <a:rPr lang="en-US" dirty="0" smtClean="0"/>
-              <a:t>Burgers’ Equation</a:t>
-            </a:r>
-          </a:p>
-          <a:p>
-            <a:pPr lvl="1"/>
-            <a:r>
-              <a:rPr lang="en-US" dirty="0" smtClean="0"/>
-              <a:t>Quasi-1D Euler Equations</a:t>
-            </a:r>
-          </a:p>
-          <a:p>
-            <a:pPr lvl="1"/>
-            <a:r>
-              <a:rPr lang="en-US" dirty="0" smtClean="0"/>
-              <a:t>2/3D Euler Equations</a:t>
-            </a:r>
+              <a:t>Proof of concept </a:t>
+            </a:r>
+            <a:r>
+              <a:rPr lang="en-US" dirty="0" smtClean="0"/>
+              <a:t>work in development</a:t>
+            </a:r>
+            <a:endParaRPr lang="en-US" dirty="0" smtClean="0"/>
           </a:p>
         </p:txBody>
       </p:sp>

</xml_diff>

<commit_message>
to prep presentation for tomorrow, needs citations
</commit_message>
<xml_diff>
--- a/June_Overview.pptx
+++ b/June_Overview.pptx
@@ -5,23 +5,24 @@
     <p:sldMasterId id="2147483648" r:id="rId1"/>
   </p:sldMasterIdLst>
   <p:sldIdLst>
-    <p:sldId id="257" r:id="rId2"/>
-    <p:sldId id="263" r:id="rId3"/>
-    <p:sldId id="264" r:id="rId4"/>
-    <p:sldId id="266" r:id="rId5"/>
-    <p:sldId id="267" r:id="rId6"/>
-    <p:sldId id="270" r:id="rId7"/>
-    <p:sldId id="269" r:id="rId8"/>
-    <p:sldId id="268" r:id="rId9"/>
-    <p:sldId id="271" r:id="rId10"/>
-    <p:sldId id="274" r:id="rId11"/>
-    <p:sldId id="258" r:id="rId12"/>
-    <p:sldId id="272" r:id="rId13"/>
+    <p:sldId id="275" r:id="rId2"/>
+    <p:sldId id="276" r:id="rId3"/>
+    <p:sldId id="257" r:id="rId4"/>
+    <p:sldId id="263" r:id="rId5"/>
+    <p:sldId id="264" r:id="rId6"/>
+    <p:sldId id="266" r:id="rId7"/>
+    <p:sldId id="267" r:id="rId8"/>
+    <p:sldId id="270" r:id="rId9"/>
+    <p:sldId id="269" r:id="rId10"/>
+    <p:sldId id="268" r:id="rId11"/>
+    <p:sldId id="271" r:id="rId12"/>
+    <p:sldId id="258" r:id="rId13"/>
     <p:sldId id="261" r:id="rId14"/>
-    <p:sldId id="260" r:id="rId15"/>
-    <p:sldId id="262" r:id="rId16"/>
-    <p:sldId id="265" r:id="rId17"/>
-    <p:sldId id="273" r:id="rId18"/>
+    <p:sldId id="262" r:id="rId15"/>
+    <p:sldId id="272" r:id="rId16"/>
+    <p:sldId id="260" r:id="rId17"/>
+    <p:sldId id="265" r:id="rId18"/>
+    <p:sldId id="273" r:id="rId19"/>
   </p:sldIdLst>
   <p:sldSz cx="9144000" cy="6858000" type="screen4x3"/>
   <p:notesSz cx="6858000" cy="9144000"/>
@@ -305,7 +306,7 @@
             <a:fld id="{E0507902-0F62-4629-8640-CB0DA259E3CF}" type="datetimeFigureOut">
               <a:rPr lang="en-US" smtClean="0"/>
               <a:pPr/>
-              <a:t>7/11/2011</a:t>
+              <a:t>7/12/2011</a:t>
             </a:fld>
             <a:endParaRPr lang="en-US"/>
           </a:p>
@@ -472,7 +473,7 @@
             <a:fld id="{E0507902-0F62-4629-8640-CB0DA259E3CF}" type="datetimeFigureOut">
               <a:rPr lang="en-US" smtClean="0"/>
               <a:pPr/>
-              <a:t>7/11/2011</a:t>
+              <a:t>7/12/2011</a:t>
             </a:fld>
             <a:endParaRPr lang="en-US"/>
           </a:p>
@@ -649,7 +650,7 @@
             <a:fld id="{E0507902-0F62-4629-8640-CB0DA259E3CF}" type="datetimeFigureOut">
               <a:rPr lang="en-US" smtClean="0"/>
               <a:pPr/>
-              <a:t>7/11/2011</a:t>
+              <a:t>7/12/2011</a:t>
             </a:fld>
             <a:endParaRPr lang="en-US"/>
           </a:p>
@@ -816,7 +817,7 @@
             <a:fld id="{E0507902-0F62-4629-8640-CB0DA259E3CF}" type="datetimeFigureOut">
               <a:rPr lang="en-US" smtClean="0"/>
               <a:pPr/>
-              <a:t>7/11/2011</a:t>
+              <a:t>7/12/2011</a:t>
             </a:fld>
             <a:endParaRPr lang="en-US"/>
           </a:p>
@@ -1059,7 +1060,7 @@
             <a:fld id="{E0507902-0F62-4629-8640-CB0DA259E3CF}" type="datetimeFigureOut">
               <a:rPr lang="en-US" smtClean="0"/>
               <a:pPr/>
-              <a:t>7/11/2011</a:t>
+              <a:t>7/12/2011</a:t>
             </a:fld>
             <a:endParaRPr lang="en-US"/>
           </a:p>
@@ -1344,7 +1345,7 @@
             <a:fld id="{E0507902-0F62-4629-8640-CB0DA259E3CF}" type="datetimeFigureOut">
               <a:rPr lang="en-US" smtClean="0"/>
               <a:pPr/>
-              <a:t>7/11/2011</a:t>
+              <a:t>7/12/2011</a:t>
             </a:fld>
             <a:endParaRPr lang="en-US"/>
           </a:p>
@@ -1763,7 +1764,7 @@
             <a:fld id="{E0507902-0F62-4629-8640-CB0DA259E3CF}" type="datetimeFigureOut">
               <a:rPr lang="en-US" smtClean="0"/>
               <a:pPr/>
-              <a:t>7/11/2011</a:t>
+              <a:t>7/12/2011</a:t>
             </a:fld>
             <a:endParaRPr lang="en-US"/>
           </a:p>
@@ -1878,7 +1879,7 @@
             <a:fld id="{E0507902-0F62-4629-8640-CB0DA259E3CF}" type="datetimeFigureOut">
               <a:rPr lang="en-US" smtClean="0"/>
               <a:pPr/>
-              <a:t>7/11/2011</a:t>
+              <a:t>7/12/2011</a:t>
             </a:fld>
             <a:endParaRPr lang="en-US"/>
           </a:p>
@@ -1970,7 +1971,7 @@
             <a:fld id="{E0507902-0F62-4629-8640-CB0DA259E3CF}" type="datetimeFigureOut">
               <a:rPr lang="en-US" smtClean="0"/>
               <a:pPr/>
-              <a:t>7/11/2011</a:t>
+              <a:t>7/12/2011</a:t>
             </a:fld>
             <a:endParaRPr lang="en-US"/>
           </a:p>
@@ -2244,7 +2245,7 @@
             <a:fld id="{E0507902-0F62-4629-8640-CB0DA259E3CF}" type="datetimeFigureOut">
               <a:rPr lang="en-US" smtClean="0"/>
               <a:pPr/>
-              <a:t>7/11/2011</a:t>
+              <a:t>7/12/2011</a:t>
             </a:fld>
             <a:endParaRPr lang="en-US"/>
           </a:p>
@@ -2494,7 +2495,7 @@
             <a:fld id="{E0507902-0F62-4629-8640-CB0DA259E3CF}" type="datetimeFigureOut">
               <a:rPr lang="en-US" smtClean="0"/>
               <a:pPr/>
-              <a:t>7/11/2011</a:t>
+              <a:t>7/12/2011</a:t>
             </a:fld>
             <a:endParaRPr lang="en-US"/>
           </a:p>
@@ -2704,7 +2705,7 @@
             <a:fld id="{E0507902-0F62-4629-8640-CB0DA259E3CF}" type="datetimeFigureOut">
               <a:rPr lang="en-US" smtClean="0"/>
               <a:pPr/>
-              <a:t>7/11/2011</a:t>
+              <a:t>7/12/2011</a:t>
             </a:fld>
             <a:endParaRPr lang="en-US"/>
           </a:p>
@@ -3082,17 +3083,26 @@
             <a:spLocks noGrp="1"/>
           </p:cNvSpPr>
           <p:nvPr>
-            <p:ph type="title"/>
-          </p:nvPr>
-        </p:nvSpPr>
-        <p:spPr/>
-        <p:txBody>
-          <a:bodyPr/>
-          <a:lstStyle/>
-          <a:p>
-            <a:r>
-              <a:rPr lang="en-US" dirty="0" smtClean="0"/>
-              <a:t>Overview</a:t>
+            <p:ph type="ctrTitle"/>
+          </p:nvPr>
+        </p:nvSpPr>
+        <p:spPr/>
+        <p:txBody>
+          <a:bodyPr>
+            <a:normAutofit fontScale="90000"/>
+          </a:bodyPr>
+          <a:lstStyle/>
+          <a:p>
+            <a:r>
+              <a:rPr lang="en-US" dirty="0" smtClean="0"/>
+              <a:t>Personal Research and Code Development Review:</a:t>
+            </a:r>
+            <a:br>
+              <a:rPr lang="en-US" dirty="0" smtClean="0"/>
+            </a:br>
+            <a:r>
+              <a:rPr lang="en-US" dirty="0" smtClean="0"/>
+              <a:t>January-June 2011</a:t>
             </a:r>
             <a:endParaRPr lang="en-US" dirty="0"/>
           </a:p>
@@ -3100,65 +3110,42 @@
       </p:sp>
       <p:sp>
         <p:nvSpPr>
-          <p:cNvPr id="3" name="Content Placeholder 2"/>
-          <p:cNvSpPr>
-            <a:spLocks noGrp="1"/>
-          </p:cNvSpPr>
-          <p:nvPr>
-            <p:ph idx="1"/>
-          </p:nvPr>
-        </p:nvSpPr>
-        <p:spPr/>
-        <p:txBody>
-          <a:bodyPr/>
-          <a:lstStyle/>
-          <a:p>
+          <p:cNvPr id="3" name="Subtitle 2"/>
+          <p:cNvSpPr>
+            <a:spLocks noGrp="1"/>
+          </p:cNvSpPr>
+          <p:nvPr>
+            <p:ph type="subTitle" idx="1"/>
+          </p:nvPr>
+        </p:nvSpPr>
+        <p:spPr/>
+        <p:txBody>
+          <a:bodyPr/>
+          <a:lstStyle/>
+          <a:p>
+            <a:r>
+              <a:rPr lang="en-US" dirty="0" smtClean="0"/>
+              <a:t>Joe </a:t>
+            </a:r>
             <a:r>
               <a:rPr lang="en-US" dirty="0" err="1" smtClean="0"/>
-              <a:t>Adjoints</a:t>
+              <a:t>Derlaga</a:t>
             </a:r>
             <a:endParaRPr lang="en-US" dirty="0" smtClean="0"/>
           </a:p>
           <a:p>
-            <a:pPr lvl="1"/>
-            <a:r>
-              <a:rPr lang="en-US" dirty="0" smtClean="0"/>
-              <a:t>Continuous Adjoint Derivation</a:t>
-            </a:r>
-          </a:p>
-          <a:p>
-            <a:pPr lvl="1"/>
-            <a:r>
-              <a:rPr lang="en-US" dirty="0" smtClean="0"/>
-              <a:t>Adjoint error estimation and TE</a:t>
-            </a:r>
-          </a:p>
-          <a:p>
-            <a:r>
-              <a:rPr lang="en-US" dirty="0" smtClean="0"/>
-              <a:t>Work at </a:t>
-            </a:r>
-            <a:r>
-              <a:rPr lang="en-US" dirty="0" err="1" smtClean="0"/>
-              <a:t>LaRC</a:t>
-            </a:r>
-            <a:endParaRPr lang="en-US" dirty="0" smtClean="0"/>
-          </a:p>
-          <a:p>
-            <a:r>
-              <a:rPr lang="en-US" dirty="0" smtClean="0"/>
-              <a:t>Code Development at VT</a:t>
-            </a:r>
-            <a:endParaRPr lang="en-US" dirty="0" smtClean="0"/>
-          </a:p>
-          <a:p>
-            <a:pPr lvl="1"/>
-            <a:r>
-              <a:rPr lang="en-US" dirty="0" smtClean="0"/>
-              <a:t>Software Engineering</a:t>
-            </a:r>
-          </a:p>
-          <a:p>
+            <a:r>
+              <a:rPr lang="en-US" dirty="0" smtClean="0"/>
+              <a:t>July 13</a:t>
+            </a:r>
+            <a:r>
+              <a:rPr lang="en-US" baseline="30000" dirty="0" smtClean="0"/>
+              <a:t>th</a:t>
+            </a:r>
+            <a:r>
+              <a:rPr lang="en-US" dirty="0" smtClean="0"/>
+              <a:t>, 2011</a:t>
+            </a:r>
             <a:endParaRPr lang="en-US" dirty="0"/>
           </a:p>
         </p:txBody>
@@ -3205,7 +3192,7 @@
           <a:p>
             <a:r>
               <a:rPr lang="en-US" dirty="0" smtClean="0"/>
-              <a:t>Side Note, Entropy</a:t>
+              <a:t>Adaptation and TE</a:t>
             </a:r>
             <a:endParaRPr lang="en-US" dirty="0"/>
           </a:p>
@@ -3223,9 +3210,48 @@
         </p:nvSpPr>
         <p:spPr/>
         <p:txBody>
-          <a:bodyPr/>
-          <a:lstStyle/>
-          <a:p>
+          <a:bodyPr>
+            <a:normAutofit fontScale="92500"/>
+          </a:bodyPr>
+          <a:lstStyle/>
+          <a:p>
+            <a:r>
+              <a:rPr lang="en-US" dirty="0" smtClean="0"/>
+              <a:t>The </a:t>
+            </a:r>
+            <a:r>
+              <a:rPr lang="en-US" dirty="0" err="1" smtClean="0"/>
+              <a:t>Venditti</a:t>
+            </a:r>
+            <a:r>
+              <a:rPr lang="en-US" dirty="0" smtClean="0"/>
+              <a:t> adaptation approach targets a mixed inner product of DE and TE between the primal and dual problems</a:t>
+            </a:r>
+          </a:p>
+          <a:p>
+            <a:r>
+              <a:rPr lang="en-US" dirty="0" smtClean="0"/>
+              <a:t>This works well in a purely discrete world, but to close the gap between discrete and continuous the TE has to be </a:t>
+            </a:r>
+            <a:r>
+              <a:rPr lang="en-US" dirty="0" smtClean="0"/>
+              <a:t>reduced</a:t>
+            </a:r>
+          </a:p>
+          <a:p>
+            <a:pPr lvl="1"/>
+            <a:r>
+              <a:rPr lang="en-US" dirty="0" smtClean="0"/>
+              <a:t>This is the reason that using drag as a functional doesn’t necessarily improve the final lift calculation</a:t>
+            </a:r>
+            <a:endParaRPr lang="en-US" dirty="0" smtClean="0"/>
+          </a:p>
+          <a:p>
+            <a:pPr lvl="1"/>
+            <a:r>
+              <a:rPr lang="en-US" dirty="0" smtClean="0"/>
+              <a:t>How best to do this is an ongoing research area</a:t>
+            </a:r>
             <a:endParaRPr lang="en-US" dirty="0"/>
           </a:p>
         </p:txBody>
@@ -3272,7 +3298,11 @@
           <a:p>
             <a:r>
               <a:rPr lang="en-US" dirty="0" smtClean="0"/>
-              <a:t>Code Development, Background</a:t>
+              <a:t>Work at </a:t>
+            </a:r>
+            <a:r>
+              <a:rPr lang="en-US" dirty="0" err="1" smtClean="0"/>
+              <a:t>LaRC</a:t>
             </a:r>
             <a:endParaRPr lang="en-US" dirty="0"/>
           </a:p>
@@ -3290,41 +3320,93 @@
         </p:nvSpPr>
         <p:spPr/>
         <p:txBody>
-          <a:bodyPr/>
-          <a:lstStyle/>
-          <a:p>
-            <a:r>
-              <a:rPr lang="en-US" dirty="0" smtClean="0"/>
-              <a:t>VT AOE CFD research group only has a few programmers</a:t>
+          <a:bodyPr>
+            <a:normAutofit fontScale="77500" lnSpcReduction="20000"/>
+          </a:bodyPr>
+          <a:lstStyle/>
+          <a:p>
+            <a:r>
+              <a:rPr lang="en-US" dirty="0" smtClean="0"/>
+              <a:t>Continue work on relationship between adjoint methods and other error estimation/adaptation </a:t>
+            </a:r>
+            <a:r>
+              <a:rPr lang="en-US" dirty="0" smtClean="0"/>
+              <a:t>techniques</a:t>
+            </a:r>
+          </a:p>
+          <a:p>
+            <a:r>
+              <a:rPr lang="en-US" dirty="0" smtClean="0"/>
+              <a:t>Finalize 1+2D Burgers’ and 1D Euler codes with implicit formulations</a:t>
             </a:r>
           </a:p>
           <a:p>
             <a:pPr lvl="1"/>
             <a:r>
               <a:rPr lang="en-US" dirty="0" smtClean="0"/>
-              <a:t>None with any formal Fortran training</a:t>
-            </a:r>
-          </a:p>
-          <a:p>
-            <a:r>
-              <a:rPr lang="en-US" dirty="0" smtClean="0"/>
-              <a:t>Code development split between Windows and Linux with Subversion VCS</a:t>
-            </a:r>
-          </a:p>
-          <a:p>
-            <a:r>
-              <a:rPr lang="en-US" dirty="0" smtClean="0"/>
-              <a:t>Normal assortment of simple test codes</a:t>
-            </a:r>
-          </a:p>
-          <a:p>
-            <a:r>
-              <a:rPr lang="en-US" dirty="0" smtClean="0"/>
-              <a:t>In-house code SENSEI</a:t>
-            </a:r>
-          </a:p>
-          <a:p>
-            <a:endParaRPr lang="en-US" dirty="0"/>
+              <a:t>Needed for </a:t>
+            </a:r>
+            <a:r>
+              <a:rPr lang="en-US" dirty="0" smtClean="0"/>
+              <a:t>discrete adjoint work</a:t>
+            </a:r>
+            <a:endParaRPr lang="en-US" dirty="0" smtClean="0"/>
+          </a:p>
+          <a:p>
+            <a:r>
+              <a:rPr lang="en-US" dirty="0" smtClean="0"/>
+              <a:t>Continue with entropy adjoint research</a:t>
+            </a:r>
+          </a:p>
+          <a:p>
+            <a:pPr lvl="1"/>
+            <a:r>
+              <a:rPr lang="en-US" dirty="0" smtClean="0"/>
+              <a:t>Entropy variables already in 1D Euler code, need to integrate the DE and TE estimates for </a:t>
+            </a:r>
+            <a:r>
+              <a:rPr lang="en-US" dirty="0" smtClean="0"/>
+              <a:t>comparison ( should be done soon )</a:t>
+            </a:r>
+            <a:endParaRPr lang="en-US" dirty="0" smtClean="0"/>
+          </a:p>
+          <a:p>
+            <a:r>
+              <a:rPr lang="en-US" dirty="0" smtClean="0"/>
+              <a:t>Investigate TE as a functional where </a:t>
+            </a:r>
+            <a:r>
+              <a:rPr lang="en-US" dirty="0" smtClean="0"/>
+              <a:t>an </a:t>
+            </a:r>
+            <a:r>
+              <a:rPr lang="en-US" dirty="0" smtClean="0"/>
+              <a:t>approximate </a:t>
+            </a:r>
+            <a:r>
+              <a:rPr lang="en-US" dirty="0" smtClean="0"/>
+              <a:t>form is used</a:t>
+            </a:r>
+            <a:endParaRPr lang="en-US" dirty="0" smtClean="0"/>
+          </a:p>
+          <a:p>
+            <a:pPr lvl="1"/>
+            <a:r>
+              <a:rPr lang="en-US" dirty="0" smtClean="0"/>
+              <a:t>Proof of concept work in </a:t>
+            </a:r>
+            <a:r>
+              <a:rPr lang="en-US" dirty="0" smtClean="0"/>
+              <a:t>development</a:t>
+            </a:r>
+            <a:endParaRPr lang="en-US" dirty="0" smtClean="0"/>
+          </a:p>
+          <a:p>
+            <a:r>
+              <a:rPr lang="en-US" dirty="0" smtClean="0"/>
+              <a:t>Work on adaptation mechanics</a:t>
+            </a:r>
+            <a:endParaRPr lang="en-US" dirty="0" smtClean="0"/>
           </a:p>
         </p:txBody>
       </p:sp>
@@ -3370,7 +3452,7 @@
           <a:p>
             <a:r>
               <a:rPr lang="en-US" dirty="0" smtClean="0"/>
-              <a:t>Code Development</a:t>
+              <a:t>Code Development, Background</a:t>
             </a:r>
             <a:endParaRPr lang="en-US" dirty="0"/>
           </a:p>
@@ -3388,49 +3470,49 @@
         </p:nvSpPr>
         <p:spPr/>
         <p:txBody>
-          <a:bodyPr>
-            <a:normAutofit lnSpcReduction="10000"/>
-          </a:bodyPr>
-          <a:lstStyle/>
-          <a:p>
-            <a:r>
-              <a:rPr lang="en-US" dirty="0" smtClean="0"/>
-              <a:t>Students with no formal training = obfuscated code</a:t>
+          <a:bodyPr/>
+          <a:lstStyle/>
+          <a:p>
+            <a:r>
+              <a:rPr lang="en-US" dirty="0" smtClean="0"/>
+              <a:t>VT AOE CFD research group only has a few programmers</a:t>
             </a:r>
           </a:p>
           <a:p>
             <a:pPr lvl="1"/>
             <a:r>
               <a:rPr lang="en-US" dirty="0" smtClean="0"/>
-              <a:t>Modules were used as common blocks</a:t>
-            </a:r>
-          </a:p>
-          <a:p>
-            <a:pPr lvl="1"/>
-            <a:r>
-              <a:rPr lang="en-US" dirty="0" smtClean="0"/>
-              <a:t>Copy and paste between programs</a:t>
-            </a:r>
-          </a:p>
-          <a:p>
-            <a:pPr lvl="1"/>
-            <a:r>
-              <a:rPr lang="en-US" dirty="0" smtClean="0"/>
-              <a:t>Difficult code to work with simply due to different styles</a:t>
-            </a:r>
-          </a:p>
-          <a:p>
-            <a:r>
-              <a:rPr lang="en-US" dirty="0" smtClean="0"/>
-              <a:t>Rewrote a simple 1D code as an example</a:t>
-            </a:r>
-          </a:p>
-          <a:p>
-            <a:pPr lvl="1"/>
-            <a:r>
-              <a:rPr lang="en-US" dirty="0" smtClean="0"/>
-              <a:t>Design order accurate, but had bugs that hurt performance</a:t>
-            </a:r>
+              <a:t>None with any formal </a:t>
+            </a:r>
+            <a:r>
+              <a:rPr lang="en-US" dirty="0" smtClean="0"/>
+              <a:t>Fortran 9X </a:t>
+            </a:r>
+            <a:r>
+              <a:rPr lang="en-US" dirty="0" smtClean="0"/>
+              <a:t>training</a:t>
+            </a:r>
+          </a:p>
+          <a:p>
+            <a:r>
+              <a:rPr lang="en-US" dirty="0" smtClean="0"/>
+              <a:t>Code development split between Windows and Linux with Subversion VCS</a:t>
+            </a:r>
+          </a:p>
+          <a:p>
+            <a:r>
+              <a:rPr lang="en-US" dirty="0" smtClean="0"/>
+              <a:t>Normal assortment of simple test codes</a:t>
+            </a:r>
+          </a:p>
+          <a:p>
+            <a:r>
+              <a:rPr lang="en-US" dirty="0" smtClean="0"/>
+              <a:t>In-house code SENSEI</a:t>
+            </a:r>
+          </a:p>
+          <a:p>
+            <a:endParaRPr lang="en-US" dirty="0"/>
           </a:p>
         </p:txBody>
       </p:sp>
@@ -3495,7 +3577,7 @@
         <p:spPr/>
         <p:txBody>
           <a:bodyPr>
-            <a:normAutofit fontScale="92500"/>
+            <a:normAutofit fontScale="92500" lnSpcReduction="10000"/>
           </a:bodyPr>
           <a:lstStyle/>
           <a:p>
@@ -3508,19 +3590,11 @@
             <a:pPr lvl="1"/>
             <a:r>
               <a:rPr lang="en-US" dirty="0" smtClean="0"/>
-              <a:t>Split code up and use </a:t>
-            </a:r>
-            <a:r>
-              <a:rPr lang="en-US" dirty="0" err="1" smtClean="0"/>
-              <a:t>makefiles</a:t>
-            </a:r>
-            <a:endParaRPr lang="en-US" dirty="0"/>
-          </a:p>
-          <a:p>
-            <a:pPr lvl="1"/>
-            <a:r>
-              <a:rPr lang="en-US" dirty="0" smtClean="0"/>
-              <a:t>Unit test code</a:t>
+              <a:t>Unit </a:t>
+            </a:r>
+            <a:r>
+              <a:rPr lang="en-US" dirty="0" smtClean="0"/>
+              <a:t>test code</a:t>
             </a:r>
           </a:p>
           <a:p>
@@ -3536,6 +3610,18 @@
             <a:endParaRPr lang="en-US" dirty="0" smtClean="0"/>
           </a:p>
           <a:p>
+            <a:pPr lvl="1"/>
+            <a:r>
+              <a:rPr lang="en-US" dirty="0" smtClean="0"/>
+              <a:t>Split code up and use </a:t>
+            </a:r>
+            <a:r>
+              <a:rPr lang="en-US" dirty="0" smtClean="0"/>
+              <a:t>make to build</a:t>
+            </a:r>
+            <a:endParaRPr lang="en-US" dirty="0" smtClean="0"/>
+          </a:p>
+          <a:p>
             <a:r>
               <a:rPr lang="en-US" dirty="0" smtClean="0"/>
               <a:t>Changed programming paradigms</a:t>
@@ -3552,14 +3638,30 @@
             <a:pPr lvl="1"/>
             <a:r>
               <a:rPr lang="en-US" dirty="0" smtClean="0"/>
-              <a:t>Use ‘use module, only:*’ statements instead of COMMON blocks</a:t>
+              <a:t>Use ‘use module, only:*’ statements instead of </a:t>
+            </a:r>
+            <a:r>
+              <a:rPr lang="en-US" dirty="0" smtClean="0"/>
+              <a:t>using modules as COMMON blocks</a:t>
             </a:r>
           </a:p>
           <a:p>
             <a:pPr lvl="1"/>
             <a:r>
               <a:rPr lang="en-US" dirty="0" smtClean="0"/>
-              <a:t>Derived types for logical data structures</a:t>
+              <a:t>Created shared libraries</a:t>
+            </a:r>
+            <a:endParaRPr lang="en-US" dirty="0" smtClean="0"/>
+          </a:p>
+          <a:p>
+            <a:pPr lvl="1"/>
+            <a:r>
+              <a:rPr lang="en-US" dirty="0" smtClean="0"/>
+              <a:t>Derived types for logical data </a:t>
+            </a:r>
+            <a:r>
+              <a:rPr lang="en-US" dirty="0" smtClean="0"/>
+              <a:t>structures</a:t>
             </a:r>
           </a:p>
         </p:txBody>
@@ -3622,80 +3724,121 @@
             <p:ph idx="1"/>
           </p:nvPr>
         </p:nvSpPr>
-        <p:spPr/>
+        <p:spPr>
+          <a:xfrm>
+            <a:off x="457200" y="1600200"/>
+            <a:ext cx="8229600" cy="5029200"/>
+          </a:xfrm>
+        </p:spPr>
         <p:txBody>
           <a:bodyPr>
-            <a:normAutofit fontScale="77500" lnSpcReduction="20000"/>
+            <a:normAutofit fontScale="85000" lnSpcReduction="20000"/>
           </a:bodyPr>
           <a:lstStyle/>
           <a:p>
             <a:r>
               <a:rPr lang="en-US" dirty="0" smtClean="0"/>
-              <a:t>Refactoring the 1D code took longer than expected</a:t>
+              <a:t>Unit Testing</a:t>
             </a:r>
           </a:p>
           <a:p>
             <a:pPr lvl="1"/>
             <a:r>
               <a:rPr lang="en-US" dirty="0" smtClean="0"/>
-              <a:t>Difficult to follow logic/data flow because of modules as COMMON</a:t>
+              <a:t>Taught a class for a CFD course on unit testing and how it affects code development</a:t>
             </a:r>
           </a:p>
           <a:p>
             <a:pPr lvl="1"/>
             <a:r>
               <a:rPr lang="en-US" dirty="0" smtClean="0"/>
-              <a:t>Variables such as I and J defined as common (pet </a:t>
-            </a:r>
-            <a:r>
-              <a:rPr lang="en-US" dirty="0" smtClean="0"/>
-              <a:t>peeve</a:t>
-            </a:r>
-            <a:r>
-              <a:rPr lang="en-US" dirty="0" smtClean="0"/>
-              <a:t>)</a:t>
-            </a:r>
-          </a:p>
-          <a:p>
-            <a:r>
-              <a:rPr lang="en-US" dirty="0" smtClean="0"/>
-              <a:t>Separated the code into files based on logical components</a:t>
+              <a:t>By the end of the semester, the students I talked to wished that they had done more unit testing</a:t>
+            </a:r>
+          </a:p>
+          <a:p>
+            <a:r>
+              <a:rPr lang="en-US" dirty="0" smtClean="0"/>
+              <a:t>Code Profiling</a:t>
             </a:r>
           </a:p>
           <a:p>
             <a:pPr lvl="1"/>
             <a:r>
               <a:rPr lang="en-US" dirty="0" smtClean="0"/>
-              <a:t>Asking ‘How do I make this testable?’ really helped</a:t>
-            </a:r>
-          </a:p>
-          <a:p>
-            <a:r>
-              <a:rPr lang="en-US" dirty="0" smtClean="0"/>
-              <a:t>Code review with peers once refactoring was complete</a:t>
+              <a:t>Used GNU </a:t>
+            </a:r>
+            <a:r>
+              <a:rPr lang="en-US" dirty="0" err="1" smtClean="0"/>
+              <a:t>gprof</a:t>
+            </a:r>
+            <a:r>
+              <a:rPr lang="en-US" dirty="0" smtClean="0"/>
+              <a:t> to demonstrate </a:t>
+            </a:r>
+            <a:r>
+              <a:rPr lang="en-US" dirty="0" smtClean="0"/>
+              <a:t>how to find bugs in a </a:t>
+            </a:r>
+            <a:r>
+              <a:rPr lang="en-US" dirty="0" smtClean="0"/>
+              <a:t>code </a:t>
             </a:r>
           </a:p>
           <a:p>
             <a:pPr lvl="1"/>
             <a:r>
               <a:rPr lang="en-US" dirty="0" smtClean="0"/>
-              <a:t>The code works and is faster, but what else is possible and what is needed for the future?</a:t>
+              <a:t>A </a:t>
+            </a:r>
+            <a:r>
+              <a:rPr lang="en-US" dirty="0" smtClean="0"/>
+              <a:t>‘:’ where ‘</a:t>
+            </a:r>
+            <a:r>
+              <a:rPr lang="en-US" dirty="0" err="1" smtClean="0"/>
+              <a:t>i</a:t>
+            </a:r>
+            <a:r>
+              <a:rPr lang="en-US" dirty="0" smtClean="0"/>
+              <a:t>’ was </a:t>
+            </a:r>
+            <a:r>
+              <a:rPr lang="en-US" dirty="0" smtClean="0"/>
+              <a:t>intended</a:t>
+            </a:r>
+          </a:p>
+          <a:p>
+            <a:r>
+              <a:rPr lang="en-US" dirty="0" smtClean="0"/>
+              <a:t>Error Flags</a:t>
             </a:r>
           </a:p>
           <a:p>
             <a:pPr lvl="1"/>
             <a:r>
               <a:rPr lang="en-US" dirty="0" smtClean="0"/>
-              <a:t>This discussion led to a decision on how future codes should be developed</a:t>
-            </a:r>
-          </a:p>
-          <a:p>
-            <a:pPr lvl="1"/>
-            <a:r>
-              <a:rPr lang="en-US" dirty="0" smtClean="0"/>
-              <a:t>End result was a modular code with a well defined purpose that is paired with other codes (adjoint, adaptation, etc) so each student can accomplish his work from the same code base</a:t>
-            </a:r>
-            <a:endParaRPr lang="en-US" dirty="0"/>
+              <a:t>How to use them!</a:t>
+            </a:r>
+            <a:endParaRPr lang="en-US" dirty="0" smtClean="0"/>
+          </a:p>
+          <a:p>
+            <a:r>
+              <a:rPr lang="en-US" dirty="0" smtClean="0"/>
+              <a:t>T</a:t>
+            </a:r>
+            <a:r>
+              <a:rPr lang="en-US" dirty="0" smtClean="0"/>
+              <a:t>hese </a:t>
+            </a:r>
+            <a:r>
+              <a:rPr lang="en-US" dirty="0" smtClean="0"/>
+              <a:t>are simple ideas/concepts/tools that weren’t being used and had a huge impact on </a:t>
+            </a:r>
+            <a:r>
+              <a:rPr lang="en-US" dirty="0" smtClean="0"/>
+              <a:t>productivity</a:t>
+            </a:r>
+            <a:endParaRPr lang="en-US" dirty="0" smtClean="0"/>
           </a:p>
         </p:txBody>
       </p:sp>
@@ -3760,86 +3903,76 @@
         <p:spPr/>
         <p:txBody>
           <a:bodyPr>
-            <a:normAutofit fontScale="77500" lnSpcReduction="20000"/>
+            <a:normAutofit fontScale="92500" lnSpcReduction="20000"/>
           </a:bodyPr>
           <a:lstStyle/>
           <a:p>
             <a:r>
               <a:rPr lang="en-US" dirty="0" smtClean="0"/>
-              <a:t>Unit Testing</a:t>
+              <a:t>Students with no formal training = obfuscated code</a:t>
             </a:r>
           </a:p>
           <a:p>
             <a:pPr lvl="1"/>
             <a:r>
               <a:rPr lang="en-US" dirty="0" smtClean="0"/>
-              <a:t>Taught a </a:t>
-            </a:r>
-            <a:r>
-              <a:rPr lang="en-US" dirty="0" smtClean="0"/>
-              <a:t>class </a:t>
-            </a:r>
-            <a:r>
-              <a:rPr lang="en-US" dirty="0" smtClean="0"/>
-              <a:t>for a CFD course on unit testing and how it affects code development</a:t>
+              <a:t>Modules were used as common blocks</a:t>
             </a:r>
           </a:p>
           <a:p>
             <a:pPr lvl="1"/>
             <a:r>
               <a:rPr lang="en-US" dirty="0" smtClean="0"/>
-              <a:t>By the end of the semester, the students I talked to wished that they had done more unit testing</a:t>
-            </a:r>
-          </a:p>
-          <a:p>
-            <a:r>
-              <a:rPr lang="en-US" dirty="0" smtClean="0"/>
-              <a:t>Code Profiling</a:t>
+              <a:t>Copy and paste between </a:t>
+            </a:r>
+            <a:r>
+              <a:rPr lang="en-US" dirty="0" smtClean="0"/>
+              <a:t>programs</a:t>
             </a:r>
           </a:p>
           <a:p>
             <a:pPr lvl="1"/>
             <a:r>
               <a:rPr lang="en-US" dirty="0" smtClean="0"/>
-              <a:t>Using </a:t>
-            </a:r>
-            <a:r>
-              <a:rPr lang="en-US" dirty="0" err="1" smtClean="0"/>
-              <a:t>gprof</a:t>
-            </a:r>
-            <a:r>
-              <a:rPr lang="en-US" dirty="0" smtClean="0"/>
-              <a:t> I demonstrated </a:t>
-            </a:r>
-            <a:r>
-              <a:rPr lang="en-US" dirty="0" smtClean="0"/>
-              <a:t>how to find bugs in a code, such as a ‘:’ where ‘</a:t>
-            </a:r>
-            <a:r>
-              <a:rPr lang="en-US" dirty="0" err="1" smtClean="0"/>
-              <a:t>i</a:t>
-            </a:r>
-            <a:r>
-              <a:rPr lang="en-US" dirty="0" smtClean="0"/>
-              <a:t>’ was intended</a:t>
-            </a:r>
+              <a:t>Single file programs</a:t>
+            </a:r>
+            <a:endParaRPr lang="en-US" dirty="0" smtClean="0"/>
           </a:p>
           <a:p>
             <a:pPr lvl="1"/>
             <a:r>
               <a:rPr lang="en-US" dirty="0" smtClean="0"/>
-              <a:t>Overall result, the 1D code I rewrote runs in milliseconds compared to tens of seconds</a:t>
-            </a:r>
-          </a:p>
-          <a:p>
-            <a:r>
-              <a:rPr lang="en-US" dirty="0" smtClean="0"/>
-              <a:t>Both of these are simple ideas/concepts/tools that weren’t being used and had a huge impact on productivity</a:t>
+              <a:t>Difficult code to work with simply due to different styles</a:t>
+            </a:r>
+          </a:p>
+          <a:p>
+            <a:r>
+              <a:rPr lang="en-US" dirty="0" smtClean="0"/>
+              <a:t>How to improve?</a:t>
             </a:r>
           </a:p>
           <a:p>
             <a:pPr lvl="1"/>
-            <a:endParaRPr lang="en-US" dirty="0"/>
+            <a:r>
+              <a:rPr lang="en-US" dirty="0" smtClean="0"/>
+              <a:t>As an example, I rewrote </a:t>
+            </a:r>
+            <a:r>
+              <a:rPr lang="en-US" dirty="0" smtClean="0"/>
+              <a:t>a simple 1D code </a:t>
+            </a:r>
+            <a:r>
+              <a:rPr lang="en-US" dirty="0" smtClean="0"/>
+              <a:t>that was d</a:t>
+            </a:r>
+            <a:r>
+              <a:rPr lang="en-US" dirty="0" smtClean="0"/>
+              <a:t>esign </a:t>
+            </a:r>
+            <a:r>
+              <a:rPr lang="en-US" dirty="0" smtClean="0"/>
+              <a:t>order accurate, but had bugs that hurt performance</a:t>
+            </a:r>
           </a:p>
         </p:txBody>
       </p:sp>
@@ -3910,48 +4043,68 @@
           <a:p>
             <a:r>
               <a:rPr lang="en-US" dirty="0" smtClean="0"/>
-              <a:t>While a lot of time was spent on a simple 1D code, it brought about the branching of SENSEI</a:t>
+              <a:t>Refactoring the 1D code took longer than expected</a:t>
             </a:r>
           </a:p>
           <a:p>
             <a:pPr lvl="1"/>
             <a:r>
               <a:rPr lang="en-US" dirty="0" smtClean="0"/>
-              <a:t>SENSEI is a Structured, Euler/NS, Explicit/Implicit flow solver in development at VT</a:t>
-            </a:r>
-          </a:p>
-          <a:p>
-            <a:r>
-              <a:rPr lang="en-US" dirty="0" smtClean="0"/>
-              <a:t>SENSEI’s predecessor was almost as bad/worse than the 1D code</a:t>
+              <a:t>Difficult to follow logic/data flow because of modules as COMMON</a:t>
             </a:r>
           </a:p>
           <a:p>
             <a:pPr lvl="1"/>
             <a:r>
               <a:rPr lang="en-US" dirty="0" smtClean="0"/>
-              <a:t>Single file code, common blocks, no explicit argument passing</a:t>
+              <a:t>Variables such as I and J defined as common (pet peeve)</a:t>
+            </a:r>
+          </a:p>
+          <a:p>
+            <a:r>
+              <a:rPr lang="en-US" dirty="0" smtClean="0"/>
+              <a:t>Separated the code into files based on logical components</a:t>
             </a:r>
           </a:p>
           <a:p>
             <a:pPr lvl="1"/>
             <a:r>
               <a:rPr lang="en-US" dirty="0" smtClean="0"/>
-              <a:t>Its code base was frozen, branched, and rewritten to form SENSEI by Tyrone Phillips</a:t>
+              <a:t>Asking ‘How do I make this testable?’ really helped</a:t>
+            </a:r>
+          </a:p>
+          <a:p>
+            <a:r>
+              <a:rPr lang="en-US" dirty="0" smtClean="0"/>
+              <a:t>Code review with peers once refactoring was complete</a:t>
             </a:r>
           </a:p>
           <a:p>
             <a:pPr lvl="1"/>
             <a:r>
               <a:rPr lang="en-US" dirty="0" smtClean="0"/>
-              <a:t>Despite the upheaval caused by completely changing coding paradigms and styles, SENSEI was quickly brought into operation</a:t>
-            </a:r>
-          </a:p>
-          <a:p>
-            <a:r>
-              <a:rPr lang="en-US" dirty="0" smtClean="0"/>
-              <a:t>The code base is still not very stable, (we’re still learning new things), but there are far fewer ‘unintended consequences’</a:t>
-            </a:r>
+              <a:t>The code works and is faster, but what else is possible and what is needed for the future?</a:t>
+            </a:r>
+          </a:p>
+          <a:p>
+            <a:pPr lvl="1"/>
+            <a:r>
+              <a:rPr lang="en-US" dirty="0" smtClean="0"/>
+              <a:t>This discussion led to a decision on how future codes should be </a:t>
+            </a:r>
+            <a:r>
+              <a:rPr lang="en-US" dirty="0" smtClean="0"/>
+              <a:t>developed</a:t>
+            </a:r>
+            <a:endParaRPr lang="en-US" dirty="0" smtClean="0"/>
+          </a:p>
+          <a:p>
+            <a:pPr lvl="1"/>
+            <a:r>
+              <a:rPr lang="en-US" dirty="0" smtClean="0"/>
+              <a:t>End result was a modular code with a well defined purpose that is paired with other codes (adjoint, adaptation, etc) so each student can accomplish his work from the same code base</a:t>
+            </a:r>
+            <a:endParaRPr lang="en-US" dirty="0"/>
           </a:p>
         </p:txBody>
       </p:sp>
@@ -3997,6 +4150,138 @@
           <a:p>
             <a:r>
               <a:rPr lang="en-US" dirty="0" smtClean="0"/>
+              <a:t>Code Development</a:t>
+            </a:r>
+            <a:endParaRPr lang="en-US" dirty="0"/>
+          </a:p>
+        </p:txBody>
+      </p:sp>
+      <p:sp>
+        <p:nvSpPr>
+          <p:cNvPr id="3" name="Content Placeholder 2"/>
+          <p:cNvSpPr>
+            <a:spLocks noGrp="1"/>
+          </p:cNvSpPr>
+          <p:nvPr>
+            <p:ph idx="1"/>
+          </p:nvPr>
+        </p:nvSpPr>
+        <p:spPr/>
+        <p:txBody>
+          <a:bodyPr>
+            <a:normAutofit fontScale="77500" lnSpcReduction="20000"/>
+          </a:bodyPr>
+          <a:lstStyle/>
+          <a:p>
+            <a:r>
+              <a:rPr lang="en-US" dirty="0" smtClean="0"/>
+              <a:t>While a lot of time was spent on </a:t>
+            </a:r>
+            <a:r>
+              <a:rPr lang="en-US" dirty="0" smtClean="0"/>
+              <a:t>the </a:t>
+            </a:r>
+            <a:r>
+              <a:rPr lang="en-US" dirty="0" smtClean="0"/>
+              <a:t>simple 1D code, it brought about the </a:t>
+            </a:r>
+            <a:r>
+              <a:rPr lang="en-US" dirty="0" smtClean="0"/>
+              <a:t>creation </a:t>
+            </a:r>
+            <a:r>
+              <a:rPr lang="en-US" dirty="0" smtClean="0"/>
+              <a:t>of </a:t>
+            </a:r>
+            <a:r>
+              <a:rPr lang="en-US" dirty="0" smtClean="0"/>
+              <a:t>SENSEI</a:t>
+            </a:r>
+          </a:p>
+          <a:p>
+            <a:pPr lvl="1"/>
+            <a:r>
+              <a:rPr lang="en-US" dirty="0" smtClean="0"/>
+              <a:t>SENSEI is a Structured, Euler/NS, Explicit/Implicit flow solver in development at VT</a:t>
+            </a:r>
+          </a:p>
+          <a:p>
+            <a:r>
+              <a:rPr lang="en-US" dirty="0" smtClean="0"/>
+              <a:t>SENSEI’s predecessor was almost as bad/worse than the 1D code</a:t>
+            </a:r>
+          </a:p>
+          <a:p>
+            <a:pPr lvl="1"/>
+            <a:r>
+              <a:rPr lang="en-US" dirty="0" smtClean="0"/>
+              <a:t>Single file code, common blocks, no explicit argument passing</a:t>
+            </a:r>
+          </a:p>
+          <a:p>
+            <a:pPr lvl="1"/>
+            <a:r>
+              <a:rPr lang="en-US" dirty="0" smtClean="0"/>
+              <a:t>Its code base was frozen, branched, and rewritten to form SENSEI by Tyrone Phillips</a:t>
+            </a:r>
+          </a:p>
+          <a:p>
+            <a:pPr lvl="1"/>
+            <a:r>
+              <a:rPr lang="en-US" dirty="0" smtClean="0"/>
+              <a:t>Despite the upheaval caused by completely changing coding paradigms and styles, SENSEI was quickly brought into operation</a:t>
+            </a:r>
+          </a:p>
+          <a:p>
+            <a:r>
+              <a:rPr lang="en-US" dirty="0" smtClean="0"/>
+              <a:t>The code base is still not very stable, (we’re still learning new things), but there are far fewer ‘unintended consequences’</a:t>
+            </a:r>
+          </a:p>
+        </p:txBody>
+      </p:sp>
+    </p:spTree>
+  </p:cSld>
+  <p:clrMapOvr>
+    <a:masterClrMapping/>
+  </p:clrMapOvr>
+</p:sld>
+</file>
+
+<file path=ppt/slides/slide18.xml><?xml version="1.0" encoding="utf-8"?>
+<p:sld xmlns:a="http://schemas.openxmlformats.org/drawingml/2006/main" xmlns:r="http://schemas.openxmlformats.org/officeDocument/2006/relationships" xmlns:p="http://schemas.openxmlformats.org/presentationml/2006/main">
+  <p:cSld>
+    <p:spTree>
+      <p:nvGrpSpPr>
+        <p:cNvPr id="1" name=""/>
+        <p:cNvGrpSpPr/>
+        <p:nvPr/>
+      </p:nvGrpSpPr>
+      <p:grpSpPr>
+        <a:xfrm>
+          <a:off x="0" y="0"/>
+          <a:ext cx="0" cy="0"/>
+          <a:chOff x="0" y="0"/>
+          <a:chExt cx="0" cy="0"/>
+        </a:xfrm>
+      </p:grpSpPr>
+      <p:sp>
+        <p:nvSpPr>
+          <p:cNvPr id="2" name="Title 1"/>
+          <p:cNvSpPr>
+            <a:spLocks noGrp="1"/>
+          </p:cNvSpPr>
+          <p:nvPr>
+            <p:ph type="title"/>
+          </p:nvPr>
+        </p:nvSpPr>
+        <p:spPr/>
+        <p:txBody>
+          <a:bodyPr/>
+          <a:lstStyle/>
+          <a:p>
+            <a:r>
+              <a:rPr lang="en-US" dirty="0" smtClean="0"/>
               <a:t>Code Development Summary</a:t>
             </a:r>
             <a:endParaRPr lang="en-US" dirty="0"/>
@@ -4036,7 +4321,11 @@
           <a:p>
             <a:r>
               <a:rPr lang="en-US" dirty="0" smtClean="0"/>
-              <a:t>Trying to write code that will be maintainable and useful to future students in the research group</a:t>
+              <a:t>Goal of trying </a:t>
+            </a:r>
+            <a:r>
+              <a:rPr lang="en-US" dirty="0" smtClean="0"/>
+              <a:t>to write code that will be maintainable and useful to future students in the research group</a:t>
             </a:r>
           </a:p>
           <a:p>
@@ -4049,8 +4338,9 @@
             <a:pPr lvl="1"/>
             <a:r>
               <a:rPr lang="en-US" dirty="0" smtClean="0"/>
-              <a:t>Practice make perfect</a:t>
-            </a:r>
+              <a:t>Perfect practice makes perfect</a:t>
+            </a:r>
+            <a:endParaRPr lang="en-US" dirty="0" smtClean="0"/>
           </a:p>
         </p:txBody>
       </p:sp>
@@ -4096,7 +4386,7 @@
           <a:p>
             <a:r>
               <a:rPr lang="en-US" dirty="0" smtClean="0"/>
-              <a:t>Continuous Adjoint</a:t>
+              <a:t>Objective</a:t>
             </a:r>
             <a:endParaRPr lang="en-US" dirty="0"/>
           </a:p>
@@ -4114,32 +4404,30 @@
         </p:nvSpPr>
         <p:spPr/>
         <p:txBody>
-          <a:bodyPr>
-            <a:normAutofit fontScale="92500" lnSpcReduction="20000"/>
-          </a:bodyPr>
-          <a:lstStyle/>
-          <a:p>
-            <a:r>
-              <a:rPr lang="en-US" dirty="0" smtClean="0"/>
-              <a:t>The VT AOE CFD research group has a strong focus on V&amp;V practices, hence systems with exact solutions are often studied as testing ground problems</a:t>
-            </a:r>
-          </a:p>
-          <a:p>
-            <a:r>
-              <a:rPr lang="en-US" dirty="0" smtClean="0"/>
-              <a:t>As such, my initial work with </a:t>
+          <a:bodyPr/>
+          <a:lstStyle/>
+          <a:p>
+            <a:r>
+              <a:rPr lang="en-US" dirty="0" smtClean="0"/>
+              <a:t>To present a brief overview of:</a:t>
+            </a:r>
+          </a:p>
+          <a:p>
+            <a:pPr lvl="1"/>
+            <a:r>
+              <a:rPr lang="en-US" dirty="0" smtClean="0"/>
+              <a:t>What I did at VT this past spring</a:t>
+            </a:r>
+          </a:p>
+          <a:p>
+            <a:pPr lvl="1"/>
+            <a:r>
+              <a:rPr lang="en-US" dirty="0" smtClean="0"/>
+              <a:t>What I’m working on now at </a:t>
             </a:r>
             <a:r>
               <a:rPr lang="en-US" dirty="0" err="1" smtClean="0"/>
-              <a:t>adjoints</a:t>
-            </a:r>
-            <a:r>
-              <a:rPr lang="en-US" dirty="0" smtClean="0"/>
-              <a:t> at VT consisted of (re)deriving the analytic adjoint equations for several </a:t>
-            </a:r>
-            <a:r>
-              <a:rPr lang="en-US" dirty="0" smtClean="0"/>
-              <a:t>systems, including general boundary conditions</a:t>
+              <a:t>LaRC</a:t>
             </a:r>
             <a:endParaRPr lang="en-US" dirty="0" smtClean="0"/>
           </a:p>
@@ -4147,31 +4435,9 @@
             <a:pPr lvl="1"/>
             <a:r>
               <a:rPr lang="en-US" dirty="0" smtClean="0"/>
-              <a:t>Linear </a:t>
-            </a:r>
-            <a:r>
-              <a:rPr lang="en-US" dirty="0" smtClean="0"/>
-              <a:t>Advection</a:t>
-            </a:r>
-            <a:endParaRPr lang="en-US" dirty="0" smtClean="0"/>
-          </a:p>
-          <a:p>
-            <a:pPr lvl="1"/>
-            <a:r>
-              <a:rPr lang="en-US" dirty="0" smtClean="0"/>
-              <a:t>Burgers’ Equation</a:t>
-            </a:r>
-          </a:p>
-          <a:p>
-            <a:pPr lvl="1"/>
-            <a:r>
-              <a:rPr lang="en-US" dirty="0" smtClean="0"/>
-              <a:t>‘N’-D </a:t>
-            </a:r>
-            <a:r>
-              <a:rPr lang="en-US" dirty="0" smtClean="0"/>
-              <a:t>Euler Equations</a:t>
-            </a:r>
+              <a:t>What I’ll be working on over the next year</a:t>
+            </a:r>
+            <a:endParaRPr lang="en-US" dirty="0"/>
           </a:p>
         </p:txBody>
       </p:sp>
@@ -4217,7 +4483,7 @@
           <a:p>
             <a:r>
               <a:rPr lang="en-US" dirty="0" smtClean="0"/>
-              <a:t>Continuous Adjoint</a:t>
+              <a:t>Overview</a:t>
             </a:r>
             <a:endParaRPr lang="en-US" dirty="0"/>
           </a:p>
@@ -4240,61 +4506,73 @@
           <a:p>
             <a:r>
               <a:rPr lang="en-US" dirty="0" smtClean="0"/>
-              <a:t>The process of deriving the analytic adjoint was helpful for understanding </a:t>
-            </a:r>
-            <a:r>
-              <a:rPr lang="en-US" dirty="0" smtClean="0"/>
-              <a:t>what drives the adjoint solution and boundary </a:t>
-            </a:r>
-            <a:r>
-              <a:rPr lang="en-US" dirty="0" smtClean="0"/>
-              <a:t>conditions</a:t>
-            </a:r>
-          </a:p>
-          <a:p>
-            <a:r>
-              <a:rPr lang="en-US" dirty="0" smtClean="0"/>
-              <a:t>This being said, all future work will </a:t>
-            </a:r>
-            <a:r>
-              <a:rPr lang="en-US" dirty="0" smtClean="0"/>
-              <a:t>focus on </a:t>
-            </a:r>
-            <a:r>
-              <a:rPr lang="en-US" dirty="0" smtClean="0"/>
-              <a:t>discrete </a:t>
-            </a:r>
+              <a:t>Part I: Research</a:t>
+            </a:r>
+          </a:p>
+          <a:p>
+            <a:pPr lvl="1"/>
             <a:r>
               <a:rPr lang="en-US" dirty="0" err="1" smtClean="0"/>
-              <a:t>adjoints</a:t>
+              <a:t>Adjoints</a:t>
             </a:r>
             <a:endParaRPr lang="en-US" dirty="0" smtClean="0"/>
           </a:p>
           <a:p>
+            <a:pPr lvl="2"/>
+            <a:r>
+              <a:rPr lang="en-US" dirty="0" smtClean="0"/>
+              <a:t>Continuous Adjoint </a:t>
+            </a:r>
+            <a:r>
+              <a:rPr lang="en-US" dirty="0" smtClean="0"/>
+              <a:t>Derivations</a:t>
+            </a:r>
+            <a:endParaRPr lang="en-US" dirty="0" smtClean="0"/>
+          </a:p>
+          <a:p>
+            <a:pPr lvl="2"/>
+            <a:r>
+              <a:rPr lang="en-US" dirty="0" smtClean="0"/>
+              <a:t>Error Estimation</a:t>
+            </a:r>
+            <a:endParaRPr lang="en-US" dirty="0" smtClean="0"/>
+          </a:p>
+          <a:p>
             <a:pPr lvl="1"/>
             <a:r>
               <a:rPr lang="en-US" dirty="0" smtClean="0"/>
-              <a:t>E</a:t>
-            </a:r>
-            <a:r>
-              <a:rPr lang="en-US" dirty="0" smtClean="0"/>
-              <a:t>ncourages </a:t>
-            </a:r>
-            <a:r>
-              <a:rPr lang="en-US" dirty="0" smtClean="0"/>
-              <a:t>development of implicit </a:t>
-            </a:r>
-            <a:r>
-              <a:rPr lang="en-US" dirty="0" smtClean="0"/>
-              <a:t>methods</a:t>
-            </a:r>
+              <a:t>Work at </a:t>
+            </a:r>
+            <a:r>
+              <a:rPr lang="en-US" dirty="0" err="1" smtClean="0"/>
+              <a:t>LaRC</a:t>
+            </a:r>
+            <a:endParaRPr lang="en-US" dirty="0" smtClean="0"/>
+          </a:p>
+          <a:p>
+            <a:r>
+              <a:rPr lang="en-US" dirty="0" smtClean="0"/>
+              <a:t>Part II: Code Development</a:t>
+            </a:r>
+            <a:endParaRPr lang="en-US" dirty="0" smtClean="0"/>
           </a:p>
           <a:p>
             <a:pPr lvl="1"/>
             <a:r>
               <a:rPr lang="en-US" dirty="0" smtClean="0"/>
-              <a:t>Easier to deal with boundary conditions</a:t>
-            </a:r>
+              <a:t>Software </a:t>
+            </a:r>
+            <a:r>
+              <a:rPr lang="en-US" dirty="0" smtClean="0"/>
+              <a:t>Engineering at </a:t>
+            </a:r>
+            <a:r>
+              <a:rPr lang="en-US" dirty="0" smtClean="0"/>
+              <a:t>VT</a:t>
+            </a:r>
+            <a:endParaRPr lang="en-US" dirty="0" smtClean="0"/>
+          </a:p>
+          <a:p>
             <a:endParaRPr lang="en-US" dirty="0"/>
           </a:p>
         </p:txBody>
@@ -4341,7 +4619,7 @@
           <a:p>
             <a:r>
               <a:rPr lang="en-US" dirty="0" smtClean="0"/>
-              <a:t>Error Estimation and TE</a:t>
+              <a:t>Continuous Adjoint</a:t>
             </a:r>
             <a:endParaRPr lang="en-US" dirty="0"/>
           </a:p>
@@ -4360,82 +4638,60 @@
         <p:spPr/>
         <p:txBody>
           <a:bodyPr>
-            <a:normAutofit/>
+            <a:normAutofit fontScale="92500" lnSpcReduction="20000"/>
           </a:bodyPr>
           <a:lstStyle/>
           <a:p>
             <a:r>
               <a:rPr lang="en-US" dirty="0" smtClean="0"/>
-              <a:t>I left </a:t>
+              <a:t>The VT AOE CFD research group has a strong focus on </a:t>
+            </a:r>
+            <a:r>
+              <a:rPr lang="en-US" dirty="0" smtClean="0"/>
+              <a:t>algorithm development</a:t>
+            </a:r>
+            <a:r>
+              <a:rPr lang="en-US" dirty="0" smtClean="0"/>
+              <a:t>, </a:t>
+            </a:r>
+            <a:r>
+              <a:rPr lang="en-US" dirty="0" smtClean="0"/>
+              <a:t>hence systems with exact solutions are often studied as testing ground problems</a:t>
+            </a:r>
+          </a:p>
+          <a:p>
+            <a:r>
+              <a:rPr lang="en-US" dirty="0" smtClean="0"/>
+              <a:t>As such, my initial work with </a:t>
             </a:r>
             <a:r>
               <a:rPr lang="en-US" dirty="0" err="1" smtClean="0"/>
-              <a:t>LaRC</a:t>
-            </a:r>
-            <a:r>
-              <a:rPr lang="en-US" dirty="0" smtClean="0"/>
-              <a:t> last year with a lingering question about how each term in the </a:t>
-            </a:r>
-            <a:r>
-              <a:rPr lang="en-US" dirty="0" smtClean="0"/>
-              <a:t>adjoint </a:t>
-            </a:r>
-            <a:r>
-              <a:rPr lang="en-US" dirty="0" err="1" smtClean="0"/>
-              <a:t>Lagrangian</a:t>
-            </a:r>
-            <a:r>
-              <a:rPr lang="en-US" dirty="0" smtClean="0"/>
-              <a:t> </a:t>
-            </a:r>
-            <a:r>
-              <a:rPr lang="en-US" dirty="0" smtClean="0"/>
-              <a:t>equation </a:t>
-            </a:r>
-            <a:r>
-              <a:rPr lang="en-US" dirty="0" smtClean="0"/>
-              <a:t>related to the TE and </a:t>
-            </a:r>
-            <a:r>
-              <a:rPr lang="en-US" dirty="0" smtClean="0"/>
-              <a:t>DE</a:t>
-            </a:r>
-            <a:endParaRPr lang="en-US" dirty="0" smtClean="0"/>
-          </a:p>
-          <a:p>
-            <a:r>
-              <a:rPr lang="en-US" dirty="0" smtClean="0"/>
-              <a:t>Definitions</a:t>
+              <a:t>adjoints</a:t>
+            </a:r>
+            <a:r>
+              <a:rPr lang="en-US" dirty="0" smtClean="0"/>
+              <a:t> at VT consisted of (re)deriving the analytic adjoint equations for several systems, including general boundary conditions</a:t>
             </a:r>
           </a:p>
           <a:p>
             <a:pPr lvl="1"/>
             <a:r>
               <a:rPr lang="en-US" dirty="0" smtClean="0"/>
-              <a:t>TE is the difference between the continuous and discrete </a:t>
-            </a:r>
-            <a:r>
-              <a:rPr lang="en-US" i="1" dirty="0" smtClean="0"/>
-              <a:t>Equations</a:t>
-            </a:r>
-            <a:r>
-              <a:rPr lang="en-US" dirty="0" smtClean="0"/>
-              <a:t> of Interest (EOI)</a:t>
+              <a:t>Linear Advection</a:t>
             </a:r>
           </a:p>
           <a:p>
             <a:pPr lvl="1"/>
             <a:r>
               <a:rPr lang="en-US" dirty="0" smtClean="0"/>
-              <a:t>DE is the difference between the </a:t>
-            </a:r>
-            <a:r>
-              <a:rPr lang="en-US" i="1" dirty="0" smtClean="0"/>
-              <a:t>solutions</a:t>
-            </a:r>
-            <a:r>
-              <a:rPr lang="en-US" dirty="0" smtClean="0"/>
-              <a:t> of the continuous and discrete EOI</a:t>
+              <a:t>Burgers’ Equation</a:t>
+            </a:r>
+          </a:p>
+          <a:p>
+            <a:pPr lvl="1"/>
+            <a:r>
+              <a:rPr lang="en-US" dirty="0" smtClean="0"/>
+              <a:t>‘N’-D Euler Equations</a:t>
             </a:r>
           </a:p>
         </p:txBody>
@@ -4482,7 +4738,290 @@
           <a:p>
             <a:r>
               <a:rPr lang="en-US" dirty="0" smtClean="0"/>
-              <a:t>Error Estimation and TE</a:t>
+              <a:t>Continuous Adjoint</a:t>
+            </a:r>
+            <a:endParaRPr lang="en-US" dirty="0"/>
+          </a:p>
+        </p:txBody>
+      </p:sp>
+      <p:sp>
+        <p:nvSpPr>
+          <p:cNvPr id="3" name="Content Placeholder 2"/>
+          <p:cNvSpPr>
+            <a:spLocks noGrp="1"/>
+          </p:cNvSpPr>
+          <p:nvPr>
+            <p:ph idx="1"/>
+          </p:nvPr>
+        </p:nvSpPr>
+        <p:spPr/>
+        <p:txBody>
+          <a:bodyPr/>
+          <a:lstStyle/>
+          <a:p>
+            <a:r>
+              <a:rPr lang="en-US" dirty="0" smtClean="0"/>
+              <a:t>The process of deriving the analytic adjoint was helpful for understanding what drives the adjoint solution and boundary conditions</a:t>
+            </a:r>
+          </a:p>
+          <a:p>
+            <a:r>
+              <a:rPr lang="en-US" dirty="0" smtClean="0"/>
+              <a:t>This being said, all future work will focus on discrete </a:t>
+            </a:r>
+            <a:r>
+              <a:rPr lang="en-US" dirty="0" err="1" smtClean="0"/>
+              <a:t>adjoints</a:t>
+            </a:r>
+            <a:endParaRPr lang="en-US" dirty="0" smtClean="0"/>
+          </a:p>
+          <a:p>
+            <a:pPr lvl="1"/>
+            <a:r>
+              <a:rPr lang="en-US" dirty="0" smtClean="0"/>
+              <a:t>Encourages development of implicit methods</a:t>
+            </a:r>
+          </a:p>
+          <a:p>
+            <a:pPr lvl="1"/>
+            <a:r>
+              <a:rPr lang="en-US" dirty="0" smtClean="0"/>
+              <a:t>Easier to deal with boundary conditions</a:t>
+            </a:r>
+            <a:endParaRPr lang="en-US" dirty="0"/>
+          </a:p>
+        </p:txBody>
+      </p:sp>
+    </p:spTree>
+  </p:cSld>
+  <p:clrMapOvr>
+    <a:masterClrMapping/>
+  </p:clrMapOvr>
+</p:sld>
+</file>
+
+<file path=ppt/slides/slide6.xml><?xml version="1.0" encoding="utf-8"?>
+<p:sld xmlns:a="http://schemas.openxmlformats.org/drawingml/2006/main" xmlns:r="http://schemas.openxmlformats.org/officeDocument/2006/relationships" xmlns:p="http://schemas.openxmlformats.org/presentationml/2006/main">
+  <p:cSld>
+    <p:spTree>
+      <p:nvGrpSpPr>
+        <p:cNvPr id="1" name=""/>
+        <p:cNvGrpSpPr/>
+        <p:nvPr/>
+      </p:nvGrpSpPr>
+      <p:grpSpPr>
+        <a:xfrm>
+          <a:off x="0" y="0"/>
+          <a:ext cx="0" cy="0"/>
+          <a:chOff x="0" y="0"/>
+          <a:chExt cx="0" cy="0"/>
+        </a:xfrm>
+      </p:grpSpPr>
+      <p:sp>
+        <p:nvSpPr>
+          <p:cNvPr id="2" name="Title 1"/>
+          <p:cNvSpPr>
+            <a:spLocks noGrp="1"/>
+          </p:cNvSpPr>
+          <p:nvPr>
+            <p:ph type="title"/>
+          </p:nvPr>
+        </p:nvSpPr>
+        <p:spPr/>
+        <p:txBody>
+          <a:bodyPr>
+            <a:normAutofit/>
+          </a:bodyPr>
+          <a:lstStyle/>
+          <a:p>
+            <a:r>
+              <a:rPr lang="en-US" dirty="0" smtClean="0"/>
+              <a:t>Error </a:t>
+            </a:r>
+            <a:r>
+              <a:rPr lang="en-US" dirty="0" smtClean="0"/>
+              <a:t>Estimation</a:t>
+            </a:r>
+            <a:endParaRPr lang="en-US" dirty="0"/>
+          </a:p>
+        </p:txBody>
+      </p:sp>
+      <p:sp>
+        <p:nvSpPr>
+          <p:cNvPr id="3" name="Content Placeholder 2"/>
+          <p:cNvSpPr>
+            <a:spLocks noGrp="1"/>
+          </p:cNvSpPr>
+          <p:nvPr>
+            <p:ph idx="1"/>
+          </p:nvPr>
+        </p:nvSpPr>
+        <p:spPr/>
+        <p:txBody>
+          <a:bodyPr>
+            <a:normAutofit fontScale="92500" lnSpcReduction="20000"/>
+          </a:bodyPr>
+          <a:lstStyle/>
+          <a:p>
+            <a:r>
+              <a:rPr lang="en-US" dirty="0" smtClean="0"/>
+              <a:t>The goal of error estimation is to bridge the gap between simulations and </a:t>
+            </a:r>
+            <a:r>
+              <a:rPr lang="en-US" dirty="0" smtClean="0"/>
+              <a:t>real </a:t>
+            </a:r>
+            <a:r>
+              <a:rPr lang="en-US" dirty="0" smtClean="0"/>
+              <a:t>life</a:t>
+            </a:r>
+          </a:p>
+          <a:p>
+            <a:pPr lvl="1"/>
+            <a:r>
+              <a:rPr lang="en-US" dirty="0" smtClean="0"/>
+              <a:t>Discretization </a:t>
+            </a:r>
+            <a:r>
+              <a:rPr lang="en-US" dirty="0" smtClean="0"/>
+              <a:t>error (DE) is the difference between the </a:t>
+            </a:r>
+            <a:r>
+              <a:rPr lang="en-US" i="1" dirty="0" smtClean="0"/>
+              <a:t>solutions</a:t>
+            </a:r>
+            <a:r>
+              <a:rPr lang="en-US" dirty="0" smtClean="0"/>
+              <a:t> to the continuous and discrete </a:t>
+            </a:r>
+            <a:r>
+              <a:rPr lang="en-US" dirty="0" smtClean="0"/>
+              <a:t>EOI</a:t>
+            </a:r>
+          </a:p>
+          <a:p>
+            <a:pPr lvl="1"/>
+            <a:r>
+              <a:rPr lang="en-US" dirty="0" smtClean="0"/>
+              <a:t>Truncation error (TE) </a:t>
+            </a:r>
+            <a:r>
+              <a:rPr lang="en-US" dirty="0" smtClean="0"/>
+              <a:t>is the difference between the </a:t>
+            </a:r>
+            <a:r>
+              <a:rPr lang="en-US" dirty="0" smtClean="0"/>
+              <a:t>continuous </a:t>
+            </a:r>
+            <a:r>
+              <a:rPr lang="en-US" dirty="0" smtClean="0"/>
+              <a:t>and discrete </a:t>
+            </a:r>
+            <a:r>
+              <a:rPr lang="en-US" i="1" dirty="0" smtClean="0"/>
+              <a:t>Equations</a:t>
+            </a:r>
+            <a:r>
+              <a:rPr lang="en-US" dirty="0" smtClean="0"/>
+              <a:t> of Interest (EOI</a:t>
+            </a:r>
+            <a:r>
+              <a:rPr lang="en-US" dirty="0" smtClean="0"/>
+              <a:t>), i.e.,</a:t>
+            </a:r>
+            <a:r>
+              <a:rPr lang="en-US" i="1" dirty="0" smtClean="0"/>
+              <a:t> this is the cause of the gap</a:t>
+            </a:r>
+            <a:endParaRPr lang="en-US" dirty="0" smtClean="0"/>
+          </a:p>
+          <a:p>
+            <a:r>
+              <a:rPr lang="en-US" dirty="0" smtClean="0"/>
+              <a:t>I </a:t>
+            </a:r>
+            <a:r>
+              <a:rPr lang="en-US" dirty="0" smtClean="0"/>
+              <a:t>left </a:t>
+            </a:r>
+            <a:r>
+              <a:rPr lang="en-US" dirty="0" err="1" smtClean="0"/>
+              <a:t>LaRC</a:t>
+            </a:r>
+            <a:r>
+              <a:rPr lang="en-US" dirty="0" smtClean="0"/>
+              <a:t> last year with a lingering question about how each term in the adjoint </a:t>
+            </a:r>
+            <a:r>
+              <a:rPr lang="en-US" dirty="0" err="1" smtClean="0"/>
+              <a:t>Lagrangian</a:t>
+            </a:r>
+            <a:r>
+              <a:rPr lang="en-US" dirty="0" smtClean="0"/>
+              <a:t> equation related to the TE and </a:t>
+            </a:r>
+            <a:r>
+              <a:rPr lang="en-US" dirty="0" smtClean="0"/>
+              <a:t>DE</a:t>
+            </a:r>
+          </a:p>
+          <a:p>
+            <a:pPr lvl="1"/>
+            <a:r>
+              <a:rPr lang="en-US" dirty="0" smtClean="0"/>
+              <a:t>i.e., Why do adjoint methods work?</a:t>
+            </a:r>
+            <a:endParaRPr lang="en-US" dirty="0" smtClean="0"/>
+          </a:p>
+        </p:txBody>
+      </p:sp>
+    </p:spTree>
+  </p:cSld>
+  <p:clrMapOvr>
+    <a:masterClrMapping/>
+  </p:clrMapOvr>
+</p:sld>
+</file>
+
+<file path=ppt/slides/slide7.xml><?xml version="1.0" encoding="utf-8"?>
+<p:sld xmlns:a="http://schemas.openxmlformats.org/drawingml/2006/main" xmlns:r="http://schemas.openxmlformats.org/officeDocument/2006/relationships" xmlns:p="http://schemas.openxmlformats.org/presentationml/2006/main">
+  <p:cSld>
+    <p:spTree>
+      <p:nvGrpSpPr>
+        <p:cNvPr id="1" name=""/>
+        <p:cNvGrpSpPr/>
+        <p:nvPr/>
+      </p:nvGrpSpPr>
+      <p:grpSpPr>
+        <a:xfrm>
+          <a:off x="0" y="0"/>
+          <a:ext cx="0" cy="0"/>
+          <a:chOff x="0" y="0"/>
+          <a:chExt cx="0" cy="0"/>
+        </a:xfrm>
+      </p:grpSpPr>
+      <p:sp>
+        <p:nvSpPr>
+          <p:cNvPr id="2" name="Title 1"/>
+          <p:cNvSpPr>
+            <a:spLocks noGrp="1"/>
+          </p:cNvSpPr>
+          <p:nvPr>
+            <p:ph type="title"/>
+          </p:nvPr>
+        </p:nvSpPr>
+        <p:spPr/>
+        <p:txBody>
+          <a:bodyPr/>
+          <a:lstStyle/>
+          <a:p>
+            <a:r>
+              <a:rPr lang="en-US" dirty="0" smtClean="0"/>
+              <a:t>Error Estimation and </a:t>
+            </a:r>
+            <a:r>
+              <a:rPr lang="en-US" dirty="0" err="1" smtClean="0"/>
+              <a:t>Adjoints</a:t>
             </a:r>
             <a:endParaRPr lang="en-US" dirty="0"/>
           </a:p>
@@ -4512,13 +5051,8 @@
           <a:p>
             <a:r>
               <a:rPr lang="en-US" dirty="0" smtClean="0"/>
-              <a:t>Working in continuous space, perform TSE’s about the governing equations and functional of </a:t>
-            </a:r>
-            <a:r>
-              <a:rPr lang="en-US" dirty="0" smtClean="0"/>
-              <a:t>interest:</a:t>
-            </a:r>
-            <a:endParaRPr lang="en-US" dirty="0" smtClean="0"/>
+              <a:t>Working in continuous space, perform TSE’s about the governing equations and functional of interest:</a:t>
+            </a:r>
           </a:p>
           <a:p>
             <a:endParaRPr lang="en-US" dirty="0" smtClean="0"/>
@@ -4985,7 +5519,7 @@
 </p:sld>
 </file>
 
-<file path=ppt/slides/slide6.xml><?xml version="1.0" encoding="utf-8"?>
+<file path=ppt/slides/slide8.xml><?xml version="1.0" encoding="utf-8"?>
 <p:sld xmlns:a="http://schemas.openxmlformats.org/drawingml/2006/main" xmlns:r="http://schemas.openxmlformats.org/officeDocument/2006/relationships" xmlns:p="http://schemas.openxmlformats.org/presentationml/2006/main">
   <p:cSld>
     <p:spTree>
@@ -5019,7 +5553,11 @@
           <a:p>
             <a:r>
               <a:rPr lang="en-US" dirty="0" smtClean="0"/>
-              <a:t>Error Estimation and TE</a:t>
+              <a:t>Error Estimation and </a:t>
+            </a:r>
+            <a:r>
+              <a:rPr lang="en-US" dirty="0" err="1" smtClean="0"/>
+              <a:t>Adjoints</a:t>
             </a:r>
             <a:endParaRPr lang="en-US" dirty="0"/>
           </a:p>
@@ -5037,28 +5575,28 @@
         </p:nvSpPr>
         <p:spPr/>
         <p:txBody>
-          <a:bodyPr/>
-          <a:lstStyle/>
+          <a:bodyPr>
+            <a:normAutofit/>
+          </a:bodyPr>
+          <a:lstStyle/>
+          <a:p>
+            <a:endParaRPr lang="en-US" dirty="0" smtClean="0"/>
+          </a:p>
           <a:p>
             <a:r>
               <a:rPr lang="en-US" dirty="0" smtClean="0"/>
               <a:t>If </a:t>
             </a:r>
             <a:r>
-              <a:rPr lang="en-US" i="1" dirty="0" smtClean="0"/>
+              <a:rPr lang="en-US" i="1" dirty="0" smtClean="0">
+                <a:latin typeface="Times New Roman" pitchFamily="18" charset="0"/>
+                <a:cs typeface="Times New Roman" pitchFamily="18" charset="0"/>
+              </a:rPr>
               <a:t>u</a:t>
             </a:r>
             <a:r>
               <a:rPr lang="en-US" dirty="0" smtClean="0"/>
-              <a:t> </a:t>
-            </a:r>
-            <a:r>
-              <a:rPr lang="en-US" dirty="0" smtClean="0"/>
-              <a:t>is </a:t>
-            </a:r>
-            <a:r>
-              <a:rPr lang="en-US" dirty="0" smtClean="0"/>
-              <a:t>a prolongation of the exact solution to a set of </a:t>
+              <a:t> is a prolongation of the exact solution to a set of </a:t>
             </a:r>
             <a:r>
               <a:rPr lang="en-US" dirty="0" err="1" smtClean="0"/>
@@ -5071,9 +5609,9 @@
             <a:endParaRPr lang="en-US" i="1" dirty="0" smtClean="0"/>
           </a:p>
           <a:p>
-            <a:endParaRPr lang="en-US" dirty="0" smtClean="0"/>
-          </a:p>
-          <a:p>
+            <a:pPr>
+              <a:buNone/>
+            </a:pPr>
             <a:endParaRPr lang="en-US" dirty="0" smtClean="0"/>
           </a:p>
           <a:p>
@@ -5151,7 +5689,7 @@
         </p:blipFill>
         <p:spPr bwMode="auto">
           <a:xfrm>
-            <a:off x="838200" y="3352800"/>
+            <a:off x="838200" y="3581400"/>
             <a:ext cx="7668768" cy="704850"/>
           </a:xfrm>
           <a:prstGeom prst="rect">
@@ -5502,6 +6040,43 @@
           </a:p>
         </p:txBody>
       </p:sp>
+      <p:pic>
+        <p:nvPicPr>
+          <p:cNvPr id="13" name="Picture 7"/>
+          <p:cNvPicPr>
+            <a:picLocks noChangeAspect="1" noChangeArrowheads="1"/>
+          </p:cNvPicPr>
+          <p:nvPr/>
+        </p:nvPicPr>
+        <p:blipFill>
+          <a:blip r:embed="rId5" cstate="print">
+            <a:clrChange>
+              <a:clrFrom>
+                <a:srgbClr val="FFFFFF"/>
+              </a:clrFrom>
+              <a:clrTo>
+                <a:srgbClr val="FFFFFF">
+                  <a:alpha val="0"/>
+                </a:srgbClr>
+              </a:clrTo>
+            </a:clrChange>
+          </a:blip>
+          <a:srcRect/>
+          <a:stretch>
+            <a:fillRect/>
+          </a:stretch>
+        </p:blipFill>
+        <p:spPr bwMode="auto">
+          <a:xfrm>
+            <a:off x="838200" y="1600200"/>
+            <a:ext cx="7653867" cy="609600"/>
+          </a:xfrm>
+          <a:prstGeom prst="rect">
+            <a:avLst/>
+          </a:prstGeom>
+          <a:noFill/>
+        </p:spPr>
+      </p:pic>
     </p:spTree>
   </p:cSld>
   <p:clrMapOvr>
@@ -5510,7 +6085,7 @@
 </p:sld>
 </file>
 
-<file path=ppt/slides/slide7.xml><?xml version="1.0" encoding="utf-8"?>
+<file path=ppt/slides/slide9.xml><?xml version="1.0" encoding="utf-8"?>
 <p:sld xmlns:a="http://schemas.openxmlformats.org/drawingml/2006/main" xmlns:r="http://schemas.openxmlformats.org/officeDocument/2006/relationships" xmlns:p="http://schemas.openxmlformats.org/presentationml/2006/main">
   <p:cSld>
     <p:spTree>
@@ -5544,7 +6119,19 @@
           <a:p>
             <a:r>
               <a:rPr lang="en-US" dirty="0" smtClean="0"/>
-              <a:t>Error Estimation and TE</a:t>
+              <a:t>Error </a:t>
+            </a:r>
+            <a:r>
+              <a:rPr lang="en-US" dirty="0" smtClean="0"/>
+              <a:t>Estimation, </a:t>
+            </a:r>
+            <a:r>
+              <a:rPr lang="en-US" dirty="0" err="1" smtClean="0"/>
+              <a:t>Adjoints</a:t>
+            </a:r>
+            <a:r>
+              <a:rPr lang="en-US" dirty="0" smtClean="0"/>
+              <a:t>, and TE</a:t>
             </a:r>
             <a:endParaRPr lang="en-US" dirty="0"/>
           </a:p>
@@ -5645,218 +6232,6 @@
           <a:noFill/>
         </p:spPr>
       </p:pic>
-    </p:spTree>
-  </p:cSld>
-  <p:clrMapOvr>
-    <a:masterClrMapping/>
-  </p:clrMapOvr>
-</p:sld>
-</file>
-
-<file path=ppt/slides/slide8.xml><?xml version="1.0" encoding="utf-8"?>
-<p:sld xmlns:a="http://schemas.openxmlformats.org/drawingml/2006/main" xmlns:r="http://schemas.openxmlformats.org/officeDocument/2006/relationships" xmlns:p="http://schemas.openxmlformats.org/presentationml/2006/main">
-  <p:cSld>
-    <p:spTree>
-      <p:nvGrpSpPr>
-        <p:cNvPr id="1" name=""/>
-        <p:cNvGrpSpPr/>
-        <p:nvPr/>
-      </p:nvGrpSpPr>
-      <p:grpSpPr>
-        <a:xfrm>
-          <a:off x="0" y="0"/>
-          <a:ext cx="0" cy="0"/>
-          <a:chOff x="0" y="0"/>
-          <a:chExt cx="0" cy="0"/>
-        </a:xfrm>
-      </p:grpSpPr>
-      <p:sp>
-        <p:nvSpPr>
-          <p:cNvPr id="2" name="Title 1"/>
-          <p:cNvSpPr>
-            <a:spLocks noGrp="1"/>
-          </p:cNvSpPr>
-          <p:nvPr>
-            <p:ph type="title"/>
-          </p:nvPr>
-        </p:nvSpPr>
-        <p:spPr/>
-        <p:txBody>
-          <a:bodyPr/>
-          <a:lstStyle/>
-          <a:p>
-            <a:r>
-              <a:rPr lang="en-US" dirty="0" smtClean="0"/>
-              <a:t>Adaptation and TE</a:t>
-            </a:r>
-            <a:endParaRPr lang="en-US" dirty="0"/>
-          </a:p>
-        </p:txBody>
-      </p:sp>
-      <p:sp>
-        <p:nvSpPr>
-          <p:cNvPr id="3" name="Content Placeholder 2"/>
-          <p:cNvSpPr>
-            <a:spLocks noGrp="1"/>
-          </p:cNvSpPr>
-          <p:nvPr>
-            <p:ph idx="1"/>
-          </p:nvPr>
-        </p:nvSpPr>
-        <p:spPr/>
-        <p:txBody>
-          <a:bodyPr/>
-          <a:lstStyle/>
-          <a:p>
-            <a:r>
-              <a:rPr lang="en-US" dirty="0" smtClean="0"/>
-              <a:t>As has been discussed before, TE is the source of DE</a:t>
-            </a:r>
-          </a:p>
-          <a:p>
-            <a:r>
-              <a:rPr lang="en-US" dirty="0" smtClean="0"/>
-              <a:t>The </a:t>
-            </a:r>
-            <a:r>
-              <a:rPr lang="en-US" dirty="0" err="1" smtClean="0"/>
-              <a:t>Venditti</a:t>
-            </a:r>
-            <a:r>
-              <a:rPr lang="en-US" dirty="0" smtClean="0"/>
-              <a:t> adaptation approach targets a mixed inner product of DE and TE between the primal and dual problems</a:t>
-            </a:r>
-          </a:p>
-          <a:p>
-            <a:r>
-              <a:rPr lang="en-US" dirty="0" smtClean="0"/>
-              <a:t>This works well in a purely </a:t>
-            </a:r>
-            <a:r>
-              <a:rPr lang="en-US" dirty="0" smtClean="0"/>
-              <a:t>discrete </a:t>
-            </a:r>
-            <a:r>
-              <a:rPr lang="en-US" dirty="0" smtClean="0"/>
-              <a:t>world, but to close the gap between </a:t>
-            </a:r>
-            <a:r>
-              <a:rPr lang="en-US" dirty="0" smtClean="0"/>
-              <a:t>discrete </a:t>
-            </a:r>
-            <a:r>
-              <a:rPr lang="en-US" dirty="0" smtClean="0"/>
-              <a:t>and continuous the TE has to be reduced</a:t>
-            </a:r>
-            <a:endParaRPr lang="en-US" dirty="0"/>
-          </a:p>
-        </p:txBody>
-      </p:sp>
-    </p:spTree>
-  </p:cSld>
-  <p:clrMapOvr>
-    <a:masterClrMapping/>
-  </p:clrMapOvr>
-</p:sld>
-</file>
-
-<file path=ppt/slides/slide9.xml><?xml version="1.0" encoding="utf-8"?>
-<p:sld xmlns:a="http://schemas.openxmlformats.org/drawingml/2006/main" xmlns:r="http://schemas.openxmlformats.org/officeDocument/2006/relationships" xmlns:p="http://schemas.openxmlformats.org/presentationml/2006/main">
-  <p:cSld>
-    <p:spTree>
-      <p:nvGrpSpPr>
-        <p:cNvPr id="1" name=""/>
-        <p:cNvGrpSpPr/>
-        <p:nvPr/>
-      </p:nvGrpSpPr>
-      <p:grpSpPr>
-        <a:xfrm>
-          <a:off x="0" y="0"/>
-          <a:ext cx="0" cy="0"/>
-          <a:chOff x="0" y="0"/>
-          <a:chExt cx="0" cy="0"/>
-        </a:xfrm>
-      </p:grpSpPr>
-      <p:sp>
-        <p:nvSpPr>
-          <p:cNvPr id="2" name="Title 1"/>
-          <p:cNvSpPr>
-            <a:spLocks noGrp="1"/>
-          </p:cNvSpPr>
-          <p:nvPr>
-            <p:ph type="title"/>
-          </p:nvPr>
-        </p:nvSpPr>
-        <p:spPr/>
-        <p:txBody>
-          <a:bodyPr/>
-          <a:lstStyle/>
-          <a:p>
-            <a:r>
-              <a:rPr lang="en-US" dirty="0" smtClean="0"/>
-              <a:t>Work at </a:t>
-            </a:r>
-            <a:r>
-              <a:rPr lang="en-US" dirty="0" err="1" smtClean="0"/>
-              <a:t>LaRC</a:t>
-            </a:r>
-            <a:endParaRPr lang="en-US" dirty="0"/>
-          </a:p>
-        </p:txBody>
-      </p:sp>
-      <p:sp>
-        <p:nvSpPr>
-          <p:cNvPr id="3" name="Content Placeholder 2"/>
-          <p:cNvSpPr>
-            <a:spLocks noGrp="1"/>
-          </p:cNvSpPr>
-          <p:nvPr>
-            <p:ph idx="1"/>
-          </p:nvPr>
-        </p:nvSpPr>
-        <p:spPr/>
-        <p:txBody>
-          <a:bodyPr>
-            <a:normAutofit/>
-          </a:bodyPr>
-          <a:lstStyle/>
-          <a:p>
-            <a:r>
-              <a:rPr lang="en-US" dirty="0" smtClean="0"/>
-              <a:t>Continue work on relationship between adjoint methods and other error estimation/adaptation techniques</a:t>
-            </a:r>
-          </a:p>
-          <a:p>
-            <a:r>
-              <a:rPr lang="en-US" dirty="0" smtClean="0"/>
-              <a:t>Finalize 1D Burgers’, Quasi-1D nozzle and 2D Burgers’ codes with implicit </a:t>
-            </a:r>
-            <a:r>
-              <a:rPr lang="en-US" dirty="0" smtClean="0"/>
-              <a:t>formulations</a:t>
-            </a:r>
-            <a:endParaRPr lang="en-US" dirty="0" smtClean="0"/>
-          </a:p>
-          <a:p>
-            <a:r>
-              <a:rPr lang="en-US" dirty="0" smtClean="0"/>
-              <a:t>Investigate TE as a functional where the approximate form is known</a:t>
-            </a:r>
-          </a:p>
-          <a:p>
-            <a:pPr lvl="1"/>
-            <a:r>
-              <a:rPr lang="en-US" dirty="0" smtClean="0"/>
-              <a:t>Proof of concept </a:t>
-            </a:r>
-            <a:r>
-              <a:rPr lang="en-US" dirty="0" smtClean="0"/>
-              <a:t>work in development</a:t>
-            </a:r>
-            <a:endParaRPr lang="en-US" dirty="0" smtClean="0"/>
-          </a:p>
-        </p:txBody>
-      </p:sp>
     </p:spTree>
   </p:cSld>
   <p:clrMapOvr>

</xml_diff>

<commit_message>
to add final version
</commit_message>
<xml_diff>
--- a/June_Overview.pptx
+++ b/June_Overview.pptx
@@ -16,13 +16,15 @@
     <p:sldId id="269" r:id="rId10"/>
     <p:sldId id="268" r:id="rId11"/>
     <p:sldId id="271" r:id="rId12"/>
-    <p:sldId id="258" r:id="rId13"/>
-    <p:sldId id="261" r:id="rId14"/>
-    <p:sldId id="262" r:id="rId15"/>
-    <p:sldId id="272" r:id="rId16"/>
-    <p:sldId id="260" r:id="rId17"/>
-    <p:sldId id="265" r:id="rId18"/>
-    <p:sldId id="273" r:id="rId19"/>
+    <p:sldId id="277" r:id="rId13"/>
+    <p:sldId id="278" r:id="rId14"/>
+    <p:sldId id="258" r:id="rId15"/>
+    <p:sldId id="261" r:id="rId16"/>
+    <p:sldId id="262" r:id="rId17"/>
+    <p:sldId id="272" r:id="rId18"/>
+    <p:sldId id="260" r:id="rId19"/>
+    <p:sldId id="265" r:id="rId20"/>
+    <p:sldId id="273" r:id="rId21"/>
   </p:sldIdLst>
   <p:sldSz cx="9144000" cy="6858000" type="screen4x3"/>
   <p:notesSz cx="6858000" cy="9144000"/>
@@ -306,7 +308,7 @@
             <a:fld id="{E0507902-0F62-4629-8640-CB0DA259E3CF}" type="datetimeFigureOut">
               <a:rPr lang="en-US" smtClean="0"/>
               <a:pPr/>
-              <a:t>7/12/2011</a:t>
+              <a:t>7/13/2011</a:t>
             </a:fld>
             <a:endParaRPr lang="en-US"/>
           </a:p>
@@ -473,7 +475,7 @@
             <a:fld id="{E0507902-0F62-4629-8640-CB0DA259E3CF}" type="datetimeFigureOut">
               <a:rPr lang="en-US" smtClean="0"/>
               <a:pPr/>
-              <a:t>7/12/2011</a:t>
+              <a:t>7/13/2011</a:t>
             </a:fld>
             <a:endParaRPr lang="en-US"/>
           </a:p>
@@ -650,7 +652,7 @@
             <a:fld id="{E0507902-0F62-4629-8640-CB0DA259E3CF}" type="datetimeFigureOut">
               <a:rPr lang="en-US" smtClean="0"/>
               <a:pPr/>
-              <a:t>7/12/2011</a:t>
+              <a:t>7/13/2011</a:t>
             </a:fld>
             <a:endParaRPr lang="en-US"/>
           </a:p>
@@ -817,7 +819,7 @@
             <a:fld id="{E0507902-0F62-4629-8640-CB0DA259E3CF}" type="datetimeFigureOut">
               <a:rPr lang="en-US" smtClean="0"/>
               <a:pPr/>
-              <a:t>7/12/2011</a:t>
+              <a:t>7/13/2011</a:t>
             </a:fld>
             <a:endParaRPr lang="en-US"/>
           </a:p>
@@ -1060,7 +1062,7 @@
             <a:fld id="{E0507902-0F62-4629-8640-CB0DA259E3CF}" type="datetimeFigureOut">
               <a:rPr lang="en-US" smtClean="0"/>
               <a:pPr/>
-              <a:t>7/12/2011</a:t>
+              <a:t>7/13/2011</a:t>
             </a:fld>
             <a:endParaRPr lang="en-US"/>
           </a:p>
@@ -1345,7 +1347,7 @@
             <a:fld id="{E0507902-0F62-4629-8640-CB0DA259E3CF}" type="datetimeFigureOut">
               <a:rPr lang="en-US" smtClean="0"/>
               <a:pPr/>
-              <a:t>7/12/2011</a:t>
+              <a:t>7/13/2011</a:t>
             </a:fld>
             <a:endParaRPr lang="en-US"/>
           </a:p>
@@ -1764,7 +1766,7 @@
             <a:fld id="{E0507902-0F62-4629-8640-CB0DA259E3CF}" type="datetimeFigureOut">
               <a:rPr lang="en-US" smtClean="0"/>
               <a:pPr/>
-              <a:t>7/12/2011</a:t>
+              <a:t>7/13/2011</a:t>
             </a:fld>
             <a:endParaRPr lang="en-US"/>
           </a:p>
@@ -1879,7 +1881,7 @@
             <a:fld id="{E0507902-0F62-4629-8640-CB0DA259E3CF}" type="datetimeFigureOut">
               <a:rPr lang="en-US" smtClean="0"/>
               <a:pPr/>
-              <a:t>7/12/2011</a:t>
+              <a:t>7/13/2011</a:t>
             </a:fld>
             <a:endParaRPr lang="en-US"/>
           </a:p>
@@ -1971,7 +1973,7 @@
             <a:fld id="{E0507902-0F62-4629-8640-CB0DA259E3CF}" type="datetimeFigureOut">
               <a:rPr lang="en-US" smtClean="0"/>
               <a:pPr/>
-              <a:t>7/12/2011</a:t>
+              <a:t>7/13/2011</a:t>
             </a:fld>
             <a:endParaRPr lang="en-US"/>
           </a:p>
@@ -2245,7 +2247,7 @@
             <a:fld id="{E0507902-0F62-4629-8640-CB0DA259E3CF}" type="datetimeFigureOut">
               <a:rPr lang="en-US" smtClean="0"/>
               <a:pPr/>
-              <a:t>7/12/2011</a:t>
+              <a:t>7/13/2011</a:t>
             </a:fld>
             <a:endParaRPr lang="en-US"/>
           </a:p>
@@ -2495,7 +2497,7 @@
             <a:fld id="{E0507902-0F62-4629-8640-CB0DA259E3CF}" type="datetimeFigureOut">
               <a:rPr lang="en-US" smtClean="0"/>
               <a:pPr/>
-              <a:t>7/12/2011</a:t>
+              <a:t>7/13/2011</a:t>
             </a:fld>
             <a:endParaRPr lang="en-US"/>
           </a:p>
@@ -2705,7 +2707,7 @@
             <a:fld id="{E0507902-0F62-4629-8640-CB0DA259E3CF}" type="datetimeFigureOut">
               <a:rPr lang="en-US" smtClean="0"/>
               <a:pPr/>
-              <a:t>7/12/2011</a:t>
+              <a:t>7/13/2011</a:t>
             </a:fld>
             <a:endParaRPr lang="en-US"/>
           </a:p>
@@ -3155,6 +3157,13 @@
   <p:clrMapOvr>
     <a:masterClrMapping/>
   </p:clrMapOvr>
+  <p:timing>
+    <p:tnLst>
+      <p:par>
+        <p:cTn id="1" dur="indefinite" restart="never" nodeType="tmRoot"/>
+      </p:par>
+    </p:tnLst>
+  </p:timing>
 </p:sld>
 </file>
 
@@ -3208,10 +3217,15 @@
             <p:ph idx="1"/>
           </p:nvPr>
         </p:nvSpPr>
-        <p:spPr/>
+        <p:spPr>
+          <a:xfrm>
+            <a:off x="457200" y="1600200"/>
+            <a:ext cx="8229600" cy="5029200"/>
+          </a:xfrm>
+        </p:spPr>
         <p:txBody>
           <a:bodyPr>
-            <a:normAutofit fontScale="92500"/>
+            <a:normAutofit/>
           </a:bodyPr>
           <a:lstStyle/>
           <a:p>
@@ -3225,17 +3239,21 @@
             </a:r>
             <a:r>
               <a:rPr lang="en-US" dirty="0" smtClean="0"/>
-              <a:t> adaptation approach targets a mixed inner product of DE and TE between the primal and dual problems</a:t>
-            </a:r>
-          </a:p>
-          <a:p>
-            <a:r>
-              <a:rPr lang="en-US" dirty="0" smtClean="0"/>
-              <a:t>This works well in a purely discrete world, but to close the gap between discrete and continuous the TE has to be </a:t>
-            </a:r>
-            <a:r>
-              <a:rPr lang="en-US" dirty="0" smtClean="0"/>
-              <a:t>reduced</a:t>
+              <a:t> adaptation approach</a:t>
+            </a:r>
+            <a:r>
+              <a:rPr lang="en-US" baseline="30000" dirty="0" smtClean="0"/>
+              <a:t>[2]</a:t>
+            </a:r>
+            <a:r>
+              <a:rPr lang="en-US" dirty="0" smtClean="0"/>
+              <a:t> targets a mixed inner product of DE and TE between the primal and dual problems</a:t>
+            </a:r>
+          </a:p>
+          <a:p>
+            <a:r>
+              <a:rPr lang="en-US" dirty="0" smtClean="0"/>
+              <a:t>This works well in a purely discrete world, but to close the gap between discrete and continuous EOI’s the TE has to be reduced</a:t>
             </a:r>
           </a:p>
           <a:p>
@@ -3244,15 +3262,13 @@
               <a:rPr lang="en-US" dirty="0" smtClean="0"/>
               <a:t>This is the reason that using drag as a functional doesn’t necessarily improve the final lift calculation</a:t>
             </a:r>
-            <a:endParaRPr lang="en-US" dirty="0" smtClean="0"/>
           </a:p>
           <a:p>
             <a:pPr lvl="1"/>
             <a:r>
               <a:rPr lang="en-US" dirty="0" smtClean="0"/>
-              <a:t>How best to do this is an ongoing research area</a:t>
-            </a:r>
-            <a:endParaRPr lang="en-US" dirty="0"/>
+              <a:t>How best to do this is an open question</a:t>
+            </a:r>
           </a:p>
         </p:txBody>
       </p:sp>
@@ -3261,6 +3277,13 @@
   <p:clrMapOvr>
     <a:masterClrMapping/>
   </p:clrMapOvr>
+  <p:timing>
+    <p:tnLst>
+      <p:par>
+        <p:cTn id="1" dur="indefinite" restart="never" nodeType="tmRoot"/>
+      </p:par>
+    </p:tnLst>
+  </p:timing>
 </p:sld>
 </file>
 
@@ -3321,17 +3344,20 @@
         <p:spPr/>
         <p:txBody>
           <a:bodyPr>
-            <a:normAutofit fontScale="77500" lnSpcReduction="20000"/>
+            <a:normAutofit/>
           </a:bodyPr>
           <a:lstStyle/>
           <a:p>
             <a:r>
               <a:rPr lang="en-US" dirty="0" smtClean="0"/>
-              <a:t>Continue work on relationship between adjoint methods and other error estimation/adaptation </a:t>
-            </a:r>
-            <a:r>
-              <a:rPr lang="en-US" dirty="0" smtClean="0"/>
-              <a:t>techniques</a:t>
+              <a:t>Continue work on relationship between adjoint methods and other error estimation/adaptation techniques</a:t>
+            </a:r>
+          </a:p>
+          <a:p>
+            <a:pPr lvl="1"/>
+            <a:r>
+              <a:rPr lang="en-US" dirty="0" smtClean="0"/>
+              <a:t>Need code to do comparisons</a:t>
             </a:r>
           </a:p>
           <a:p>
@@ -3344,69 +3370,16 @@
             <a:pPr lvl="1"/>
             <a:r>
               <a:rPr lang="en-US" dirty="0" smtClean="0"/>
-              <a:t>Needed for </a:t>
-            </a:r>
-            <a:r>
-              <a:rPr lang="en-US" dirty="0" smtClean="0"/>
-              <a:t>discrete adjoint work</a:t>
-            </a:r>
-            <a:endParaRPr lang="en-US" dirty="0" smtClean="0"/>
-          </a:p>
-          <a:p>
-            <a:r>
-              <a:rPr lang="en-US" dirty="0" smtClean="0"/>
-              <a:t>Continue with entropy adjoint research</a:t>
-            </a:r>
-          </a:p>
-          <a:p>
-            <a:pPr lvl="1"/>
-            <a:r>
-              <a:rPr lang="en-US" dirty="0" smtClean="0"/>
-              <a:t>Entropy variables already in 1D Euler code, need to integrate the DE and TE estimates for </a:t>
-            </a:r>
-            <a:r>
-              <a:rPr lang="en-US" dirty="0" smtClean="0"/>
-              <a:t>comparison ( should be done soon )</a:t>
-            </a:r>
-            <a:endParaRPr lang="en-US" dirty="0" smtClean="0"/>
-          </a:p>
-          <a:p>
-            <a:r>
-              <a:rPr lang="en-US" dirty="0" smtClean="0"/>
-              <a:t>Investigate TE as a functional where </a:t>
-            </a:r>
-            <a:r>
-              <a:rPr lang="en-US" dirty="0" smtClean="0"/>
-              <a:t>an </a:t>
-            </a:r>
-            <a:r>
-              <a:rPr lang="en-US" dirty="0" smtClean="0"/>
-              <a:t>approximate </a:t>
-            </a:r>
-            <a:r>
-              <a:rPr lang="en-US" dirty="0" smtClean="0"/>
-              <a:t>form is used</a:t>
-            </a:r>
-            <a:endParaRPr lang="en-US" dirty="0" smtClean="0"/>
-          </a:p>
-          <a:p>
-            <a:pPr lvl="1"/>
-            <a:r>
-              <a:rPr lang="en-US" dirty="0" smtClean="0"/>
-              <a:t>Proof of concept work in </a:t>
-            </a:r>
-            <a:r>
-              <a:rPr lang="en-US" dirty="0" smtClean="0"/>
-              <a:t>development</a:t>
-            </a:r>
-            <a:endParaRPr lang="en-US" dirty="0" smtClean="0"/>
-          </a:p>
-          <a:p>
-            <a:r>
-              <a:rPr lang="en-US" dirty="0" smtClean="0"/>
-              <a:t>Work on adaptation mechanics</a:t>
-            </a:r>
-            <a:endParaRPr lang="en-US" dirty="0" smtClean="0"/>
+              <a:t>Needed for discrete </a:t>
+            </a:r>
+            <a:r>
+              <a:rPr lang="en-US" dirty="0" err="1" smtClean="0"/>
+              <a:t>adjoint</a:t>
+            </a:r>
+            <a:r>
+              <a:rPr lang="en-US" dirty="0" smtClean="0"/>
+              <a:t> work</a:t>
+            </a:r>
           </a:p>
         </p:txBody>
       </p:sp>
@@ -3415,6 +3388,13 @@
   <p:clrMapOvr>
     <a:masterClrMapping/>
   </p:clrMapOvr>
+  <p:timing>
+    <p:tnLst>
+      <p:par>
+        <p:cTn id="1" dur="indefinite" restart="never" nodeType="tmRoot"/>
+      </p:par>
+    </p:tnLst>
+  </p:timing>
 </p:sld>
 </file>
 
@@ -3452,7 +3432,11 @@
           <a:p>
             <a:r>
               <a:rPr lang="en-US" dirty="0" smtClean="0"/>
-              <a:t>Code Development, Background</a:t>
+              <a:t>Work at </a:t>
+            </a:r>
+            <a:r>
+              <a:rPr lang="en-US" dirty="0" err="1" smtClean="0"/>
+              <a:t>LaRC</a:t>
             </a:r>
             <a:endParaRPr lang="en-US" dirty="0"/>
           </a:p>
@@ -3474,49 +3458,78 @@
           <a:lstStyle/>
           <a:p>
             <a:r>
-              <a:rPr lang="en-US" dirty="0" smtClean="0"/>
-              <a:t>VT AOE CFD research group only has a few programmers</a:t>
+              <a:rPr lang="en-US" dirty="0"/>
+              <a:t>Continue with entropy </a:t>
+            </a:r>
+            <a:r>
+              <a:rPr lang="en-US" dirty="0" err="1"/>
+              <a:t>adjoint</a:t>
+            </a:r>
+            <a:r>
+              <a:rPr lang="en-US" dirty="0"/>
+              <a:t> research</a:t>
             </a:r>
           </a:p>
           <a:p>
             <a:pPr lvl="1"/>
             <a:r>
-              <a:rPr lang="en-US" dirty="0" smtClean="0"/>
-              <a:t>None with any formal </a:t>
-            </a:r>
-            <a:r>
-              <a:rPr lang="en-US" dirty="0" smtClean="0"/>
-              <a:t>Fortran 9X </a:t>
-            </a:r>
-            <a:r>
-              <a:rPr lang="en-US" dirty="0" smtClean="0"/>
-              <a:t>training</a:t>
-            </a:r>
-          </a:p>
-          <a:p>
-            <a:r>
-              <a:rPr lang="en-US" dirty="0" smtClean="0"/>
-              <a:t>Code development split between Windows and Linux with Subversion VCS</a:t>
-            </a:r>
-          </a:p>
-          <a:p>
-            <a:r>
-              <a:rPr lang="en-US" dirty="0" smtClean="0"/>
-              <a:t>Normal assortment of simple test codes</a:t>
-            </a:r>
-          </a:p>
-          <a:p>
-            <a:r>
-              <a:rPr lang="en-US" dirty="0" smtClean="0"/>
-              <a:t>In-house code SENSEI</a:t>
-            </a:r>
-          </a:p>
-          <a:p>
+              <a:rPr lang="en-US" dirty="0"/>
+              <a:t>Entropy variables already in 1D Euler code, need to integrate the DE and TE estimates for comparison ( should be done soon )</a:t>
+            </a:r>
+          </a:p>
+          <a:p>
+            <a:r>
+              <a:rPr lang="en-US" dirty="0"/>
+              <a:t>Investigate </a:t>
+            </a:r>
+            <a:r>
+              <a:rPr lang="en-US" dirty="0" smtClean="0"/>
+              <a:t>approximate TE </a:t>
+            </a:r>
+            <a:r>
+              <a:rPr lang="en-US" dirty="0"/>
+              <a:t>as </a:t>
+            </a:r>
+            <a:r>
+              <a:rPr lang="en-US" dirty="0" smtClean="0"/>
+              <a:t>an </a:t>
+            </a:r>
+            <a:r>
+              <a:rPr lang="en-US" dirty="0" err="1" smtClean="0"/>
+              <a:t>adjoint</a:t>
+            </a:r>
+            <a:r>
+              <a:rPr lang="en-US" dirty="0" smtClean="0"/>
+              <a:t> functional</a:t>
+            </a:r>
             <a:endParaRPr lang="en-US" dirty="0"/>
           </a:p>
+          <a:p>
+            <a:pPr lvl="1"/>
+            <a:r>
+              <a:rPr lang="en-US" dirty="0"/>
+              <a:t>Proof of concept work in development</a:t>
+            </a:r>
+          </a:p>
+          <a:p>
+            <a:r>
+              <a:rPr lang="en-US" dirty="0"/>
+              <a:t>Work on adaptation </a:t>
+            </a:r>
+            <a:r>
+              <a:rPr lang="en-US" dirty="0" smtClean="0"/>
+              <a:t>mechanics</a:t>
+            </a:r>
+            <a:endParaRPr lang="en-US" dirty="0"/>
+          </a:p>
         </p:txBody>
       </p:sp>
     </p:spTree>
+    <p:extLst>
+      <p:ext uri="{BB962C8B-B14F-4D97-AF65-F5344CB8AC3E}">
+        <p14:creationId xmlns:p14="http://schemas.microsoft.com/office/powerpoint/2010/main" val="471693527"/>
+      </p:ext>
+    </p:extLst>
   </p:cSld>
   <p:clrMapOvr>
     <a:masterClrMapping/>
@@ -3558,7 +3571,7 @@
           <a:p>
             <a:r>
               <a:rPr lang="en-US" dirty="0" smtClean="0"/>
-              <a:t>Code Development</a:t>
+              <a:t>Questions?</a:t>
             </a:r>
             <a:endParaRPr lang="en-US" dirty="0"/>
           </a:p>
@@ -3577,96 +3590,61 @@
         <p:spPr/>
         <p:txBody>
           <a:bodyPr>
-            <a:normAutofit fontScale="92500" lnSpcReduction="10000"/>
+            <a:normAutofit/>
           </a:bodyPr>
           <a:lstStyle/>
           <a:p>
-            <a:r>
-              <a:rPr lang="en-US" dirty="0" smtClean="0"/>
-              <a:t>Spurred the use of programming tools</a:t>
-            </a:r>
-          </a:p>
-          <a:p>
-            <a:pPr lvl="1"/>
-            <a:r>
-              <a:rPr lang="en-US" dirty="0" smtClean="0"/>
-              <a:t>Unit </a:t>
-            </a:r>
-            <a:r>
-              <a:rPr lang="en-US" dirty="0" smtClean="0"/>
-              <a:t>test code</a:t>
-            </a:r>
-          </a:p>
-          <a:p>
-            <a:pPr lvl="1"/>
-            <a:r>
-              <a:rPr lang="en-US" dirty="0" smtClean="0"/>
-              <a:t>Profile code using </a:t>
-            </a:r>
-            <a:r>
-              <a:rPr lang="en-US" dirty="0" err="1" smtClean="0"/>
-              <a:t>gprof</a:t>
-            </a:r>
-            <a:endParaRPr lang="en-US" dirty="0" smtClean="0"/>
-          </a:p>
-          <a:p>
-            <a:pPr lvl="1"/>
-            <a:r>
-              <a:rPr lang="en-US" dirty="0" smtClean="0"/>
-              <a:t>Split code up and use </a:t>
-            </a:r>
-            <a:r>
-              <a:rPr lang="en-US" dirty="0" smtClean="0"/>
-              <a:t>make to build</a:t>
-            </a:r>
-            <a:endParaRPr lang="en-US" dirty="0" smtClean="0"/>
-          </a:p>
-          <a:p>
-            <a:r>
-              <a:rPr lang="en-US" dirty="0" smtClean="0"/>
-              <a:t>Changed programming paradigms</a:t>
-            </a:r>
-          </a:p>
-          <a:p>
-            <a:pPr lvl="1"/>
-            <a:r>
-              <a:rPr lang="en-US" dirty="0" smtClean="0"/>
-              <a:t>Pass data (especially arrays) to routines as arguments</a:t>
-            </a:r>
-          </a:p>
-          <a:p>
-            <a:pPr lvl="1"/>
-            <a:r>
-              <a:rPr lang="en-US" dirty="0" smtClean="0"/>
-              <a:t>Use ‘use module, only:*’ statements instead of </a:t>
-            </a:r>
-            <a:r>
-              <a:rPr lang="en-US" dirty="0" smtClean="0"/>
-              <a:t>using modules as COMMON blocks</a:t>
-            </a:r>
-          </a:p>
-          <a:p>
-            <a:pPr lvl="1"/>
-            <a:r>
-              <a:rPr lang="en-US" dirty="0" smtClean="0"/>
-              <a:t>Created shared libraries</a:t>
-            </a:r>
-            <a:endParaRPr lang="en-US" dirty="0" smtClean="0"/>
-          </a:p>
-          <a:p>
-            <a:pPr lvl="1"/>
-            <a:r>
-              <a:rPr lang="en-US" dirty="0" smtClean="0"/>
-              <a:t>Derived types for logical data </a:t>
-            </a:r>
-            <a:r>
-              <a:rPr lang="en-US" dirty="0" smtClean="0"/>
-              <a:t>structures</a:t>
-            </a:r>
+            <a:pPr marL="0" indent="0">
+              <a:buNone/>
+            </a:pPr>
+            <a:r>
+              <a:rPr lang="en-US" sz="2000" dirty="0" smtClean="0"/>
+              <a:t>[1</a:t>
+            </a:r>
+            <a:r>
+              <a:rPr lang="en-US" sz="2000" dirty="0" smtClean="0"/>
+              <a:t>] </a:t>
+            </a:r>
+            <a:r>
+              <a:rPr lang="en-US" sz="2000" dirty="0" err="1" smtClean="0"/>
+              <a:t>Venditti</a:t>
+            </a:r>
+            <a:r>
+              <a:rPr lang="en-US" sz="2000" dirty="0" smtClean="0"/>
+              <a:t>, D.A., “Grid Adaptation for Functional Outputs of Compressible Flow Simulations,” PhD Thesis, Massachusetts Institute of Technology; June 2002</a:t>
+            </a:r>
+            <a:endParaRPr lang="en-US" sz="2000" dirty="0"/>
+          </a:p>
+          <a:p>
+            <a:pPr marL="0" indent="0">
+              <a:buNone/>
+            </a:pPr>
+            <a:r>
+              <a:rPr lang="en-US" sz="2000" dirty="0" smtClean="0"/>
+              <a:t>[2</a:t>
+            </a:r>
+            <a:r>
+              <a:rPr lang="en-US" sz="2000" dirty="0" smtClean="0"/>
+              <a:t>] Roy, C.J., “Strategies for Driving Mesh Adaptation in CFD (Invited),” AIAA Paper 2009-1302, 47</a:t>
+            </a:r>
+            <a:r>
+              <a:rPr lang="en-US" sz="2000" baseline="30000" dirty="0" smtClean="0"/>
+              <a:t>th</a:t>
+            </a:r>
+            <a:r>
+              <a:rPr lang="en-US" sz="2000" dirty="0" smtClean="0"/>
+              <a:t> AIAA Aerospace Sciences Meeting, Orlando, FL; Jan. 5-8 2009</a:t>
+            </a:r>
+            <a:endParaRPr lang="en-US" sz="2000" dirty="0"/>
           </a:p>
         </p:txBody>
       </p:sp>
     </p:spTree>
+    <p:extLst>
+      <p:ext uri="{BB962C8B-B14F-4D97-AF65-F5344CB8AC3E}">
+        <p14:creationId xmlns:p14="http://schemas.microsoft.com/office/powerpoint/2010/main" val="2514844176"/>
+      </p:ext>
+    </p:extLst>
   </p:cSld>
   <p:clrMapOvr>
     <a:masterClrMapping/>
@@ -3708,7 +3686,7 @@
           <a:p>
             <a:r>
               <a:rPr lang="en-US" dirty="0" smtClean="0"/>
-              <a:t>Code Development</a:t>
+              <a:t>Code Development, Background</a:t>
             </a:r>
             <a:endParaRPr lang="en-US" dirty="0"/>
           </a:p>
@@ -3724,121 +3702,43 @@
             <p:ph idx="1"/>
           </p:nvPr>
         </p:nvSpPr>
-        <p:spPr>
-          <a:xfrm>
-            <a:off x="457200" y="1600200"/>
-            <a:ext cx="8229600" cy="5029200"/>
-          </a:xfrm>
-        </p:spPr>
-        <p:txBody>
-          <a:bodyPr>
-            <a:normAutofit fontScale="85000" lnSpcReduction="20000"/>
-          </a:bodyPr>
-          <a:lstStyle/>
-          <a:p>
-            <a:r>
-              <a:rPr lang="en-US" dirty="0" smtClean="0"/>
-              <a:t>Unit Testing</a:t>
+        <p:spPr/>
+        <p:txBody>
+          <a:bodyPr/>
+          <a:lstStyle/>
+          <a:p>
+            <a:r>
+              <a:rPr lang="en-US" dirty="0" smtClean="0"/>
+              <a:t>VT AOE CFD research group only has a few programmers</a:t>
             </a:r>
           </a:p>
           <a:p>
             <a:pPr lvl="1"/>
             <a:r>
               <a:rPr lang="en-US" dirty="0" smtClean="0"/>
-              <a:t>Taught a class for a CFD course on unit testing and how it affects code development</a:t>
-            </a:r>
-          </a:p>
-          <a:p>
-            <a:pPr lvl="1"/>
-            <a:r>
-              <a:rPr lang="en-US" dirty="0" smtClean="0"/>
-              <a:t>By the end of the semester, the students I talked to wished that they had done more unit testing</a:t>
-            </a:r>
-          </a:p>
-          <a:p>
-            <a:r>
-              <a:rPr lang="en-US" dirty="0" smtClean="0"/>
-              <a:t>Code Profiling</a:t>
-            </a:r>
-          </a:p>
-          <a:p>
-            <a:pPr lvl="1"/>
-            <a:r>
-              <a:rPr lang="en-US" dirty="0" smtClean="0"/>
-              <a:t>Used GNU </a:t>
-            </a:r>
-            <a:r>
-              <a:rPr lang="en-US" dirty="0" err="1" smtClean="0"/>
-              <a:t>gprof</a:t>
-            </a:r>
-            <a:r>
-              <a:rPr lang="en-US" dirty="0" smtClean="0"/>
-              <a:t> to demonstrate </a:t>
-            </a:r>
-            <a:r>
-              <a:rPr lang="en-US" dirty="0" smtClean="0"/>
-              <a:t>how to find bugs in a </a:t>
-            </a:r>
-            <a:r>
-              <a:rPr lang="en-US" dirty="0" smtClean="0"/>
-              <a:t>code </a:t>
-            </a:r>
-          </a:p>
-          <a:p>
-            <a:pPr lvl="1"/>
-            <a:r>
-              <a:rPr lang="en-US" dirty="0" smtClean="0"/>
-              <a:t>A </a:t>
-            </a:r>
-            <a:r>
-              <a:rPr lang="en-US" dirty="0" smtClean="0"/>
-              <a:t>‘:’ where ‘</a:t>
-            </a:r>
-            <a:r>
-              <a:rPr lang="en-US" dirty="0" err="1" smtClean="0"/>
-              <a:t>i</a:t>
-            </a:r>
-            <a:r>
-              <a:rPr lang="en-US" dirty="0" smtClean="0"/>
-              <a:t>’ was </a:t>
-            </a:r>
-            <a:r>
-              <a:rPr lang="en-US" dirty="0" smtClean="0"/>
-              <a:t>intended</a:t>
-            </a:r>
-          </a:p>
-          <a:p>
-            <a:r>
-              <a:rPr lang="en-US" dirty="0" smtClean="0"/>
-              <a:t>Error Flags</a:t>
-            </a:r>
-          </a:p>
-          <a:p>
-            <a:pPr lvl="1"/>
-            <a:r>
-              <a:rPr lang="en-US" dirty="0" smtClean="0"/>
-              <a:t>How to use them!</a:t>
-            </a:r>
-            <a:endParaRPr lang="en-US" dirty="0" smtClean="0"/>
-          </a:p>
-          <a:p>
-            <a:r>
-              <a:rPr lang="en-US" dirty="0" smtClean="0"/>
-              <a:t>T</a:t>
-            </a:r>
-            <a:r>
-              <a:rPr lang="en-US" dirty="0" smtClean="0"/>
-              <a:t>hese </a:t>
-            </a:r>
-            <a:r>
-              <a:rPr lang="en-US" dirty="0" smtClean="0"/>
-              <a:t>are simple ideas/concepts/tools that weren’t being used and had a huge impact on </a:t>
-            </a:r>
-            <a:r>
-              <a:rPr lang="en-US" dirty="0" smtClean="0"/>
-              <a:t>productivity</a:t>
-            </a:r>
-            <a:endParaRPr lang="en-US" dirty="0" smtClean="0"/>
+              <a:t>None with any formal Fortran 9X training</a:t>
+            </a:r>
+          </a:p>
+          <a:p>
+            <a:r>
+              <a:rPr lang="en-US" dirty="0" smtClean="0"/>
+              <a:t>Code development split between Windows and Linux with Subversion VCS</a:t>
+            </a:r>
+          </a:p>
+          <a:p>
+            <a:r>
+              <a:rPr lang="en-US" dirty="0" smtClean="0"/>
+              <a:t>Normal assortment of simple test codes</a:t>
+            </a:r>
+          </a:p>
+          <a:p>
+            <a:r>
+              <a:rPr lang="en-US" dirty="0" smtClean="0"/>
+              <a:t>In-house code SENSEI</a:t>
+            </a:r>
+          </a:p>
+          <a:p>
+            <a:endParaRPr lang="en-US" dirty="0"/>
           </a:p>
         </p:txBody>
       </p:sp>
@@ -3847,6 +3747,13 @@
   <p:clrMapOvr>
     <a:masterClrMapping/>
   </p:clrMapOvr>
+  <p:timing>
+    <p:tnLst>
+      <p:par>
+        <p:cTn id="1" dur="indefinite" restart="never" nodeType="tmRoot"/>
+      </p:par>
+    </p:tnLst>
+  </p:timing>
 </p:sld>
 </file>
 
@@ -3903,75 +3810,77 @@
         <p:spPr/>
         <p:txBody>
           <a:bodyPr>
-            <a:normAutofit fontScale="92500" lnSpcReduction="20000"/>
+            <a:normAutofit fontScale="92500" lnSpcReduction="10000"/>
           </a:bodyPr>
           <a:lstStyle/>
           <a:p>
             <a:r>
               <a:rPr lang="en-US" dirty="0" smtClean="0"/>
-              <a:t>Students with no formal training = obfuscated code</a:t>
+              <a:t>Spurred the use of programming tools</a:t>
             </a:r>
           </a:p>
           <a:p>
             <a:pPr lvl="1"/>
             <a:r>
               <a:rPr lang="en-US" dirty="0" smtClean="0"/>
-              <a:t>Modules were used as common blocks</a:t>
+              <a:t>Unit test code</a:t>
             </a:r>
           </a:p>
           <a:p>
             <a:pPr lvl="1"/>
             <a:r>
               <a:rPr lang="en-US" dirty="0" smtClean="0"/>
-              <a:t>Copy and paste between </a:t>
-            </a:r>
-            <a:r>
-              <a:rPr lang="en-US" dirty="0" smtClean="0"/>
-              <a:t>programs</a:t>
-            </a:r>
+              <a:t>Profile code using </a:t>
+            </a:r>
+            <a:r>
+              <a:rPr lang="en-US" dirty="0" err="1" smtClean="0"/>
+              <a:t>gprof</a:t>
+            </a:r>
+            <a:endParaRPr lang="en-US" dirty="0" smtClean="0"/>
           </a:p>
           <a:p>
             <a:pPr lvl="1"/>
             <a:r>
               <a:rPr lang="en-US" dirty="0" smtClean="0"/>
-              <a:t>Single file programs</a:t>
-            </a:r>
-            <a:endParaRPr lang="en-US" dirty="0" smtClean="0"/>
+              <a:t>Split code up and use make to build</a:t>
+            </a:r>
+          </a:p>
+          <a:p>
+            <a:r>
+              <a:rPr lang="en-US" dirty="0" smtClean="0"/>
+              <a:t>Introduced new programming paradigms</a:t>
+            </a:r>
           </a:p>
           <a:p>
             <a:pPr lvl="1"/>
             <a:r>
               <a:rPr lang="en-US" dirty="0" smtClean="0"/>
-              <a:t>Difficult code to work with simply due to different styles</a:t>
-            </a:r>
-          </a:p>
-          <a:p>
-            <a:r>
-              <a:rPr lang="en-US" dirty="0" smtClean="0"/>
-              <a:t>How to improve?</a:t>
+              <a:t>Use ‘use module, only:*’ statements instead of using modules as COMMON blocks</a:t>
             </a:r>
           </a:p>
           <a:p>
             <a:pPr lvl="1"/>
             <a:r>
-              <a:rPr lang="en-US" dirty="0" smtClean="0"/>
-              <a:t>As an example, I rewrote </a:t>
-            </a:r>
-            <a:r>
-              <a:rPr lang="en-US" dirty="0" smtClean="0"/>
-              <a:t>a simple 1D code </a:t>
-            </a:r>
-            <a:r>
-              <a:rPr lang="en-US" dirty="0" smtClean="0"/>
-              <a:t>that was d</a:t>
-            </a:r>
-            <a:r>
-              <a:rPr lang="en-US" dirty="0" smtClean="0"/>
-              <a:t>esign </a:t>
-            </a:r>
-            <a:r>
-              <a:rPr lang="en-US" dirty="0" smtClean="0"/>
-              <a:t>order accurate, but had bugs that hurt performance</a:t>
+              <a:rPr lang="en-US" dirty="0"/>
+              <a:t>Use derived types for logical data structures</a:t>
+            </a:r>
+          </a:p>
+          <a:p>
+            <a:pPr lvl="1"/>
+            <a:r>
+              <a:rPr lang="en-US" dirty="0"/>
+              <a:t>Pass data (especially arrays) to routines as </a:t>
+            </a:r>
+            <a:r>
+              <a:rPr lang="en-US" dirty="0" smtClean="0"/>
+              <a:t>arguments</a:t>
+            </a:r>
+          </a:p>
+          <a:p>
+            <a:pPr lvl="1"/>
+            <a:r>
+              <a:rPr lang="en-US" dirty="0" smtClean="0"/>
+              <a:t>Create shared libraries</a:t>
             </a:r>
           </a:p>
         </p:txBody>
@@ -3981,6 +3890,13 @@
   <p:clrMapOvr>
     <a:masterClrMapping/>
   </p:clrMapOvr>
+  <p:timing>
+    <p:tnLst>
+      <p:par>
+        <p:cTn id="1" dur="indefinite" restart="never" nodeType="tmRoot"/>
+      </p:par>
+    </p:tnLst>
+  </p:timing>
 </p:sld>
 </file>
 
@@ -4034,77 +3950,76 @@
             <p:ph idx="1"/>
           </p:nvPr>
         </p:nvSpPr>
-        <p:spPr/>
+        <p:spPr>
+          <a:xfrm>
+            <a:off x="457200" y="1600200"/>
+            <a:ext cx="8229600" cy="5029200"/>
+          </a:xfrm>
+        </p:spPr>
         <p:txBody>
           <a:bodyPr>
-            <a:normAutofit fontScale="77500" lnSpcReduction="20000"/>
+            <a:normAutofit fontScale="85000" lnSpcReduction="10000"/>
           </a:bodyPr>
           <a:lstStyle/>
           <a:p>
             <a:r>
               <a:rPr lang="en-US" dirty="0" smtClean="0"/>
-              <a:t>Refactoring the 1D code took longer than expected</a:t>
+              <a:t>Unit Testing</a:t>
             </a:r>
           </a:p>
           <a:p>
             <a:pPr lvl="1"/>
             <a:r>
               <a:rPr lang="en-US" dirty="0" smtClean="0"/>
-              <a:t>Difficult to follow logic/data flow because of modules as COMMON</a:t>
+              <a:t>Taught a class for a CFD course on unit testing and how it affects code development</a:t>
             </a:r>
           </a:p>
           <a:p>
             <a:pPr lvl="1"/>
             <a:r>
               <a:rPr lang="en-US" dirty="0" smtClean="0"/>
-              <a:t>Variables such as I and J defined as common (pet peeve)</a:t>
-            </a:r>
-          </a:p>
-          <a:p>
-            <a:r>
-              <a:rPr lang="en-US" dirty="0" smtClean="0"/>
-              <a:t>Separated the code into files based on logical components</a:t>
+              <a:t>By the end of the semester, the students I talked to wished that they had done more unit testing</a:t>
+            </a:r>
+          </a:p>
+          <a:p>
+            <a:r>
+              <a:rPr lang="en-US" dirty="0" smtClean="0"/>
+              <a:t>Code Profiling</a:t>
             </a:r>
           </a:p>
           <a:p>
             <a:pPr lvl="1"/>
             <a:r>
               <a:rPr lang="en-US" dirty="0" smtClean="0"/>
-              <a:t>Asking ‘How do I make this testable?’ really helped</a:t>
-            </a:r>
-          </a:p>
-          <a:p>
-            <a:r>
-              <a:rPr lang="en-US" dirty="0" smtClean="0"/>
-              <a:t>Code review with peers once refactoring was complete</a:t>
+              <a:t>Used GNU </a:t>
+            </a:r>
+            <a:r>
+              <a:rPr lang="en-US" dirty="0" err="1" smtClean="0"/>
+              <a:t>gprof</a:t>
+            </a:r>
+            <a:r>
+              <a:rPr lang="en-US" dirty="0" smtClean="0"/>
+              <a:t> to demonstrate how to find bugs in a code such as a ‘:’ where ‘i’ was intended</a:t>
+            </a:r>
+          </a:p>
+          <a:p>
+            <a:r>
+              <a:rPr lang="en-US" dirty="0" smtClean="0"/>
+              <a:t>Error Flags</a:t>
             </a:r>
           </a:p>
           <a:p>
             <a:pPr lvl="1"/>
             <a:r>
               <a:rPr lang="en-US" dirty="0" smtClean="0"/>
-              <a:t>The code works and is faster, but what else is possible and what is needed for the future?</a:t>
-            </a:r>
-          </a:p>
-          <a:p>
-            <a:pPr lvl="1"/>
-            <a:r>
-              <a:rPr lang="en-US" dirty="0" smtClean="0"/>
-              <a:t>This discussion led to a decision on how future codes should be </a:t>
-            </a:r>
-            <a:r>
-              <a:rPr lang="en-US" dirty="0" smtClean="0"/>
-              <a:t>developed</a:t>
-            </a:r>
-            <a:endParaRPr lang="en-US" dirty="0" smtClean="0"/>
-          </a:p>
-          <a:p>
-            <a:pPr lvl="1"/>
-            <a:r>
-              <a:rPr lang="en-US" dirty="0" smtClean="0"/>
-              <a:t>End result was a modular code with a well defined purpose that is paired with other codes (adjoint, adaptation, etc) so each student can accomplish his work from the same code base</a:t>
-            </a:r>
-            <a:endParaRPr lang="en-US" dirty="0"/>
+              <a:t>How to use them under a Linux environment</a:t>
+            </a:r>
+          </a:p>
+          <a:p>
+            <a:r>
+              <a:rPr lang="en-US" dirty="0" smtClean="0"/>
+              <a:t>These are simple ideas/concepts/tools that weren’t being used and had a huge impact on productivity</a:t>
+            </a:r>
           </a:p>
         </p:txBody>
       </p:sp>
@@ -4113,6 +4028,13 @@
   <p:clrMapOvr>
     <a:masterClrMapping/>
   </p:clrMapOvr>
+  <p:timing>
+    <p:tnLst>
+      <p:par>
+        <p:cTn id="1" dur="indefinite" restart="never" nodeType="tmRoot"/>
+      </p:par>
+    </p:tnLst>
+  </p:timing>
 </p:sld>
 </file>
 
@@ -4166,76 +4088,62 @@
             <p:ph idx="1"/>
           </p:nvPr>
         </p:nvSpPr>
-        <p:spPr/>
+        <p:spPr>
+          <a:xfrm>
+            <a:off x="457200" y="1600200"/>
+            <a:ext cx="8229600" cy="5029200"/>
+          </a:xfrm>
+        </p:spPr>
         <p:txBody>
           <a:bodyPr>
-            <a:normAutofit fontScale="77500" lnSpcReduction="20000"/>
+            <a:normAutofit fontScale="92500" lnSpcReduction="10000"/>
           </a:bodyPr>
           <a:lstStyle/>
           <a:p>
             <a:r>
               <a:rPr lang="en-US" dirty="0" smtClean="0"/>
-              <a:t>While a lot of time was spent on </a:t>
-            </a:r>
-            <a:r>
-              <a:rPr lang="en-US" dirty="0" smtClean="0"/>
-              <a:t>the </a:t>
-            </a:r>
-            <a:r>
-              <a:rPr lang="en-US" dirty="0" smtClean="0"/>
-              <a:t>simple 1D code, it brought about the </a:t>
-            </a:r>
-            <a:r>
-              <a:rPr lang="en-US" dirty="0" smtClean="0"/>
-              <a:t>creation </a:t>
-            </a:r>
-            <a:r>
-              <a:rPr lang="en-US" dirty="0" smtClean="0"/>
-              <a:t>of </a:t>
-            </a:r>
-            <a:r>
-              <a:rPr lang="en-US" dirty="0" smtClean="0"/>
-              <a:t>SENSEI</a:t>
+              <a:t>Students with no formal training = obfuscated code</a:t>
             </a:r>
           </a:p>
           <a:p>
             <a:pPr lvl="1"/>
             <a:r>
               <a:rPr lang="en-US" dirty="0" smtClean="0"/>
-              <a:t>SENSEI is a Structured, Euler/NS, Explicit/Implicit flow solver in development at VT</a:t>
-            </a:r>
-          </a:p>
-          <a:p>
-            <a:r>
-              <a:rPr lang="en-US" dirty="0" smtClean="0"/>
-              <a:t>SENSEI’s predecessor was almost as bad/worse than the 1D code</a:t>
+              <a:t>Modules were used as common blocks to pass global variables</a:t>
             </a:r>
           </a:p>
           <a:p>
             <a:pPr lvl="1"/>
             <a:r>
               <a:rPr lang="en-US" dirty="0" smtClean="0"/>
-              <a:t>Single file code, common blocks, no explicit argument passing</a:t>
+              <a:t>Copy and paste between programs</a:t>
             </a:r>
           </a:p>
           <a:p>
             <a:pPr lvl="1"/>
             <a:r>
               <a:rPr lang="en-US" dirty="0" smtClean="0"/>
-              <a:t>Its code base was frozen, branched, and rewritten to form SENSEI by Tyrone Phillips</a:t>
+              <a:t>Single file programs because of Windows</a:t>
             </a:r>
           </a:p>
           <a:p>
             <a:pPr lvl="1"/>
             <a:r>
               <a:rPr lang="en-US" dirty="0" smtClean="0"/>
-              <a:t>Despite the upheaval caused by completely changing coding paradigms and styles, SENSEI was quickly brought into operation</a:t>
-            </a:r>
-          </a:p>
-          <a:p>
-            <a:r>
-              <a:rPr lang="en-US" dirty="0" smtClean="0"/>
-              <a:t>The code base is still not very stable, (we’re still learning new things), but there are far fewer ‘unintended consequences’</a:t>
+              <a:t>Difficult code to work with simply due to different styles</a:t>
+            </a:r>
+          </a:p>
+          <a:p>
+            <a:r>
+              <a:rPr lang="en-US" dirty="0" smtClean="0"/>
+              <a:t>How to improve?</a:t>
+            </a:r>
+          </a:p>
+          <a:p>
+            <a:pPr lvl="1"/>
+            <a:r>
+              <a:rPr lang="en-US" dirty="0" smtClean="0"/>
+              <a:t>As an example, I rewrote a simple 1D code that was design order accurate, but had bugs that hurt performance</a:t>
             </a:r>
           </a:p>
         </p:txBody>
@@ -4245,6 +4153,13 @@
   <p:clrMapOvr>
     <a:masterClrMapping/>
   </p:clrMapOvr>
+  <p:timing>
+    <p:tnLst>
+      <p:par>
+        <p:cTn id="1" dur="indefinite" restart="never" nodeType="tmRoot"/>
+      </p:par>
+    </p:tnLst>
+  </p:timing>
 </p:sld>
 </file>
 
@@ -4282,7 +4197,7 @@
           <a:p>
             <a:r>
               <a:rPr lang="en-US" dirty="0" smtClean="0"/>
-              <a:t>Code Development Summary</a:t>
+              <a:t>Code Development</a:t>
             </a:r>
             <a:endParaRPr lang="en-US" dirty="0"/>
           </a:p>
@@ -4301,46 +4216,69 @@
         <p:spPr/>
         <p:txBody>
           <a:bodyPr>
-            <a:normAutofit fontScale="92500"/>
+            <a:normAutofit fontScale="77500" lnSpcReduction="20000"/>
           </a:bodyPr>
           <a:lstStyle/>
           <a:p>
             <a:r>
               <a:rPr lang="en-US" dirty="0" smtClean="0"/>
-              <a:t>I was able to take a lot of the software engineering lessons I learned at </a:t>
-            </a:r>
-            <a:r>
-              <a:rPr lang="en-US" dirty="0" err="1" smtClean="0"/>
-              <a:t>LaRC</a:t>
-            </a:r>
-            <a:r>
-              <a:rPr lang="en-US" dirty="0" smtClean="0"/>
-              <a:t> and bring them back to VT</a:t>
-            </a:r>
-          </a:p>
-          <a:p>
-            <a:r>
-              <a:rPr lang="en-US" dirty="0" smtClean="0"/>
-              <a:t>Goal of trying </a:t>
-            </a:r>
-            <a:r>
-              <a:rPr lang="en-US" dirty="0" smtClean="0"/>
-              <a:t>to write code that will be maintainable and useful to future students in the research group</a:t>
-            </a:r>
-          </a:p>
-          <a:p>
-            <a:r>
-              <a:rPr lang="en-US" dirty="0" smtClean="0"/>
-              <a:t>Spending the time to do the simple codes right will make it easier to work on SENSEI later</a:t>
+              <a:t>Refactoring the 1D code took longer than expected</a:t>
             </a:r>
           </a:p>
           <a:p>
             <a:pPr lvl="1"/>
             <a:r>
               <a:rPr lang="en-US" dirty="0" smtClean="0"/>
-              <a:t>Perfect practice makes perfect</a:t>
-            </a:r>
-            <a:endParaRPr lang="en-US" dirty="0" smtClean="0"/>
+              <a:t>Difficult to follow logic/data flow because of modules as COMMON</a:t>
+            </a:r>
+          </a:p>
+          <a:p>
+            <a:pPr lvl="1"/>
+            <a:r>
+              <a:rPr lang="en-US" dirty="0" smtClean="0"/>
+              <a:t>Variables such as I and J defined as common (pet peeve)</a:t>
+            </a:r>
+          </a:p>
+          <a:p>
+            <a:r>
+              <a:rPr lang="en-US" dirty="0" smtClean="0"/>
+              <a:t>Separated the code into files based on logical components</a:t>
+            </a:r>
+          </a:p>
+          <a:p>
+            <a:pPr lvl="1"/>
+            <a:r>
+              <a:rPr lang="en-US" dirty="0" smtClean="0"/>
+              <a:t>Asking ‘How do I make this testable?’ really helped</a:t>
+            </a:r>
+          </a:p>
+          <a:p>
+            <a:r>
+              <a:rPr lang="en-US" dirty="0" smtClean="0"/>
+              <a:t>Code review with peers once refactoring was complete</a:t>
+            </a:r>
+          </a:p>
+          <a:p>
+            <a:pPr lvl="1"/>
+            <a:r>
+              <a:rPr lang="en-US" dirty="0" smtClean="0"/>
+              <a:t>The code works and is faster, but what else is possible and what is needed for the future?</a:t>
+            </a:r>
+          </a:p>
+          <a:p>
+            <a:pPr lvl="1"/>
+            <a:r>
+              <a:rPr lang="en-US" dirty="0" smtClean="0"/>
+              <a:t>This discussion led to a decision on how future codes should be developed</a:t>
+            </a:r>
+          </a:p>
+          <a:p>
+            <a:pPr lvl="1"/>
+            <a:r>
+              <a:rPr lang="en-US" dirty="0" smtClean="0"/>
+              <a:t>End result was a modular code with a well defined purpose that is paired with other codes (adjoint, adaptation, etc) so each student can accomplish his work from the same code base</a:t>
+            </a:r>
+            <a:endParaRPr lang="en-US" dirty="0"/>
           </a:p>
         </p:txBody>
       </p:sp>
@@ -4349,6 +4287,133 @@
   <p:clrMapOvr>
     <a:masterClrMapping/>
   </p:clrMapOvr>
+  <p:timing>
+    <p:tnLst>
+      <p:par>
+        <p:cTn id="1" dur="indefinite" restart="never" nodeType="tmRoot"/>
+      </p:par>
+    </p:tnLst>
+  </p:timing>
+</p:sld>
+</file>
+
+<file path=ppt/slides/slide19.xml><?xml version="1.0" encoding="utf-8"?>
+<p:sld xmlns:a="http://schemas.openxmlformats.org/drawingml/2006/main" xmlns:r="http://schemas.openxmlformats.org/officeDocument/2006/relationships" xmlns:p="http://schemas.openxmlformats.org/presentationml/2006/main">
+  <p:cSld>
+    <p:spTree>
+      <p:nvGrpSpPr>
+        <p:cNvPr id="1" name=""/>
+        <p:cNvGrpSpPr/>
+        <p:nvPr/>
+      </p:nvGrpSpPr>
+      <p:grpSpPr>
+        <a:xfrm>
+          <a:off x="0" y="0"/>
+          <a:ext cx="0" cy="0"/>
+          <a:chOff x="0" y="0"/>
+          <a:chExt cx="0" cy="0"/>
+        </a:xfrm>
+      </p:grpSpPr>
+      <p:sp>
+        <p:nvSpPr>
+          <p:cNvPr id="2" name="Title 1"/>
+          <p:cNvSpPr>
+            <a:spLocks noGrp="1"/>
+          </p:cNvSpPr>
+          <p:nvPr>
+            <p:ph type="title"/>
+          </p:nvPr>
+        </p:nvSpPr>
+        <p:spPr/>
+        <p:txBody>
+          <a:bodyPr/>
+          <a:lstStyle/>
+          <a:p>
+            <a:r>
+              <a:rPr lang="en-US" dirty="0" smtClean="0"/>
+              <a:t>Code Development</a:t>
+            </a:r>
+            <a:endParaRPr lang="en-US" dirty="0"/>
+          </a:p>
+        </p:txBody>
+      </p:sp>
+      <p:sp>
+        <p:nvSpPr>
+          <p:cNvPr id="3" name="Content Placeholder 2"/>
+          <p:cNvSpPr>
+            <a:spLocks noGrp="1"/>
+          </p:cNvSpPr>
+          <p:nvPr>
+            <p:ph idx="1"/>
+          </p:nvPr>
+        </p:nvSpPr>
+        <p:spPr/>
+        <p:txBody>
+          <a:bodyPr>
+            <a:normAutofit fontScale="77500" lnSpcReduction="20000"/>
+          </a:bodyPr>
+          <a:lstStyle/>
+          <a:p>
+            <a:r>
+              <a:rPr lang="en-US" dirty="0" smtClean="0"/>
+              <a:t>While a lot of time was spent on the simple 1D code, it brought about the creation of SENSEI</a:t>
+            </a:r>
+          </a:p>
+          <a:p>
+            <a:pPr lvl="1"/>
+            <a:r>
+              <a:rPr lang="en-US" dirty="0" smtClean="0"/>
+              <a:t>SENSEI is a Structured, Euler/NS, Explicit/Implicit flow solver in development at VT</a:t>
+            </a:r>
+          </a:p>
+          <a:p>
+            <a:r>
+              <a:rPr lang="en-US" dirty="0" smtClean="0"/>
+              <a:t>SENSEI’s predecessor was almost as bad/worse than the 1D code</a:t>
+            </a:r>
+          </a:p>
+          <a:p>
+            <a:pPr lvl="1"/>
+            <a:r>
+              <a:rPr lang="en-US" dirty="0" smtClean="0"/>
+              <a:t>Single file code, common blocks, no explicit argument passing</a:t>
+            </a:r>
+          </a:p>
+          <a:p>
+            <a:pPr lvl="1"/>
+            <a:r>
+              <a:rPr lang="en-US" dirty="0" smtClean="0"/>
+              <a:t>Its code base was frozen, branched, and rewritten to form SENSEI by Tyrone Phillips</a:t>
+            </a:r>
+          </a:p>
+          <a:p>
+            <a:pPr lvl="1"/>
+            <a:r>
+              <a:rPr lang="en-US" dirty="0" smtClean="0"/>
+              <a:t>Despite the upheaval caused by completely changing coding paradigms and styles, SENSEI was quickly brought into operation</a:t>
+            </a:r>
+          </a:p>
+          <a:p>
+            <a:pPr lvl="1"/>
+            <a:r>
+              <a:rPr lang="en-US" dirty="0" smtClean="0"/>
+              <a:t>Even though the code base is still not very stable, (we’re still learning new things),  there are far fewer ‘unintended consequences’</a:t>
+            </a:r>
+          </a:p>
+        </p:txBody>
+      </p:sp>
+    </p:spTree>
+  </p:cSld>
+  <p:clrMapOvr>
+    <a:masterClrMapping/>
+  </p:clrMapOvr>
+  <p:timing>
+    <p:tnLst>
+      <p:par>
+        <p:cTn id="1" dur="indefinite" restart="never" nodeType="tmRoot"/>
+      </p:par>
+    </p:tnLst>
+  </p:timing>
 </p:sld>
 </file>
 
@@ -4446,6 +4511,143 @@
   <p:clrMapOvr>
     <a:masterClrMapping/>
   </p:clrMapOvr>
+  <p:timing>
+    <p:tnLst>
+      <p:par>
+        <p:cTn id="1" dur="indefinite" restart="never" nodeType="tmRoot"/>
+      </p:par>
+    </p:tnLst>
+  </p:timing>
+</p:sld>
+</file>
+
+<file path=ppt/slides/slide20.xml><?xml version="1.0" encoding="utf-8"?>
+<p:sld xmlns:a="http://schemas.openxmlformats.org/drawingml/2006/main" xmlns:r="http://schemas.openxmlformats.org/officeDocument/2006/relationships" xmlns:p="http://schemas.openxmlformats.org/presentationml/2006/main">
+  <p:cSld>
+    <p:spTree>
+      <p:nvGrpSpPr>
+        <p:cNvPr id="1" name=""/>
+        <p:cNvGrpSpPr/>
+        <p:nvPr/>
+      </p:nvGrpSpPr>
+      <p:grpSpPr>
+        <a:xfrm>
+          <a:off x="0" y="0"/>
+          <a:ext cx="0" cy="0"/>
+          <a:chOff x="0" y="0"/>
+          <a:chExt cx="0" cy="0"/>
+        </a:xfrm>
+      </p:grpSpPr>
+      <p:sp>
+        <p:nvSpPr>
+          <p:cNvPr id="2" name="Title 1"/>
+          <p:cNvSpPr>
+            <a:spLocks noGrp="1"/>
+          </p:cNvSpPr>
+          <p:nvPr>
+            <p:ph type="title"/>
+          </p:nvPr>
+        </p:nvSpPr>
+        <p:spPr/>
+        <p:txBody>
+          <a:bodyPr/>
+          <a:lstStyle/>
+          <a:p>
+            <a:r>
+              <a:rPr lang="en-US" dirty="0" smtClean="0"/>
+              <a:t>Code Development Summary</a:t>
+            </a:r>
+            <a:endParaRPr lang="en-US" dirty="0"/>
+          </a:p>
+        </p:txBody>
+      </p:sp>
+      <p:sp>
+        <p:nvSpPr>
+          <p:cNvPr id="3" name="Content Placeholder 2"/>
+          <p:cNvSpPr>
+            <a:spLocks noGrp="1"/>
+          </p:cNvSpPr>
+          <p:nvPr>
+            <p:ph idx="1"/>
+          </p:nvPr>
+        </p:nvSpPr>
+        <p:spPr/>
+        <p:txBody>
+          <a:bodyPr>
+            <a:normAutofit fontScale="92500" lnSpcReduction="20000"/>
+          </a:bodyPr>
+          <a:lstStyle/>
+          <a:p>
+            <a:r>
+              <a:rPr lang="en-US" dirty="0" smtClean="0"/>
+              <a:t>I was able to take a lot of the software engineering lessons I learned at </a:t>
+            </a:r>
+            <a:r>
+              <a:rPr lang="en-US" dirty="0" err="1" smtClean="0"/>
+              <a:t>LaRC</a:t>
+            </a:r>
+            <a:r>
+              <a:rPr lang="en-US" dirty="0" smtClean="0"/>
+              <a:t> and bring them back to </a:t>
+            </a:r>
+            <a:r>
+              <a:rPr lang="en-US" dirty="0" smtClean="0"/>
+              <a:t>VT</a:t>
+            </a:r>
+          </a:p>
+          <a:p>
+            <a:pPr lvl="1"/>
+            <a:r>
+              <a:rPr lang="en-US" dirty="0" smtClean="0"/>
+              <a:t>Team work!</a:t>
+            </a:r>
+            <a:endParaRPr lang="en-US" dirty="0" smtClean="0"/>
+          </a:p>
+          <a:p>
+            <a:r>
+              <a:rPr lang="en-US" dirty="0" smtClean="0"/>
+              <a:t>Goal of trying to write code that will be maintainable and useful to future students in the research group</a:t>
+            </a:r>
+          </a:p>
+          <a:p>
+            <a:pPr lvl="1"/>
+            <a:r>
+              <a:rPr lang="en-US" dirty="0" smtClean="0"/>
+              <a:t>Encourage code review by using </a:t>
+            </a:r>
+            <a:r>
+              <a:rPr lang="en-US" dirty="0" err="1" smtClean="0"/>
+              <a:t>Github</a:t>
+            </a:r>
+            <a:endParaRPr lang="en-US" dirty="0" smtClean="0"/>
+          </a:p>
+          <a:p>
+            <a:r>
+              <a:rPr lang="en-US" dirty="0" smtClean="0"/>
+              <a:t>Spending the time to do the simple codes right will make it easier to work on SENSEI later</a:t>
+            </a:r>
+          </a:p>
+          <a:p>
+            <a:pPr lvl="1"/>
+            <a:r>
+              <a:rPr lang="en-US" dirty="0" smtClean="0"/>
+              <a:t>Perfect practice makes perfect</a:t>
+            </a:r>
+          </a:p>
+        </p:txBody>
+      </p:sp>
+    </p:spTree>
+  </p:cSld>
+  <p:clrMapOvr>
+    <a:masterClrMapping/>
+  </p:clrMapOvr>
+  <p:timing>
+    <p:tnLst>
+      <p:par>
+        <p:cTn id="1" dur="indefinite" restart="never" nodeType="tmRoot"/>
+      </p:par>
+    </p:tnLst>
+  </p:timing>
 </p:sld>
 </file>
 
@@ -4521,13 +4723,8 @@
             <a:pPr lvl="2"/>
             <a:r>
               <a:rPr lang="en-US" dirty="0" smtClean="0"/>
-              <a:t>Continuous Adjoint </a:t>
-            </a:r>
-            <a:r>
-              <a:rPr lang="en-US" dirty="0" smtClean="0"/>
-              <a:t>Derivations</a:t>
-            </a:r>
-            <a:endParaRPr lang="en-US" dirty="0" smtClean="0"/>
+              <a:t>Continuous Adjoint Derivations</a:t>
+            </a:r>
           </a:p>
           <a:p>
             <a:pPr lvl="2"/>
@@ -4535,7 +4732,6 @@
               <a:rPr lang="en-US" dirty="0" smtClean="0"/>
               <a:t>Error Estimation</a:t>
             </a:r>
-            <a:endParaRPr lang="en-US" dirty="0" smtClean="0"/>
           </a:p>
           <a:p>
             <a:pPr lvl="1"/>
@@ -4554,23 +4750,13 @@
               <a:rPr lang="en-US" dirty="0" smtClean="0"/>
               <a:t>Part II: Code Development</a:t>
             </a:r>
-            <a:endParaRPr lang="en-US" dirty="0" smtClean="0"/>
           </a:p>
           <a:p>
             <a:pPr lvl="1"/>
             <a:r>
               <a:rPr lang="en-US" dirty="0" smtClean="0"/>
-              <a:t>Software </a:t>
-            </a:r>
-            <a:r>
-              <a:rPr lang="en-US" dirty="0" smtClean="0"/>
-              <a:t>Engineering at </a:t>
-            </a:r>
-            <a:r>
-              <a:rPr lang="en-US" dirty="0" smtClean="0"/>
-              <a:t>VT</a:t>
-            </a:r>
-            <a:endParaRPr lang="en-US" dirty="0" smtClean="0"/>
+              <a:t>Software Engineering at VT</a:t>
+            </a:r>
           </a:p>
           <a:p>
             <a:endParaRPr lang="en-US" dirty="0"/>
@@ -4582,6 +4768,13 @@
   <p:clrMapOvr>
     <a:masterClrMapping/>
   </p:clrMapOvr>
+  <p:timing>
+    <p:tnLst>
+      <p:par>
+        <p:cTn id="1" dur="indefinite" restart="never" nodeType="tmRoot"/>
+      </p:par>
+    </p:tnLst>
+  </p:timing>
 </p:sld>
 </file>
 
@@ -4644,19 +4837,7 @@
           <a:p>
             <a:r>
               <a:rPr lang="en-US" dirty="0" smtClean="0"/>
-              <a:t>The VT AOE CFD research group has a strong focus on </a:t>
-            </a:r>
-            <a:r>
-              <a:rPr lang="en-US" dirty="0" smtClean="0"/>
-              <a:t>algorithm development</a:t>
-            </a:r>
-            <a:r>
-              <a:rPr lang="en-US" dirty="0" smtClean="0"/>
-              <a:t>, </a:t>
-            </a:r>
-            <a:r>
-              <a:rPr lang="en-US" dirty="0" smtClean="0"/>
-              <a:t>hence systems with exact solutions are often studied as testing ground problems</a:t>
+              <a:t>The VT AOE CFD research group has a strong focus on algorithm development, hence systems with exact solutions are often studied as testing ground problems</a:t>
             </a:r>
           </a:p>
           <a:p>
@@ -4691,7 +4872,15 @@
             <a:pPr lvl="1"/>
             <a:r>
               <a:rPr lang="en-US" dirty="0" smtClean="0"/>
-              <a:t>‘N’-D Euler Equations</a:t>
+              <a:t>‘</a:t>
+            </a:r>
+            <a:r>
+              <a:rPr lang="en-US" dirty="0" smtClean="0"/>
+              <a:t>N’D </a:t>
+            </a:r>
+            <a:r>
+              <a:rPr lang="en-US" dirty="0" smtClean="0"/>
+              <a:t>Euler Equations</a:t>
             </a:r>
           </a:p>
         </p:txBody>
@@ -4701,6 +4890,13 @@
   <p:clrMapOvr>
     <a:masterClrMapping/>
   </p:clrMapOvr>
+  <p:timing>
+    <p:tnLst>
+      <p:par>
+        <p:cTn id="1" dur="indefinite" restart="never" nodeType="tmRoot"/>
+      </p:par>
+    </p:tnLst>
+  </p:timing>
 </p:sld>
 </file>
 
@@ -4797,6 +4993,13 @@
   <p:clrMapOvr>
     <a:masterClrMapping/>
   </p:clrMapOvr>
+  <p:timing>
+    <p:tnLst>
+      <p:par>
+        <p:cTn id="1" dur="indefinite" restart="never" nodeType="tmRoot"/>
+      </p:par>
+    </p:tnLst>
+  </p:timing>
 </p:sld>
 </file>
 
@@ -4836,11 +5039,7 @@
           <a:p>
             <a:r>
               <a:rPr lang="en-US" dirty="0" smtClean="0"/>
-              <a:t>Error </a:t>
-            </a:r>
-            <a:r>
-              <a:rPr lang="en-US" dirty="0" smtClean="0"/>
-              <a:t>Estimation</a:t>
+              <a:t>Error Estimation</a:t>
             </a:r>
             <a:endParaRPr lang="en-US" dirty="0"/>
           </a:p>
@@ -4865,26 +5064,14 @@
           <a:p>
             <a:r>
               <a:rPr lang="en-US" dirty="0" smtClean="0"/>
-              <a:t>The goal of error estimation is to bridge the gap between simulations and </a:t>
-            </a:r>
-            <a:r>
-              <a:rPr lang="en-US" dirty="0" smtClean="0"/>
-              <a:t>real </a:t>
-            </a:r>
-            <a:r>
-              <a:rPr lang="en-US" dirty="0" smtClean="0"/>
-              <a:t>life</a:t>
+              <a:t>The goal of error estimation is to bridge the gap between simulations and real life</a:t>
             </a:r>
           </a:p>
           <a:p>
             <a:pPr lvl="1"/>
             <a:r>
               <a:rPr lang="en-US" dirty="0" smtClean="0"/>
-              <a:t>Discretization </a:t>
-            </a:r>
-            <a:r>
-              <a:rPr lang="en-US" dirty="0" smtClean="0"/>
-              <a:t>error (DE) is the difference between the </a:t>
+              <a:t>Discretization error (DE) is the difference between the </a:t>
             </a:r>
             <a:r>
               <a:rPr lang="en-US" i="1" dirty="0" smtClean="0"/>
@@ -4892,30 +5079,14 @@
             </a:r>
             <a:r>
               <a:rPr lang="en-US" dirty="0" smtClean="0"/>
-              <a:t> to the continuous and discrete </a:t>
-            </a:r>
-            <a:r>
-              <a:rPr lang="en-US" dirty="0" smtClean="0"/>
-              <a:t>EOI</a:t>
+              <a:t> to the continuous and discrete EOI</a:t>
             </a:r>
           </a:p>
           <a:p>
             <a:pPr lvl="1"/>
             <a:r>
               <a:rPr lang="en-US" dirty="0" smtClean="0"/>
-              <a:t>Truncation error (TE) </a:t>
-            </a:r>
-            <a:r>
-              <a:rPr lang="en-US" dirty="0" smtClean="0"/>
-              <a:t>is the difference between the </a:t>
-            </a:r>
-            <a:r>
-              <a:rPr lang="en-US" dirty="0" smtClean="0"/>
-              <a:t>continuous </a:t>
-            </a:r>
-            <a:r>
-              <a:rPr lang="en-US" dirty="0" smtClean="0"/>
-              <a:t>and discrete </a:t>
+              <a:t>Truncation error (TE) is the difference between the continuous and discrete </a:t>
             </a:r>
             <a:r>
               <a:rPr lang="en-US" i="1" dirty="0" smtClean="0"/>
@@ -4923,11 +5094,7 @@
             </a:r>
             <a:r>
               <a:rPr lang="en-US" dirty="0" smtClean="0"/>
-              <a:t> of Interest (EOI</a:t>
-            </a:r>
-            <a:r>
-              <a:rPr lang="en-US" dirty="0" smtClean="0"/>
-              <a:t>), i.e.,</a:t>
+              <a:t> of Interest (EOI), i.e.,</a:t>
             </a:r>
             <a:r>
               <a:rPr lang="en-US" i="1" dirty="0" smtClean="0"/>
@@ -4938,11 +5105,7 @@
           <a:p>
             <a:r>
               <a:rPr lang="en-US" dirty="0" smtClean="0"/>
-              <a:t>I </a:t>
-            </a:r>
-            <a:r>
-              <a:rPr lang="en-US" dirty="0" smtClean="0"/>
-              <a:t>left </a:t>
+              <a:t>I left </a:t>
             </a:r>
             <a:r>
               <a:rPr lang="en-US" dirty="0" err="1" smtClean="0"/>
@@ -4950,7 +5113,7 @@
             </a:r>
             <a:r>
               <a:rPr lang="en-US" dirty="0" smtClean="0"/>
-              <a:t> last year with a lingering question about how each term in the adjoint </a:t>
+              <a:t> last year with a question about how each term in the adjoint </a:t>
             </a:r>
             <a:r>
               <a:rPr lang="en-US" dirty="0" err="1" smtClean="0"/>
@@ -4958,20 +5121,15 @@
             </a:r>
             <a:r>
               <a:rPr lang="en-US" dirty="0" smtClean="0"/>
-              <a:t> equation related to the TE and </a:t>
-            </a:r>
-            <a:r>
-              <a:rPr lang="en-US" dirty="0" smtClean="0"/>
-              <a:t>DE</a:t>
+              <a:t> equation related to the TE and DE</a:t>
             </a:r>
           </a:p>
           <a:p>
             <a:pPr lvl="1"/>
             <a:r>
               <a:rPr lang="en-US" dirty="0" smtClean="0"/>
-              <a:t>i.e., Why do adjoint methods work?</a:t>
-            </a:r>
-            <a:endParaRPr lang="en-US" dirty="0" smtClean="0"/>
+              <a:t>How to answer ‘Why do adjoint methods work?’ ?</a:t>
+            </a:r>
           </a:p>
         </p:txBody>
       </p:sp>
@@ -4980,6 +5138,13 @@
   <p:clrMapOvr>
     <a:masterClrMapping/>
   </p:clrMapOvr>
+  <p:timing>
+    <p:tnLst>
+      <p:par>
+        <p:cTn id="1" dur="indefinite" restart="never" nodeType="tmRoot"/>
+      </p:par>
+    </p:tnLst>
+  </p:timing>
 </p:sld>
 </file>
 
@@ -5088,9 +5253,6 @@
               <a:rPr lang="en-US" dirty="0" smtClean="0"/>
               <a:t>            *Note: inner products are implied*</a:t>
             </a:r>
-          </a:p>
-          <a:p>
-            <a:endParaRPr lang="en-US" dirty="0"/>
           </a:p>
         </p:txBody>
       </p:sp>
@@ -5160,8 +5322,8 @@
         </p:blipFill>
         <p:spPr bwMode="auto">
           <a:xfrm>
-            <a:off x="2286000" y="3352800"/>
-            <a:ext cx="4673600" cy="609600"/>
+            <a:off x="1845732" y="3033171"/>
+            <a:ext cx="5621867" cy="733287"/>
           </a:xfrm>
           <a:prstGeom prst="rect">
             <a:avLst/>
@@ -5299,8 +5461,8 @@
         </p:blipFill>
         <p:spPr bwMode="auto">
           <a:xfrm>
-            <a:off x="2362200" y="3886200"/>
-            <a:ext cx="4240107" cy="609600"/>
+            <a:off x="1845733" y="3766458"/>
+            <a:ext cx="5181600" cy="744958"/>
           </a:xfrm>
           <a:prstGeom prst="rect">
             <a:avLst/>
@@ -5438,8 +5600,8 @@
         </p:blipFill>
         <p:spPr bwMode="auto">
           <a:xfrm>
-            <a:off x="609600" y="5029200"/>
-            <a:ext cx="7653867" cy="609600"/>
+            <a:off x="266700" y="5012871"/>
+            <a:ext cx="8610600" cy="685800"/>
           </a:xfrm>
           <a:prstGeom prst="rect">
             <a:avLst/>
@@ -5516,6 +5678,13 @@
   <p:clrMapOvr>
     <a:masterClrMapping/>
   </p:clrMapOvr>
+  <p:timing>
+    <p:tnLst>
+      <p:par>
+        <p:cTn id="1" dur="indefinite" restart="never" nodeType="tmRoot"/>
+      </p:par>
+    </p:tnLst>
+  </p:timing>
 </p:sld>
 </file>
 
@@ -5617,7 +5786,15 @@
           <a:p>
             <a:r>
               <a:rPr lang="en-US" dirty="0" smtClean="0"/>
-              <a:t>Based on the Generalized Truncation Error Expression                                       the above becomes</a:t>
+              <a:t>Based on the Generalized Truncation Error Expression</a:t>
+            </a:r>
+            <a:r>
+              <a:rPr lang="en-US" baseline="30000" dirty="0" smtClean="0"/>
+              <a:t>[1]</a:t>
+            </a:r>
+            <a:r>
+              <a:rPr lang="en-US" dirty="0" smtClean="0"/>
+              <a:t>                                       the above becomes</a:t>
             </a:r>
             <a:endParaRPr lang="en-US" dirty="0"/>
           </a:p>
@@ -5689,8 +5866,8 @@
         </p:blipFill>
         <p:spPr bwMode="auto">
           <a:xfrm>
-            <a:off x="838200" y="3581400"/>
-            <a:ext cx="7668768" cy="704850"/>
+            <a:off x="266700" y="3603171"/>
+            <a:ext cx="8290560" cy="762000"/>
           </a:xfrm>
           <a:prstGeom prst="rect">
             <a:avLst/>
@@ -5828,7 +6005,7 @@
         </p:blipFill>
         <p:spPr bwMode="auto">
           <a:xfrm>
-            <a:off x="2743200" y="4953000"/>
+            <a:off x="3020568" y="4953000"/>
             <a:ext cx="3360420" cy="457200"/>
           </a:xfrm>
           <a:prstGeom prst="rect">
@@ -5967,8 +6144,8 @@
         </p:blipFill>
         <p:spPr bwMode="auto">
           <a:xfrm>
-            <a:off x="838200" y="5791200"/>
-            <a:ext cx="7725156" cy="704850"/>
+            <a:off x="266700" y="5791200"/>
+            <a:ext cx="8351520" cy="762000"/>
           </a:xfrm>
           <a:prstGeom prst="rect">
             <a:avLst/>
@@ -6068,8 +6245,8 @@
         </p:blipFill>
         <p:spPr bwMode="auto">
           <a:xfrm>
-            <a:off x="838200" y="1600200"/>
-            <a:ext cx="7653867" cy="609600"/>
+            <a:off x="266700" y="1524000"/>
+            <a:ext cx="8610600" cy="685800"/>
           </a:xfrm>
           <a:prstGeom prst="rect">
             <a:avLst/>
@@ -6082,6 +6259,13 @@
   <p:clrMapOvr>
     <a:masterClrMapping/>
   </p:clrMapOvr>
+  <p:timing>
+    <p:tnLst>
+      <p:par>
+        <p:cTn id="1" dur="indefinite" restart="never" nodeType="tmRoot"/>
+      </p:par>
+    </p:tnLst>
+  </p:timing>
 </p:sld>
 </file>
 
@@ -6119,11 +6303,7 @@
           <a:p>
             <a:r>
               <a:rPr lang="en-US" dirty="0" smtClean="0"/>
-              <a:t>Error </a:t>
-            </a:r>
-            <a:r>
-              <a:rPr lang="en-US" dirty="0" smtClean="0"/>
-              <a:t>Estimation, </a:t>
+              <a:t>Error Estimation, </a:t>
             </a:r>
             <a:r>
               <a:rPr lang="en-US" dirty="0" err="1" smtClean="0"/>
@@ -6155,7 +6335,7 @@
         </p:spPr>
         <p:txBody>
           <a:bodyPr>
-            <a:normAutofit lnSpcReduction="10000"/>
+            <a:normAutofit fontScale="85000" lnSpcReduction="10000"/>
           </a:bodyPr>
           <a:lstStyle/>
           <a:p>
@@ -6164,7 +6344,41 @@
           <a:p>
             <a:r>
               <a:rPr lang="en-US" dirty="0" smtClean="0"/>
-              <a:t>From this, the ‘correction term’ attempts to correct for TE and the adjoint solution removes DE from the functional estimate</a:t>
+              <a:t>What does this equation say?</a:t>
+            </a:r>
+          </a:p>
+          <a:p>
+            <a:pPr lvl="1"/>
+            <a:r>
+              <a:rPr lang="en-US" dirty="0" smtClean="0"/>
+              <a:t>The ‘correction term’ attempts to correct for TE</a:t>
+            </a:r>
+          </a:p>
+          <a:p>
+            <a:pPr lvl="1"/>
+            <a:r>
+              <a:rPr lang="en-US" dirty="0" smtClean="0"/>
+              <a:t>The solution to the </a:t>
+            </a:r>
+            <a:r>
+              <a:rPr lang="en-US" dirty="0" err="1" smtClean="0"/>
+              <a:t>adjoint</a:t>
+            </a:r>
+            <a:r>
+              <a:rPr lang="en-US" dirty="0" smtClean="0"/>
+              <a:t> equation </a:t>
+            </a:r>
+            <a:r>
+              <a:rPr lang="en-US" dirty="0" smtClean="0"/>
+              <a:t>removes DE from the functional estimate</a:t>
+            </a:r>
+            <a:endParaRPr lang="en-US" dirty="0" smtClean="0"/>
+          </a:p>
+          <a:p>
+            <a:pPr lvl="1"/>
+            <a:r>
+              <a:rPr lang="en-US" dirty="0" smtClean="0"/>
+              <a:t>The final term may have some use in prescribing mesh stretching (?)</a:t>
             </a:r>
           </a:p>
           <a:p>
@@ -6183,15 +6397,13 @@
           <a:p>
             <a:pPr lvl="1"/>
             <a:r>
-              <a:rPr lang="en-US" dirty="0" smtClean="0"/>
-              <a:t>The above does not include error introduced by solving the adjoint equation discretely</a:t>
-            </a:r>
-          </a:p>
-          <a:p>
-            <a:pPr>
-              <a:buNone/>
-            </a:pPr>
-            <a:endParaRPr lang="en-US" dirty="0" smtClean="0"/>
+              <a:rPr lang="en-US" dirty="0"/>
+              <a:t>E</a:t>
+            </a:r>
+            <a:r>
+              <a:rPr lang="en-US" dirty="0" smtClean="0"/>
+              <a:t>rror introduced by solving the adjoint equation discretely</a:t>
+            </a:r>
           </a:p>
         </p:txBody>
       </p:sp>
@@ -6223,8 +6435,8 @@
         </p:blipFill>
         <p:spPr bwMode="auto">
           <a:xfrm>
-            <a:off x="609600" y="1371600"/>
-            <a:ext cx="7725156" cy="704850"/>
+            <a:off x="304800" y="1295400"/>
+            <a:ext cx="8560308" cy="781050"/>
           </a:xfrm>
           <a:prstGeom prst="rect">
             <a:avLst/>
@@ -6237,6 +6449,13 @@
   <p:clrMapOvr>
     <a:masterClrMapping/>
   </p:clrMapOvr>
+  <p:timing>
+    <p:tnLst>
+      <p:par>
+        <p:cTn id="1" dur="indefinite" restart="never" nodeType="tmRoot"/>
+      </p:par>
+    </p:tnLst>
+  </p:timing>
 </p:sld>
 </file>
 

</xml_diff>